<commit_message>
:unamused: Update Review for lesson 1
</commit_message>
<xml_diff>
--- a/Section2(上半平面とポアンカレ計量)/0-Overview&Review.pptx
+++ b/Section2(上半平面とポアンカレ計量)/0-Overview&Review.pptx
@@ -5,7 +5,7 @@
     <p:sldMasterId id="2147483659" r:id="rId1"/>
   </p:sldMasterIdLst>
   <p:notesMasterIdLst>
-    <p:notesMasterId r:id="rId9"/>
+    <p:notesMasterId r:id="rId11"/>
   </p:notesMasterIdLst>
   <p:sldIdLst>
     <p:sldId id="287" r:id="rId2"/>
@@ -15,6 +15,8 @@
     <p:sldId id="291" r:id="rId6"/>
     <p:sldId id="292" r:id="rId7"/>
     <p:sldId id="293" r:id="rId8"/>
+    <p:sldId id="294" r:id="rId9"/>
+    <p:sldId id="295" r:id="rId10"/>
   </p:sldIdLst>
   <p:sldSz cx="9144000" cy="5143500" type="screen16x9"/>
   <p:notesSz cx="6858000" cy="9144000"/>
@@ -1451,6 +1453,224 @@
     <p:extLst>
       <p:ext uri="{BB962C8B-B14F-4D97-AF65-F5344CB8AC3E}">
         <p14:creationId xmlns:p14="http://schemas.microsoft.com/office/powerpoint/2010/main" val="293498411"/>
+      </p:ext>
+    </p:extLst>
+  </p:cSld>
+  <p:clrMapOvr>
+    <a:masterClrMapping/>
+  </p:clrMapOvr>
+</p:notes>
+</file>
+
+<file path=ppt/notesSlides/notesSlide8.xml><?xml version="1.0" encoding="utf-8"?>
+<p:notes xmlns:a="http://schemas.openxmlformats.org/drawingml/2006/main" xmlns:r="http://schemas.openxmlformats.org/officeDocument/2006/relationships" xmlns:p="http://schemas.openxmlformats.org/presentationml/2006/main" showMasterSp="0" showMasterPhAnim="0">
+  <p:cSld>
+    <p:spTree>
+      <p:nvGrpSpPr>
+        <p:cNvPr id="1" name="Shape 56"/>
+        <p:cNvGrpSpPr/>
+        <p:nvPr/>
+      </p:nvGrpSpPr>
+      <p:grpSpPr>
+        <a:xfrm>
+          <a:off x="0" y="0"/>
+          <a:ext cx="0" cy="0"/>
+          <a:chOff x="0" y="0"/>
+          <a:chExt cx="0" cy="0"/>
+        </a:xfrm>
+      </p:grpSpPr>
+      <p:sp>
+        <p:nvSpPr>
+          <p:cNvPr id="57" name="Google Shape;57;g5fb8af1956_0_0:notes"/>
+          <p:cNvSpPr>
+            <a:spLocks noGrp="1" noRot="1" noChangeAspect="1"/>
+          </p:cNvSpPr>
+          <p:nvPr>
+            <p:ph type="sldImg" idx="2"/>
+          </p:nvPr>
+        </p:nvSpPr>
+        <p:spPr>
+          <a:xfrm>
+            <a:off x="381000" y="685800"/>
+            <a:ext cx="6096000" cy="3429000"/>
+          </a:xfrm>
+          <a:custGeom>
+            <a:avLst/>
+            <a:gdLst/>
+            <a:ahLst/>
+            <a:cxnLst/>
+            <a:rect l="l" t="t" r="r" b="b"/>
+            <a:pathLst>
+              <a:path w="120000" h="120000" extrusionOk="0">
+                <a:moveTo>
+                  <a:pt x="0" y="0"/>
+                </a:moveTo>
+                <a:lnTo>
+                  <a:pt x="120000" y="0"/>
+                </a:lnTo>
+                <a:lnTo>
+                  <a:pt x="120000" y="120000"/>
+                </a:lnTo>
+                <a:lnTo>
+                  <a:pt x="0" y="120000"/>
+                </a:lnTo>
+                <a:close/>
+              </a:path>
+            </a:pathLst>
+          </a:custGeom>
+        </p:spPr>
+      </p:sp>
+      <p:sp>
+        <p:nvSpPr>
+          <p:cNvPr id="58" name="Google Shape;58;g5fb8af1956_0_0:notes"/>
+          <p:cNvSpPr txBox="1">
+            <a:spLocks noGrp="1"/>
+          </p:cNvSpPr>
+          <p:nvPr>
+            <p:ph type="body" idx="1"/>
+          </p:nvPr>
+        </p:nvSpPr>
+        <p:spPr>
+          <a:xfrm>
+            <a:off x="685800" y="4343400"/>
+            <a:ext cx="5486400" cy="4114800"/>
+          </a:xfrm>
+          <a:prstGeom prst="rect">
+            <a:avLst/>
+          </a:prstGeom>
+        </p:spPr>
+        <p:txBody>
+          <a:bodyPr spcFirstLastPara="1" wrap="square" lIns="91425" tIns="91425" rIns="91425" bIns="91425" anchor="t" anchorCtr="0">
+            <a:noAutofit/>
+          </a:bodyPr>
+          <a:lstStyle/>
+          <a:p>
+            <a:pPr marL="0" lvl="0" indent="0" algn="l" rtl="0">
+              <a:spcBef>
+                <a:spcPts val="0"/>
+              </a:spcBef>
+              <a:spcAft>
+                <a:spcPts val="0"/>
+              </a:spcAft>
+              <a:buNone/>
+            </a:pPr>
+            <a:endParaRPr/>
+          </a:p>
+        </p:txBody>
+      </p:sp>
+    </p:spTree>
+    <p:extLst>
+      <p:ext uri="{BB962C8B-B14F-4D97-AF65-F5344CB8AC3E}">
+        <p14:creationId xmlns:p14="http://schemas.microsoft.com/office/powerpoint/2010/main" val="1589669256"/>
+      </p:ext>
+    </p:extLst>
+  </p:cSld>
+  <p:clrMapOvr>
+    <a:masterClrMapping/>
+  </p:clrMapOvr>
+</p:notes>
+</file>
+
+<file path=ppt/notesSlides/notesSlide9.xml><?xml version="1.0" encoding="utf-8"?>
+<p:notes xmlns:a="http://schemas.openxmlformats.org/drawingml/2006/main" xmlns:r="http://schemas.openxmlformats.org/officeDocument/2006/relationships" xmlns:p="http://schemas.openxmlformats.org/presentationml/2006/main" showMasterSp="0" showMasterPhAnim="0">
+  <p:cSld>
+    <p:spTree>
+      <p:nvGrpSpPr>
+        <p:cNvPr id="1" name="Shape 56"/>
+        <p:cNvGrpSpPr/>
+        <p:nvPr/>
+      </p:nvGrpSpPr>
+      <p:grpSpPr>
+        <a:xfrm>
+          <a:off x="0" y="0"/>
+          <a:ext cx="0" cy="0"/>
+          <a:chOff x="0" y="0"/>
+          <a:chExt cx="0" cy="0"/>
+        </a:xfrm>
+      </p:grpSpPr>
+      <p:sp>
+        <p:nvSpPr>
+          <p:cNvPr id="57" name="Google Shape;57;g5fb8af1956_0_0:notes"/>
+          <p:cNvSpPr>
+            <a:spLocks noGrp="1" noRot="1" noChangeAspect="1"/>
+          </p:cNvSpPr>
+          <p:nvPr>
+            <p:ph type="sldImg" idx="2"/>
+          </p:nvPr>
+        </p:nvSpPr>
+        <p:spPr>
+          <a:xfrm>
+            <a:off x="381000" y="685800"/>
+            <a:ext cx="6096000" cy="3429000"/>
+          </a:xfrm>
+          <a:custGeom>
+            <a:avLst/>
+            <a:gdLst/>
+            <a:ahLst/>
+            <a:cxnLst/>
+            <a:rect l="l" t="t" r="r" b="b"/>
+            <a:pathLst>
+              <a:path w="120000" h="120000" extrusionOk="0">
+                <a:moveTo>
+                  <a:pt x="0" y="0"/>
+                </a:moveTo>
+                <a:lnTo>
+                  <a:pt x="120000" y="0"/>
+                </a:lnTo>
+                <a:lnTo>
+                  <a:pt x="120000" y="120000"/>
+                </a:lnTo>
+                <a:lnTo>
+                  <a:pt x="0" y="120000"/>
+                </a:lnTo>
+                <a:close/>
+              </a:path>
+            </a:pathLst>
+          </a:custGeom>
+        </p:spPr>
+      </p:sp>
+      <p:sp>
+        <p:nvSpPr>
+          <p:cNvPr id="58" name="Google Shape;58;g5fb8af1956_0_0:notes"/>
+          <p:cNvSpPr txBox="1">
+            <a:spLocks noGrp="1"/>
+          </p:cNvSpPr>
+          <p:nvPr>
+            <p:ph type="body" idx="1"/>
+          </p:nvPr>
+        </p:nvSpPr>
+        <p:spPr>
+          <a:xfrm>
+            <a:off x="685800" y="4343400"/>
+            <a:ext cx="5486400" cy="4114800"/>
+          </a:xfrm>
+          <a:prstGeom prst="rect">
+            <a:avLst/>
+          </a:prstGeom>
+        </p:spPr>
+        <p:txBody>
+          <a:bodyPr spcFirstLastPara="1" wrap="square" lIns="91425" tIns="91425" rIns="91425" bIns="91425" anchor="t" anchorCtr="0">
+            <a:noAutofit/>
+          </a:bodyPr>
+          <a:lstStyle/>
+          <a:p>
+            <a:pPr marL="0" lvl="0" indent="0" algn="l" rtl="0">
+              <a:spcBef>
+                <a:spcPts val="0"/>
+              </a:spcBef>
+              <a:spcAft>
+                <a:spcPts val="0"/>
+              </a:spcAft>
+              <a:buNone/>
+            </a:pPr>
+            <a:endParaRPr dirty="0"/>
+          </a:p>
+        </p:txBody>
+      </p:sp>
+    </p:spTree>
+    <p:extLst>
+      <p:ext uri="{BB962C8B-B14F-4D97-AF65-F5344CB8AC3E}">
+        <p14:creationId xmlns:p14="http://schemas.microsoft.com/office/powerpoint/2010/main" val="131551787"/>
       </p:ext>
     </p:extLst>
   </p:cSld>
@@ -6937,8 +7157,8 @@
           </a:p>
         </p:txBody>
       </p:sp>
-      <mc:AlternateContent xmlns:mc="http://schemas.openxmlformats.org/markup-compatibility/2006">
-        <mc:Choice xmlns:a14="http://schemas.microsoft.com/office/drawing/2010/main" Requires="a14">
+      <mc:AlternateContent xmlns:mc="http://schemas.openxmlformats.org/markup-compatibility/2006" xmlns:a14="http://schemas.microsoft.com/office/drawing/2010/main">
+        <mc:Choice Requires="a14">
           <p:sp>
             <p:nvSpPr>
               <p:cNvPr id="61" name="Google Shape;61;p14"/>
@@ -6985,16 +7205,30 @@
                 </a:r>
                 <a:r>
                   <a:rPr lang="ja-JP" altLang="en-US" dirty="0">
+                    <a:solidFill>
+                      <a:srgbClr val="FF0000"/>
+                    </a:solidFill>
                     <a:latin typeface="M+ 1p light" panose="020B0402020203020204" pitchFamily="50" charset="-128"/>
                     <a:ea typeface="M+ 1p light" panose="020B0402020203020204" pitchFamily="50" charset="-128"/>
                     <a:cs typeface="M+ 1p light" panose="020B0402020203020204" pitchFamily="50" charset="-128"/>
                   </a:rPr>
-                  <a:t>双曲幾何で扱う”コンパス”として</a:t>
+                  <a:t>双曲幾何</a:t>
+                </a:r>
+                <a:r>
+                  <a:rPr lang="ja-JP" altLang="en-US" dirty="0">
+                    <a:latin typeface="M+ 1p light" panose="020B0402020203020204" pitchFamily="50" charset="-128"/>
+                    <a:ea typeface="M+ 1p light" panose="020B0402020203020204" pitchFamily="50" charset="-128"/>
+                    <a:cs typeface="M+ 1p light" panose="020B0402020203020204" pitchFamily="50" charset="-128"/>
+                  </a:rPr>
+                  <a:t>で扱う”コンパス”として</a:t>
                 </a:r>
                 <a14:m>
                   <m:oMath xmlns:m="http://schemas.openxmlformats.org/officeDocument/2006/math">
                     <m:r>
                       <a:rPr lang="ja-JP" altLang="en-US" i="1" dirty="0" smtClean="0">
+                        <a:solidFill>
+                          <a:schemeClr val="accent5"/>
+                        </a:solidFill>
                         <a:latin typeface="Cambria Math" panose="02040503050406030204" pitchFamily="18" charset="0"/>
                         <a:ea typeface="M+ 1p light" panose="020B0402020203020204" pitchFamily="50" charset="-128"/>
                         <a:cs typeface="M+ 1p light" panose="020B0402020203020204" pitchFamily="50" charset="-128"/>
@@ -7003,6 +7237,9 @@
                     </m:r>
                     <m:r>
                       <a:rPr lang="en-US" altLang="ja-JP" i="1" dirty="0">
+                        <a:solidFill>
+                          <a:schemeClr val="accent5"/>
+                        </a:solidFill>
                         <a:latin typeface="Cambria Math" panose="02040503050406030204" pitchFamily="18" charset="0"/>
                         <a:ea typeface="M+ 1p light" panose="020B0402020203020204" pitchFamily="50" charset="-128"/>
                         <a:cs typeface="M+ 1p light" panose="020B0402020203020204" pitchFamily="50" charset="-128"/>
@@ -7011,6 +7248,9 @@
                     </m:r>
                     <m:r>
                       <a:rPr lang="en-US" altLang="ja-JP" i="1" dirty="0">
+                        <a:solidFill>
+                          <a:schemeClr val="accent5"/>
+                        </a:solidFill>
                         <a:latin typeface="Cambria Math" panose="02040503050406030204" pitchFamily="18" charset="0"/>
                         <a:ea typeface="M+ 1p light" panose="020B0402020203020204" pitchFamily="50" charset="-128"/>
                         <a:cs typeface="M+ 1p light" panose="020B0402020203020204" pitchFamily="50" charset="-128"/>
@@ -7019,6 +7259,9 @@
                     </m:r>
                     <m:r>
                       <a:rPr lang="en-US" altLang="ja-JP" i="1" dirty="0">
+                        <a:solidFill>
+                          <a:schemeClr val="accent5"/>
+                        </a:solidFill>
                         <a:latin typeface="Cambria Math" panose="02040503050406030204" pitchFamily="18" charset="0"/>
                         <a:ea typeface="M+ 1p light" panose="020B0402020203020204" pitchFamily="50" charset="-128"/>
                         <a:cs typeface="M+ 1p light" panose="020B0402020203020204" pitchFamily="50" charset="-128"/>
@@ -7086,11 +7329,22 @@
                 </a:pPr>
                 <a:r>
                   <a:rPr lang="ja-JP" altLang="en-US" dirty="0">
+                    <a:solidFill>
+                      <a:srgbClr val="FF0000"/>
+                    </a:solidFill>
                     <a:latin typeface="M+ 1p light" panose="020B0402020203020204" pitchFamily="50" charset="-128"/>
                     <a:ea typeface="M+ 1p light" panose="020B0402020203020204" pitchFamily="50" charset="-128"/>
                     <a:cs typeface="M+ 1p light" panose="020B0402020203020204" pitchFamily="50" charset="-128"/>
                   </a:rPr>
-                  <a:t>一次分数変換の集合は</a:t>
+                  <a:t>一次分数変換</a:t>
+                </a:r>
+                <a:r>
+                  <a:rPr lang="ja-JP" altLang="en-US" dirty="0">
+                    <a:latin typeface="M+ 1p light" panose="020B0402020203020204" pitchFamily="50" charset="-128"/>
+                    <a:ea typeface="M+ 1p light" panose="020B0402020203020204" pitchFamily="50" charset="-128"/>
+                    <a:cs typeface="M+ 1p light" panose="020B0402020203020204" pitchFamily="50" charset="-128"/>
+                  </a:rPr>
+                  <a:t>の集合は</a:t>
                 </a:r>
                 <a:r>
                   <a:rPr lang="en-US" altLang="ja-JP" dirty="0">
@@ -7106,7 +7360,18 @@
                     <a:ea typeface="M+ 1p light" panose="020B0402020203020204" pitchFamily="50" charset="-128"/>
                     <a:cs typeface="M+ 1p light" panose="020B0402020203020204" pitchFamily="50" charset="-128"/>
                   </a:rPr>
-                  <a:t>写像の合成という演算に対して群</a:t>
+                  <a:t>写像の合成という演算に対して</a:t>
+                </a:r>
+                <a:r>
+                  <a:rPr lang="ja-JP" altLang="en-US" dirty="0">
+                    <a:solidFill>
+                      <a:srgbClr val="FF0000"/>
+                    </a:solidFill>
+                    <a:latin typeface="M+ 1p light" panose="020B0402020203020204" pitchFamily="50" charset="-128"/>
+                    <a:ea typeface="M+ 1p light" panose="020B0402020203020204" pitchFamily="50" charset="-128"/>
+                    <a:cs typeface="M+ 1p light" panose="020B0402020203020204" pitchFamily="50" charset="-128"/>
+                  </a:rPr>
+                  <a:t>群</a:t>
                 </a:r>
                 <a:r>
                   <a:rPr lang="en-US" altLang="ja-JP" dirty="0">
@@ -7120,6 +7385,9 @@
                   <m:oMath xmlns:m="http://schemas.openxmlformats.org/officeDocument/2006/math">
                     <m:r>
                       <a:rPr lang="ja-JP" altLang="en-US" i="1" dirty="0" smtClean="0">
+                        <a:solidFill>
+                          <a:schemeClr val="accent5"/>
+                        </a:solidFill>
                         <a:latin typeface="Cambria Math" panose="02040503050406030204" pitchFamily="18" charset="0"/>
                         <a:ea typeface="M+ 1p light" panose="020B0402020203020204" pitchFamily="50" charset="-128"/>
                         <a:cs typeface="M+ 1p light" panose="020B0402020203020204" pitchFamily="50" charset="-128"/>
@@ -7128,6 +7396,9 @@
                     </m:r>
                     <m:r>
                       <a:rPr lang="en-US" altLang="ja-JP" i="1" dirty="0">
+                        <a:solidFill>
+                          <a:schemeClr val="accent5"/>
+                        </a:solidFill>
                         <a:latin typeface="Cambria Math" panose="02040503050406030204" pitchFamily="18" charset="0"/>
                         <a:ea typeface="M+ 1p light" panose="020B0402020203020204" pitchFamily="50" charset="-128"/>
                         <a:cs typeface="M+ 1p light" panose="020B0402020203020204" pitchFamily="50" charset="-128"/>
@@ -7136,6 +7407,9 @@
                     </m:r>
                     <m:r>
                       <a:rPr lang="en-US" altLang="ja-JP" i="1" dirty="0">
+                        <a:solidFill>
+                          <a:schemeClr val="accent5"/>
+                        </a:solidFill>
                         <a:latin typeface="Cambria Math" panose="02040503050406030204" pitchFamily="18" charset="0"/>
                         <a:ea typeface="M+ 1p light" panose="020B0402020203020204" pitchFamily="50" charset="-128"/>
                         <a:cs typeface="M+ 1p light" panose="020B0402020203020204" pitchFamily="50" charset="-128"/>
@@ -7144,6 +7418,9 @@
                     </m:r>
                     <m:r>
                       <a:rPr lang="en-US" altLang="ja-JP" i="1" dirty="0">
+                        <a:solidFill>
+                          <a:schemeClr val="accent5"/>
+                        </a:solidFill>
                         <a:latin typeface="Cambria Math" panose="02040503050406030204" pitchFamily="18" charset="0"/>
                         <a:ea typeface="M+ 1p light" panose="020B0402020203020204" pitchFamily="50" charset="-128"/>
                         <a:cs typeface="M+ 1p light" panose="020B0402020203020204" pitchFamily="50" charset="-128"/>
@@ -7182,6 +7459,9 @@
                   <m:oMath xmlns:m="http://schemas.openxmlformats.org/officeDocument/2006/math">
                     <m:r>
                       <a:rPr lang="ja-JP" altLang="en-US" i="1" dirty="0" smtClean="0">
+                        <a:solidFill>
+                          <a:schemeClr val="accent5"/>
+                        </a:solidFill>
                         <a:latin typeface="Cambria Math" panose="02040503050406030204" pitchFamily="18" charset="0"/>
                         <a:ea typeface="M+ 1p light" panose="020B0402020203020204" pitchFamily="50" charset="-128"/>
                         <a:cs typeface="M+ 1p light" panose="020B0402020203020204" pitchFamily="50" charset="-128"/>
@@ -7190,6 +7470,9 @@
                     </m:r>
                     <m:r>
                       <a:rPr lang="en-US" altLang="ja-JP" i="1" dirty="0" smtClean="0">
+                        <a:solidFill>
+                          <a:schemeClr val="accent5"/>
+                        </a:solidFill>
                         <a:latin typeface="Cambria Math" panose="02040503050406030204" pitchFamily="18" charset="0"/>
                         <a:ea typeface="M+ 1p light" panose="020B0402020203020204" pitchFamily="50" charset="-128"/>
                         <a:cs typeface="M+ 1p light" panose="020B0402020203020204" pitchFamily="50" charset="-128"/>
@@ -7198,6 +7481,9 @@
                     </m:r>
                     <m:r>
                       <a:rPr lang="en-US" altLang="ja-JP" i="1" dirty="0" smtClean="0">
+                        <a:solidFill>
+                          <a:schemeClr val="accent5"/>
+                        </a:solidFill>
                         <a:latin typeface="Cambria Math" panose="02040503050406030204" pitchFamily="18" charset="0"/>
                         <a:ea typeface="M+ 1p light" panose="020B0402020203020204" pitchFamily="50" charset="-128"/>
                         <a:cs typeface="M+ 1p light" panose="020B0402020203020204" pitchFamily="50" charset="-128"/>
@@ -7206,6 +7492,9 @@
                     </m:r>
                     <m:r>
                       <a:rPr lang="en-US" altLang="ja-JP" i="1" dirty="0" smtClean="0">
+                        <a:solidFill>
+                          <a:schemeClr val="accent5"/>
+                        </a:solidFill>
                         <a:latin typeface="Cambria Math" panose="02040503050406030204" pitchFamily="18" charset="0"/>
                         <a:ea typeface="M+ 1p light" panose="020B0402020203020204" pitchFamily="50" charset="-128"/>
                         <a:cs typeface="M+ 1p light" panose="020B0402020203020204" pitchFamily="50" charset="-128"/>
@@ -7226,6 +7515,9 @@
                   <m:oMath xmlns:m="http://schemas.openxmlformats.org/officeDocument/2006/math">
                     <m:r>
                       <a:rPr lang="ja-JP" altLang="en-US" i="1" dirty="0" smtClean="0">
+                        <a:solidFill>
+                          <a:schemeClr val="accent5"/>
+                        </a:solidFill>
                         <a:latin typeface="Cambria Math" panose="02040503050406030204" pitchFamily="18" charset="0"/>
                         <a:ea typeface="M+ 1p light" panose="020B0402020203020204" pitchFamily="50" charset="-128"/>
                         <a:cs typeface="M+ 1p light" panose="020B0402020203020204" pitchFamily="50" charset="-128"/>
@@ -7234,6 +7526,9 @@
                     </m:r>
                     <m:r>
                       <a:rPr lang="en-US" altLang="ja-JP" i="1" dirty="0">
+                        <a:solidFill>
+                          <a:schemeClr val="accent5"/>
+                        </a:solidFill>
                         <a:latin typeface="Cambria Math" panose="02040503050406030204" pitchFamily="18" charset="0"/>
                         <a:ea typeface="M+ 1p light" panose="020B0402020203020204" pitchFamily="50" charset="-128"/>
                         <a:cs typeface="M+ 1p light" panose="020B0402020203020204" pitchFamily="50" charset="-128"/>
@@ -7242,6 +7537,9 @@
                     </m:r>
                     <m:r>
                       <a:rPr lang="en-US" altLang="ja-JP" i="1" dirty="0">
+                        <a:solidFill>
+                          <a:schemeClr val="accent5"/>
+                        </a:solidFill>
                         <a:latin typeface="Cambria Math" panose="02040503050406030204" pitchFamily="18" charset="0"/>
                         <a:ea typeface="M+ 1p light" panose="020B0402020203020204" pitchFamily="50" charset="-128"/>
                         <a:cs typeface="M+ 1p light" panose="020B0402020203020204" pitchFamily="50" charset="-128"/>
@@ -7250,6 +7548,9 @@
                     </m:r>
                     <m:r>
                       <a:rPr lang="en-US" altLang="ja-JP" i="1" dirty="0">
+                        <a:solidFill>
+                          <a:schemeClr val="accent5"/>
+                        </a:solidFill>
                         <a:latin typeface="Cambria Math" panose="02040503050406030204" pitchFamily="18" charset="0"/>
                         <a:ea typeface="M+ 1p light" panose="020B0402020203020204" pitchFamily="50" charset="-128"/>
                         <a:cs typeface="M+ 1p light" panose="020B0402020203020204" pitchFamily="50" charset="-128"/>
@@ -7264,7 +7565,26 @@
                     <a:ea typeface="M+ 1p light" panose="020B0402020203020204" pitchFamily="50" charset="-128"/>
                     <a:cs typeface="M+ 1p light" panose="020B0402020203020204" pitchFamily="50" charset="-128"/>
                   </a:rPr>
-                  <a:t>は同型である</a:t>
+                  <a:t>は</a:t>
+                </a:r>
+                <a:r>
+                  <a:rPr lang="ja-JP" altLang="en-US" dirty="0">
+                    <a:solidFill>
+                      <a:srgbClr val="FF0000"/>
+                    </a:solidFill>
+                    <a:latin typeface="M+ 1p light" panose="020B0402020203020204" pitchFamily="50" charset="-128"/>
+                    <a:ea typeface="M+ 1p light" panose="020B0402020203020204" pitchFamily="50" charset="-128"/>
+                    <a:cs typeface="M+ 1p light" panose="020B0402020203020204" pitchFamily="50" charset="-128"/>
+                  </a:rPr>
+                  <a:t>同型</a:t>
+                </a:r>
+                <a:r>
+                  <a:rPr lang="ja-JP" altLang="en-US" dirty="0">
+                    <a:latin typeface="M+ 1p light" panose="020B0402020203020204" pitchFamily="50" charset="-128"/>
+                    <a:ea typeface="M+ 1p light" panose="020B0402020203020204" pitchFamily="50" charset="-128"/>
+                    <a:cs typeface="M+ 1p light" panose="020B0402020203020204" pitchFamily="50" charset="-128"/>
+                  </a:rPr>
+                  <a:t>である</a:t>
                 </a:r>
                 <a:endParaRPr lang="en-US" altLang="ja-JP" dirty="0">
                   <a:latin typeface="M+ 1p light" panose="020B0402020203020204" pitchFamily="50" charset="-128"/>
@@ -7280,6 +7600,9 @@
                   <m:oMath xmlns:m="http://schemas.openxmlformats.org/officeDocument/2006/math">
                     <m:r>
                       <a:rPr lang="ja-JP" altLang="en-US" i="1" dirty="0" smtClean="0">
+                        <a:solidFill>
+                          <a:schemeClr val="accent5"/>
+                        </a:solidFill>
                         <a:latin typeface="Cambria Math" panose="02040503050406030204" pitchFamily="18" charset="0"/>
                         <a:ea typeface="M+ 1p light" panose="020B0402020203020204" pitchFamily="50" charset="-128"/>
                         <a:cs typeface="M+ 1p light" panose="020B0402020203020204" pitchFamily="50" charset="-128"/>
@@ -7288,6 +7611,9 @@
                     </m:r>
                     <m:r>
                       <a:rPr lang="en-US" altLang="ja-JP" i="1" dirty="0">
+                        <a:solidFill>
+                          <a:schemeClr val="accent5"/>
+                        </a:solidFill>
                         <a:latin typeface="Cambria Math" panose="02040503050406030204" pitchFamily="18" charset="0"/>
                         <a:ea typeface="M+ 1p light" panose="020B0402020203020204" pitchFamily="50" charset="-128"/>
                         <a:cs typeface="M+ 1p light" panose="020B0402020203020204" pitchFamily="50" charset="-128"/>
@@ -7296,6 +7622,9 @@
                     </m:r>
                     <m:r>
                       <a:rPr lang="en-US" altLang="ja-JP" i="1" dirty="0">
+                        <a:solidFill>
+                          <a:schemeClr val="accent5"/>
+                        </a:solidFill>
                         <a:latin typeface="Cambria Math" panose="02040503050406030204" pitchFamily="18" charset="0"/>
                         <a:ea typeface="M+ 1p light" panose="020B0402020203020204" pitchFamily="50" charset="-128"/>
                         <a:cs typeface="M+ 1p light" panose="020B0402020203020204" pitchFamily="50" charset="-128"/>
@@ -7304,6 +7633,9 @@
                     </m:r>
                     <m:r>
                       <a:rPr lang="en-US" altLang="ja-JP" i="1" dirty="0">
+                        <a:solidFill>
+                          <a:schemeClr val="accent5"/>
+                        </a:solidFill>
                         <a:latin typeface="Cambria Math" panose="02040503050406030204" pitchFamily="18" charset="0"/>
                         <a:ea typeface="M+ 1p light" panose="020B0402020203020204" pitchFamily="50" charset="-128"/>
                         <a:cs typeface="M+ 1p light" panose="020B0402020203020204" pitchFamily="50" charset="-128"/>
@@ -7326,6 +7658,9 @@
                       <m:sSubPr>
                         <m:ctrlPr>
                           <a:rPr lang="en-US" altLang="ja-JP" i="1" dirty="0" smtClean="0">
+                            <a:solidFill>
+                              <a:schemeClr val="accent5"/>
+                            </a:solidFill>
                             <a:latin typeface="Cambria Math" panose="02040503050406030204" pitchFamily="18" charset="0"/>
                             <a:ea typeface="M+ 1p light" panose="020B0402020203020204" pitchFamily="50" charset="-128"/>
                             <a:cs typeface="M+ 1p light" panose="020B0402020203020204" pitchFamily="50" charset="-128"/>
@@ -7335,6 +7670,9 @@
                       <m:e>
                         <m:r>
                           <a:rPr lang="en-US" altLang="ja-JP" i="1" dirty="0" smtClean="0">
+                            <a:solidFill>
+                              <a:schemeClr val="accent5"/>
+                            </a:solidFill>
                             <a:latin typeface="Cambria Math" panose="02040503050406030204" pitchFamily="18" charset="0"/>
                             <a:ea typeface="M+ 1p light" panose="020B0402020203020204" pitchFamily="50" charset="-128"/>
                             <a:cs typeface="M+ 1p light" panose="020B0402020203020204" pitchFamily="50" charset="-128"/>
@@ -7345,6 +7683,9 @@
                       <m:sub>
                         <m:r>
                           <a:rPr lang="en-US" altLang="ja-JP" i="1" dirty="0" smtClean="0">
+                            <a:solidFill>
+                              <a:schemeClr val="accent5"/>
+                            </a:solidFill>
                             <a:latin typeface="Cambria Math" panose="02040503050406030204" pitchFamily="18" charset="0"/>
                             <a:ea typeface="M+ 1p light" panose="020B0402020203020204" pitchFamily="50" charset="-128"/>
                             <a:cs typeface="M+ 1p light" panose="020B0402020203020204" pitchFamily="50" charset="-128"/>
@@ -7355,6 +7696,9 @@
                     </m:sSub>
                     <m:r>
                       <a:rPr lang="en-US" altLang="ja-JP" i="1" dirty="0" smtClean="0">
+                        <a:solidFill>
+                          <a:srgbClr val="FF0000"/>
+                        </a:solidFill>
                         <a:latin typeface="Cambria Math" panose="02040503050406030204" pitchFamily="18" charset="0"/>
                         <a:ea typeface="M+ 1p light" panose="020B0402020203020204" pitchFamily="50" charset="-128"/>
                         <a:cs typeface="M+ 1p light" panose="020B0402020203020204" pitchFamily="50" charset="-128"/>
@@ -7369,7 +7713,26 @@
                     <a:ea typeface="M+ 1p light" panose="020B0402020203020204" pitchFamily="50" charset="-128"/>
                     <a:cs typeface="M+ 1p light" panose="020B0402020203020204" pitchFamily="50" charset="-128"/>
                   </a:rPr>
-                  <a:t>に作用するとき</a:t>
+                  <a:t>に</a:t>
+                </a:r>
+                <a:r>
+                  <a:rPr lang="ja-JP" altLang="en-US" dirty="0">
+                    <a:solidFill>
+                      <a:srgbClr val="FF0000"/>
+                    </a:solidFill>
+                    <a:latin typeface="M+ 1p light" panose="020B0402020203020204" pitchFamily="50" charset="-128"/>
+                    <a:ea typeface="M+ 1p light" panose="020B0402020203020204" pitchFamily="50" charset="-128"/>
+                    <a:cs typeface="M+ 1p light" panose="020B0402020203020204" pitchFamily="50" charset="-128"/>
+                  </a:rPr>
+                  <a:t>作用</a:t>
+                </a:r>
+                <a:r>
+                  <a:rPr lang="ja-JP" altLang="en-US" dirty="0">
+                    <a:latin typeface="M+ 1p light" panose="020B0402020203020204" pitchFamily="50" charset="-128"/>
+                    <a:ea typeface="M+ 1p light" panose="020B0402020203020204" pitchFamily="50" charset="-128"/>
+                    <a:cs typeface="M+ 1p light" panose="020B0402020203020204" pitchFamily="50" charset="-128"/>
+                  </a:rPr>
+                  <a:t>するとき</a:t>
                 </a:r>
                 <a:r>
                   <a:rPr lang="en-US" altLang="ja-JP" dirty="0">
@@ -7381,11 +7744,41 @@
                 </a:r>
                 <a:r>
                   <a:rPr lang="ja-JP" altLang="en-US" dirty="0">
+                    <a:solidFill>
+                      <a:srgbClr val="FF0000"/>
+                    </a:solidFill>
                     <a:latin typeface="M+ 1p light" panose="020B0402020203020204" pitchFamily="50" charset="-128"/>
                     <a:ea typeface="M+ 1p light" panose="020B0402020203020204" pitchFamily="50" charset="-128"/>
                     <a:cs typeface="M+ 1p light" panose="020B0402020203020204" pitchFamily="50" charset="-128"/>
                   </a:rPr>
-                  <a:t>広義円を広義円に移す</a:t>
+                  <a:t>広義円</a:t>
+                </a:r>
+                <a:r>
+                  <a:rPr lang="ja-JP" altLang="en-US" dirty="0">
+                    <a:latin typeface="M+ 1p light" panose="020B0402020203020204" pitchFamily="50" charset="-128"/>
+                    <a:ea typeface="M+ 1p light" panose="020B0402020203020204" pitchFamily="50" charset="-128"/>
+                    <a:cs typeface="M+ 1p light" panose="020B0402020203020204" pitchFamily="50" charset="-128"/>
+                  </a:rPr>
+                  <a:t>を</a:t>
+                </a:r>
+                <a:r>
+                  <a:rPr lang="ja-JP" altLang="en-US" dirty="0">
+                    <a:solidFill>
+                      <a:srgbClr val="FF0000"/>
+                    </a:solidFill>
+                    <a:latin typeface="M+ 1p light" panose="020B0402020203020204" pitchFamily="50" charset="-128"/>
+                    <a:ea typeface="M+ 1p light" panose="020B0402020203020204" pitchFamily="50" charset="-128"/>
+                    <a:cs typeface="M+ 1p light" panose="020B0402020203020204" pitchFamily="50" charset="-128"/>
+                  </a:rPr>
+                  <a:t>広義円</a:t>
+                </a:r>
+                <a:r>
+                  <a:rPr lang="ja-JP" altLang="en-US" dirty="0">
+                    <a:latin typeface="M+ 1p light" panose="020B0402020203020204" pitchFamily="50" charset="-128"/>
+                    <a:ea typeface="M+ 1p light" panose="020B0402020203020204" pitchFamily="50" charset="-128"/>
+                    <a:cs typeface="M+ 1p light" panose="020B0402020203020204" pitchFamily="50" charset="-128"/>
+                  </a:rPr>
+                  <a:t>に移す</a:t>
                 </a:r>
                 <a:r>
                   <a:rPr lang="en-US" altLang="ja-JP" dirty="0">
@@ -7404,6 +7797,9 @@
                   <m:oMath xmlns:m="http://schemas.openxmlformats.org/officeDocument/2006/math">
                     <m:r>
                       <a:rPr lang="ja-JP" altLang="en-US" i="1" dirty="0" smtClean="0">
+                        <a:solidFill>
+                          <a:schemeClr val="accent5"/>
+                        </a:solidFill>
                         <a:latin typeface="Cambria Math" panose="02040503050406030204" pitchFamily="18" charset="0"/>
                         <a:ea typeface="M+ 1p light" panose="020B0402020203020204" pitchFamily="50" charset="-128"/>
                         <a:cs typeface="M+ 1p light" panose="020B0402020203020204" pitchFamily="50" charset="-128"/>
@@ -7412,6 +7808,9 @@
                     </m:r>
                     <m:r>
                       <a:rPr lang="en-US" altLang="ja-JP" i="1" dirty="0">
+                        <a:solidFill>
+                          <a:schemeClr val="accent5"/>
+                        </a:solidFill>
                         <a:latin typeface="Cambria Math" panose="02040503050406030204" pitchFamily="18" charset="0"/>
                         <a:ea typeface="M+ 1p light" panose="020B0402020203020204" pitchFamily="50" charset="-128"/>
                         <a:cs typeface="M+ 1p light" panose="020B0402020203020204" pitchFamily="50" charset="-128"/>
@@ -7420,6 +7819,9 @@
                     </m:r>
                     <m:r>
                       <a:rPr lang="en-US" altLang="ja-JP" i="1" dirty="0">
+                        <a:solidFill>
+                          <a:schemeClr val="accent5"/>
+                        </a:solidFill>
                         <a:latin typeface="Cambria Math" panose="02040503050406030204" pitchFamily="18" charset="0"/>
                         <a:ea typeface="M+ 1p light" panose="020B0402020203020204" pitchFamily="50" charset="-128"/>
                         <a:cs typeface="M+ 1p light" panose="020B0402020203020204" pitchFamily="50" charset="-128"/>
@@ -7428,6 +7830,9 @@
                     </m:r>
                     <m:r>
                       <a:rPr lang="en-US" altLang="ja-JP" i="1" dirty="0">
+                        <a:solidFill>
+                          <a:schemeClr val="accent5"/>
+                        </a:solidFill>
                         <a:latin typeface="Cambria Math" panose="02040503050406030204" pitchFamily="18" charset="0"/>
                         <a:ea typeface="M+ 1p light" panose="020B0402020203020204" pitchFamily="50" charset="-128"/>
                         <a:cs typeface="M+ 1p light" panose="020B0402020203020204" pitchFamily="50" charset="-128"/>
@@ -7454,11 +7859,22 @@
                 </a:r>
                 <a:r>
                   <a:rPr lang="ja-JP" altLang="en-US" dirty="0">
+                    <a:solidFill>
+                      <a:srgbClr val="FF0000"/>
+                    </a:solidFill>
                     <a:latin typeface="M+ 1p light" panose="020B0402020203020204" pitchFamily="50" charset="-128"/>
                     <a:ea typeface="M+ 1p light" panose="020B0402020203020204" pitchFamily="50" charset="-128"/>
                     <a:cs typeface="M+ 1p light" panose="020B0402020203020204" pitchFamily="50" charset="-128"/>
                   </a:rPr>
-                  <a:t>複比を保存する</a:t>
+                  <a:t>複比</a:t>
+                </a:r>
+                <a:r>
+                  <a:rPr lang="ja-JP" altLang="en-US" dirty="0">
+                    <a:latin typeface="M+ 1p light" panose="020B0402020203020204" pitchFamily="50" charset="-128"/>
+                    <a:ea typeface="M+ 1p light" panose="020B0402020203020204" pitchFamily="50" charset="-128"/>
+                    <a:cs typeface="M+ 1p light" panose="020B0402020203020204" pitchFamily="50" charset="-128"/>
+                  </a:rPr>
+                  <a:t>を保存する</a:t>
                 </a:r>
                 <a:r>
                   <a:rPr lang="en-US" altLang="ja-JP" dirty="0">
@@ -7503,7 +7919,7 @@
             </p:txBody>
           </p:sp>
         </mc:Choice>
-        <mc:Fallback>
+        <mc:Fallback xmlns="">
           <p:sp>
             <p:nvSpPr>
               <p:cNvPr id="61" name="Google Shape;61;p14"/>
@@ -9130,8 +9546,8 @@
           </a:p>
         </p:txBody>
       </p:sp>
-      <mc:AlternateContent xmlns:mc="http://schemas.openxmlformats.org/markup-compatibility/2006">
-        <mc:Choice xmlns:a14="http://schemas.microsoft.com/office/drawing/2010/main" Requires="a14">
+      <mc:AlternateContent xmlns:mc="http://schemas.openxmlformats.org/markup-compatibility/2006" xmlns:a14="http://schemas.microsoft.com/office/drawing/2010/main">
+        <mc:Choice Requires="a14">
           <p:sp>
             <p:nvSpPr>
               <p:cNvPr id="61" name="Google Shape;61;p14"/>
@@ -9898,7 +10314,7 @@
             </p:txBody>
           </p:sp>
         </mc:Choice>
-        <mc:Fallback>
+        <mc:Fallback xmlns="">
           <p:sp>
             <p:nvSpPr>
               <p:cNvPr id="61" name="Google Shape;61;p14"/>
@@ -13482,6 +13898,3226 @@
     <p:bldLst>
       <p:bldP spid="4" grpId="0" animBg="1"/>
     </p:bldLst>
+  </p:timing>
+</p:sld>
+</file>
+
+<file path=ppt/slides/slide8.xml><?xml version="1.0" encoding="utf-8"?>
+<p:sld xmlns:a="http://schemas.openxmlformats.org/drawingml/2006/main" xmlns:r="http://schemas.openxmlformats.org/officeDocument/2006/relationships" xmlns:p="http://schemas.openxmlformats.org/presentationml/2006/main">
+  <p:cSld>
+    <p:spTree>
+      <p:nvGrpSpPr>
+        <p:cNvPr id="1" name="Shape 59"/>
+        <p:cNvGrpSpPr/>
+        <p:nvPr/>
+      </p:nvGrpSpPr>
+      <p:grpSpPr>
+        <a:xfrm>
+          <a:off x="0" y="0"/>
+          <a:ext cx="0" cy="0"/>
+          <a:chOff x="0" y="0"/>
+          <a:chExt cx="0" cy="0"/>
+        </a:xfrm>
+      </p:grpSpPr>
+      <p:sp>
+        <p:nvSpPr>
+          <p:cNvPr id="10" name="二等辺三角形 9">
+            <a:extLst>
+              <a:ext uri="{FF2B5EF4-FFF2-40B4-BE49-F238E27FC236}">
+                <a16:creationId xmlns:a16="http://schemas.microsoft.com/office/drawing/2014/main" id="{5DBF3215-13AD-4FE7-AE3B-208FB74012AE}"/>
+              </a:ext>
+            </a:extLst>
+          </p:cNvPr>
+          <p:cNvSpPr/>
+          <p:nvPr/>
+        </p:nvSpPr>
+        <p:spPr>
+          <a:xfrm rot="16200000">
+            <a:off x="4285650" y="-4285650"/>
+            <a:ext cx="572701" cy="9144002"/>
+          </a:xfrm>
+          <a:prstGeom prst="triangle">
+            <a:avLst>
+              <a:gd name="adj" fmla="val 100000"/>
+            </a:avLst>
+          </a:prstGeom>
+          <a:solidFill>
+            <a:srgbClr val="FFF4E7">
+              <a:alpha val="80000"/>
+            </a:srgbClr>
+          </a:solidFill>
+          <a:ln>
+            <a:noFill/>
+          </a:ln>
+        </p:spPr>
+        <p:style>
+          <a:lnRef idx="2">
+            <a:schemeClr val="accent1">
+              <a:shade val="50000"/>
+            </a:schemeClr>
+          </a:lnRef>
+          <a:fillRef idx="1">
+            <a:schemeClr val="accent1"/>
+          </a:fillRef>
+          <a:effectRef idx="0">
+            <a:schemeClr val="accent1"/>
+          </a:effectRef>
+          <a:fontRef idx="minor">
+            <a:schemeClr val="lt1"/>
+          </a:fontRef>
+        </p:style>
+        <p:txBody>
+          <a:bodyPr rtlCol="0" anchor="ctr"/>
+          <a:lstStyle/>
+          <a:p>
+            <a:pPr algn="ctr"/>
+            <a:endParaRPr kumimoji="1" lang="ja-JP" altLang="en-US" dirty="0"/>
+          </a:p>
+        </p:txBody>
+      </p:sp>
+      <p:sp>
+        <p:nvSpPr>
+          <p:cNvPr id="11" name="正方形/長方形 10">
+            <a:extLst>
+              <a:ext uri="{FF2B5EF4-FFF2-40B4-BE49-F238E27FC236}">
+                <a16:creationId xmlns:a16="http://schemas.microsoft.com/office/drawing/2014/main" id="{FBC25266-4EBA-4EB8-A354-624A1F8420E4}"/>
+              </a:ext>
+            </a:extLst>
+          </p:cNvPr>
+          <p:cNvSpPr/>
+          <p:nvPr/>
+        </p:nvSpPr>
+        <p:spPr>
+          <a:xfrm>
+            <a:off x="1" y="4568873"/>
+            <a:ext cx="9143999" cy="572702"/>
+          </a:xfrm>
+          <a:prstGeom prst="rect">
+            <a:avLst/>
+          </a:prstGeom>
+          <a:solidFill>
+            <a:srgbClr val="FFF5EB"/>
+          </a:solidFill>
+          <a:ln>
+            <a:noFill/>
+          </a:ln>
+        </p:spPr>
+        <p:style>
+          <a:lnRef idx="2">
+            <a:schemeClr val="accent1">
+              <a:shade val="50000"/>
+            </a:schemeClr>
+          </a:lnRef>
+          <a:fillRef idx="1">
+            <a:schemeClr val="accent1"/>
+          </a:fillRef>
+          <a:effectRef idx="0">
+            <a:schemeClr val="accent1"/>
+          </a:effectRef>
+          <a:fontRef idx="minor">
+            <a:schemeClr val="lt1"/>
+          </a:fontRef>
+        </p:style>
+        <p:txBody>
+          <a:bodyPr rtlCol="0" anchor="ctr"/>
+          <a:lstStyle/>
+          <a:p>
+            <a:pPr algn="ctr"/>
+            <a:endParaRPr kumimoji="1" lang="ja-JP" altLang="en-US" dirty="0"/>
+          </a:p>
+        </p:txBody>
+      </p:sp>
+      <p:pic>
+        <p:nvPicPr>
+          <p:cNvPr id="1026" name="Picture 2" descr="ããã¯ãã±å ä¸»äººå+¬ãã®ç»åæ¤ç´¢çµæ">
+            <a:extLst>
+              <a:ext uri="{FF2B5EF4-FFF2-40B4-BE49-F238E27FC236}">
+                <a16:creationId xmlns:a16="http://schemas.microsoft.com/office/drawing/2014/main" id="{B3348C27-15A3-454B-B667-BA5AAADA1B42}"/>
+              </a:ext>
+            </a:extLst>
+          </p:cNvPr>
+          <p:cNvPicPr>
+            <a:picLocks noChangeAspect="1" noChangeArrowheads="1"/>
+          </p:cNvPicPr>
+          <p:nvPr/>
+        </p:nvPicPr>
+        <p:blipFill>
+          <a:blip r:embed="rId3">
+            <a:alphaModFix amt="50000"/>
+            <a:extLst>
+              <a:ext uri="{28A0092B-C50C-407E-A947-70E740481C1C}">
+                <a14:useLocalDpi xmlns:a14="http://schemas.microsoft.com/office/drawing/2010/main" val="0"/>
+              </a:ext>
+            </a:extLst>
+          </a:blip>
+          <a:srcRect/>
+          <a:stretch>
+            <a:fillRect/>
+          </a:stretch>
+        </p:blipFill>
+        <p:spPr bwMode="auto">
+          <a:xfrm>
+            <a:off x="133738" y="4577558"/>
+            <a:ext cx="555332" cy="555332"/>
+          </a:xfrm>
+          <a:prstGeom prst="rect">
+            <a:avLst/>
+          </a:prstGeom>
+          <a:noFill/>
+          <a:extLst>
+            <a:ext uri="{909E8E84-426E-40DD-AFC4-6F175D3DCCD1}">
+              <a14:hiddenFill xmlns:a14="http://schemas.microsoft.com/office/drawing/2010/main">
+                <a:solidFill>
+                  <a:srgbClr val="FFFFFF"/>
+                </a:solidFill>
+              </a14:hiddenFill>
+            </a:ext>
+          </a:extLst>
+        </p:spPr>
+      </p:pic>
+      <p:sp>
+        <p:nvSpPr>
+          <p:cNvPr id="4" name="吹き出し: 四角形 3">
+            <a:extLst>
+              <a:ext uri="{FF2B5EF4-FFF2-40B4-BE49-F238E27FC236}">
+                <a16:creationId xmlns:a16="http://schemas.microsoft.com/office/drawing/2014/main" id="{9E66183E-78B4-4767-A511-09039646B1AC}"/>
+              </a:ext>
+            </a:extLst>
+          </p:cNvPr>
+          <p:cNvSpPr/>
+          <p:nvPr/>
+        </p:nvSpPr>
+        <p:spPr>
+          <a:xfrm>
+            <a:off x="822807" y="4612297"/>
+            <a:ext cx="7596515" cy="491547"/>
+          </a:xfrm>
+          <a:prstGeom prst="wedgeRectCallout">
+            <a:avLst>
+              <a:gd name="adj1" fmla="val -51006"/>
+              <a:gd name="adj2" fmla="val 20927"/>
+            </a:avLst>
+          </a:prstGeom>
+          <a:solidFill>
+            <a:srgbClr val="EEEEEE">
+              <a:alpha val="50196"/>
+            </a:srgbClr>
+          </a:solidFill>
+          <a:ln w="6350">
+            <a:solidFill>
+              <a:schemeClr val="bg1">
+                <a:lumMod val="75000"/>
+              </a:schemeClr>
+            </a:solidFill>
+          </a:ln>
+        </p:spPr>
+        <p:style>
+          <a:lnRef idx="2">
+            <a:schemeClr val="accent1">
+              <a:shade val="50000"/>
+            </a:schemeClr>
+          </a:lnRef>
+          <a:fillRef idx="1">
+            <a:schemeClr val="accent1"/>
+          </a:fillRef>
+          <a:effectRef idx="0">
+            <a:schemeClr val="accent1"/>
+          </a:effectRef>
+          <a:fontRef idx="minor">
+            <a:schemeClr val="lt1"/>
+          </a:fontRef>
+        </p:style>
+        <p:txBody>
+          <a:bodyPr rtlCol="0" anchor="ctr"/>
+          <a:lstStyle/>
+          <a:p>
+            <a:pPr algn="ctr"/>
+            <a:r>
+              <a:rPr kumimoji="1" lang="ja-JP" altLang="en-US" dirty="0">
+                <a:solidFill>
+                  <a:schemeClr val="bg1">
+                    <a:lumMod val="50000"/>
+                  </a:schemeClr>
+                </a:solidFill>
+                <a:latin typeface="M+ 1p light" panose="020B0402020203020204" pitchFamily="50" charset="-128"/>
+                <a:ea typeface="M+ 1p light" panose="020B0402020203020204" pitchFamily="50" charset="-128"/>
+                <a:cs typeface="M+ 1p light" panose="020B0402020203020204" pitchFamily="50" charset="-128"/>
+              </a:rPr>
+              <a:t>ちなみに</a:t>
+            </a:r>
+            <a:r>
+              <a:rPr kumimoji="1" lang="en-US" altLang="ja-JP" dirty="0">
+                <a:solidFill>
+                  <a:schemeClr val="bg1">
+                    <a:lumMod val="50000"/>
+                  </a:schemeClr>
+                </a:solidFill>
+                <a:latin typeface="M+ 1p light" panose="020B0402020203020204" pitchFamily="50" charset="-128"/>
+                <a:ea typeface="M+ 1p light" panose="020B0402020203020204" pitchFamily="50" charset="-128"/>
+                <a:cs typeface="M+ 1p light" panose="020B0402020203020204" pitchFamily="50" charset="-128"/>
+              </a:rPr>
+              <a:t>, </a:t>
+            </a:r>
+            <a:r>
+              <a:rPr kumimoji="1" lang="ja-JP" altLang="en-US" dirty="0">
+                <a:solidFill>
+                  <a:schemeClr val="bg1">
+                    <a:lumMod val="50000"/>
+                  </a:schemeClr>
+                </a:solidFill>
+                <a:latin typeface="M+ 1p light" panose="020B0402020203020204" pitchFamily="50" charset="-128"/>
+                <a:ea typeface="M+ 1p light" panose="020B0402020203020204" pitchFamily="50" charset="-128"/>
+                <a:cs typeface="M+ 1p light" panose="020B0402020203020204" pitchFamily="50" charset="-128"/>
+              </a:rPr>
+              <a:t>クライン幾何は等質空間の性質を調べる</a:t>
+            </a:r>
+            <a:r>
+              <a:rPr kumimoji="1" lang="en-US" altLang="ja-JP" dirty="0">
+                <a:solidFill>
+                  <a:schemeClr val="bg1">
+                    <a:lumMod val="50000"/>
+                  </a:schemeClr>
+                </a:solidFill>
+                <a:latin typeface="M+ 1p light" panose="020B0402020203020204" pitchFamily="50" charset="-128"/>
+                <a:ea typeface="M+ 1p light" panose="020B0402020203020204" pitchFamily="50" charset="-128"/>
+                <a:cs typeface="M+ 1p light" panose="020B0402020203020204" pitchFamily="50" charset="-128"/>
+              </a:rPr>
+              <a:t>, </a:t>
+            </a:r>
+            <a:r>
+              <a:rPr kumimoji="1" lang="ja-JP" altLang="en-US" dirty="0">
+                <a:solidFill>
+                  <a:schemeClr val="bg1">
+                    <a:lumMod val="50000"/>
+                  </a:schemeClr>
+                </a:solidFill>
+                <a:latin typeface="M+ 1p light" panose="020B0402020203020204" pitchFamily="50" charset="-128"/>
+                <a:ea typeface="M+ 1p light" panose="020B0402020203020204" pitchFamily="50" charset="-128"/>
+                <a:cs typeface="M+ 1p light" panose="020B0402020203020204" pitchFamily="50" charset="-128"/>
+              </a:rPr>
+              <a:t>ともいえるよ</a:t>
+            </a:r>
+            <a:endParaRPr kumimoji="1" lang="en-US" altLang="ja-JP" dirty="0">
+              <a:solidFill>
+                <a:schemeClr val="bg1">
+                  <a:lumMod val="50000"/>
+                </a:schemeClr>
+              </a:solidFill>
+              <a:latin typeface="M+ 1p light" panose="020B0402020203020204" pitchFamily="50" charset="-128"/>
+              <a:ea typeface="M+ 1p light" panose="020B0402020203020204" pitchFamily="50" charset="-128"/>
+              <a:cs typeface="M+ 1p light" panose="020B0402020203020204" pitchFamily="50" charset="-128"/>
+            </a:endParaRPr>
+          </a:p>
+          <a:p>
+            <a:pPr algn="ctr"/>
+            <a:r>
+              <a:rPr kumimoji="1" lang="ja-JP" altLang="en-US" dirty="0">
+                <a:solidFill>
+                  <a:schemeClr val="bg1">
+                    <a:lumMod val="50000"/>
+                  </a:schemeClr>
+                </a:solidFill>
+                <a:latin typeface="M+ 1p light" panose="020B0402020203020204" pitchFamily="50" charset="-128"/>
+                <a:ea typeface="M+ 1p light" panose="020B0402020203020204" pitchFamily="50" charset="-128"/>
+                <a:cs typeface="M+ 1p light" panose="020B0402020203020204" pitchFamily="50" charset="-128"/>
+              </a:rPr>
+              <a:t>クライン幾何は現代幾何の中心概念の一つだけど</a:t>
+            </a:r>
+            <a:r>
+              <a:rPr kumimoji="1" lang="en-US" altLang="ja-JP" dirty="0">
+                <a:solidFill>
+                  <a:schemeClr val="bg1">
+                    <a:lumMod val="50000"/>
+                  </a:schemeClr>
+                </a:solidFill>
+                <a:latin typeface="M+ 1p light" panose="020B0402020203020204" pitchFamily="50" charset="-128"/>
+                <a:ea typeface="M+ 1p light" panose="020B0402020203020204" pitchFamily="50" charset="-128"/>
+                <a:cs typeface="M+ 1p light" panose="020B0402020203020204" pitchFamily="50" charset="-128"/>
+              </a:rPr>
+              <a:t>, </a:t>
+            </a:r>
+            <a:r>
+              <a:rPr kumimoji="1" lang="ja-JP" altLang="en-US" dirty="0">
+                <a:solidFill>
+                  <a:schemeClr val="bg1">
+                    <a:lumMod val="50000"/>
+                  </a:schemeClr>
+                </a:solidFill>
+                <a:latin typeface="M+ 1p light" panose="020B0402020203020204" pitchFamily="50" charset="-128"/>
+                <a:ea typeface="M+ 1p light" panose="020B0402020203020204" pitchFamily="50" charset="-128"/>
+                <a:cs typeface="M+ 1p light" panose="020B0402020203020204" pitchFamily="50" charset="-128"/>
+              </a:rPr>
+              <a:t>リーマン幾何など成立してない分野もある</a:t>
+            </a:r>
+            <a:endParaRPr kumimoji="1" lang="en-US" altLang="ja-JP" dirty="0">
+              <a:solidFill>
+                <a:schemeClr val="bg1">
+                  <a:lumMod val="50000"/>
+                </a:schemeClr>
+              </a:solidFill>
+              <a:latin typeface="M+ 1p light" panose="020B0402020203020204" pitchFamily="50" charset="-128"/>
+              <a:ea typeface="M+ 1p light" panose="020B0402020203020204" pitchFamily="50" charset="-128"/>
+              <a:cs typeface="M+ 1p light" panose="020B0402020203020204" pitchFamily="50" charset="-128"/>
+            </a:endParaRPr>
+          </a:p>
+        </p:txBody>
+      </p:sp>
+      <p:sp>
+        <p:nvSpPr>
+          <p:cNvPr id="60" name="Google Shape;60;p14"/>
+          <p:cNvSpPr txBox="1">
+            <a:spLocks noGrp="1"/>
+          </p:cNvSpPr>
+          <p:nvPr>
+            <p:ph type="title"/>
+          </p:nvPr>
+        </p:nvSpPr>
+        <p:spPr>
+          <a:xfrm>
+            <a:off x="311700" y="445025"/>
+            <a:ext cx="8520600" cy="572700"/>
+          </a:xfrm>
+          <a:prstGeom prst="rect">
+            <a:avLst/>
+          </a:prstGeom>
+        </p:spPr>
+        <p:txBody>
+          <a:bodyPr spcFirstLastPara="1" wrap="square" lIns="91425" tIns="91425" rIns="91425" bIns="91425" anchor="t" anchorCtr="0">
+            <a:noAutofit/>
+          </a:bodyPr>
+          <a:lstStyle/>
+          <a:p>
+            <a:pPr lvl="0"/>
+            <a:r>
+              <a:rPr lang="ja-JP" altLang="en-US" dirty="0">
+                <a:solidFill>
+                  <a:schemeClr val="tx1">
+                    <a:lumMod val="75000"/>
+                    <a:lumOff val="25000"/>
+                  </a:schemeClr>
+                </a:solidFill>
+                <a:latin typeface="M+ 1p" panose="020B0503020203020204" pitchFamily="50" charset="-128"/>
+                <a:ea typeface="M+ 1p" panose="020B0503020203020204" pitchFamily="50" charset="-128"/>
+                <a:cs typeface="M+ 1p" panose="020B0503020203020204" pitchFamily="50" charset="-128"/>
+              </a:rPr>
+              <a:t>一回目の復習</a:t>
+            </a:r>
+            <a:endParaRPr dirty="0">
+              <a:solidFill>
+                <a:schemeClr val="tx1">
+                  <a:lumMod val="75000"/>
+                  <a:lumOff val="25000"/>
+                </a:schemeClr>
+              </a:solidFill>
+              <a:latin typeface="M+ 1p" panose="020B0503020203020204" pitchFamily="50" charset="-128"/>
+              <a:ea typeface="M+ 1p" panose="020B0503020203020204" pitchFamily="50" charset="-128"/>
+              <a:cs typeface="M+ 1p" panose="020B0503020203020204" pitchFamily="50" charset="-128"/>
+            </a:endParaRPr>
+          </a:p>
+        </p:txBody>
+      </p:sp>
+      <p:sp>
+        <p:nvSpPr>
+          <p:cNvPr id="61" name="Google Shape;61;p14"/>
+          <p:cNvSpPr txBox="1">
+            <a:spLocks noGrp="1"/>
+          </p:cNvSpPr>
+          <p:nvPr>
+            <p:ph type="body" idx="1"/>
+          </p:nvPr>
+        </p:nvSpPr>
+        <p:spPr>
+          <a:xfrm>
+            <a:off x="311700" y="1152475"/>
+            <a:ext cx="8520600" cy="3416400"/>
+          </a:xfrm>
+          <a:prstGeom prst="rect">
+            <a:avLst/>
+          </a:prstGeom>
+        </p:spPr>
+        <p:txBody>
+          <a:bodyPr spcFirstLastPara="1" wrap="square" lIns="91425" tIns="91425" rIns="91425" bIns="91425" anchor="t" anchorCtr="0">
+            <a:noAutofit/>
+          </a:bodyPr>
+          <a:lstStyle/>
+          <a:p>
+            <a:pPr marL="0" lvl="0" indent="0">
+              <a:buNone/>
+            </a:pPr>
+            <a:r>
+              <a:rPr lang="ja-JP" altLang="en-US" dirty="0">
+                <a:latin typeface="M+ 1p light" panose="020B0402020203020204" pitchFamily="50" charset="-128"/>
+                <a:ea typeface="M+ 1p light" panose="020B0402020203020204" pitchFamily="50" charset="-128"/>
+                <a:cs typeface="M+ 1p light" panose="020B0402020203020204" pitchFamily="50" charset="-128"/>
+              </a:rPr>
+              <a:t>第一回の内容は</a:t>
+            </a:r>
+            <a:r>
+              <a:rPr lang="en-US" altLang="ja-JP" dirty="0">
+                <a:latin typeface="M+ 1p light" panose="020B0402020203020204" pitchFamily="50" charset="-128"/>
+                <a:ea typeface="M+ 1p light" panose="020B0402020203020204" pitchFamily="50" charset="-128"/>
+                <a:cs typeface="M+ 1p light" panose="020B0402020203020204" pitchFamily="50" charset="-128"/>
+              </a:rPr>
+              <a:t>, </a:t>
+            </a:r>
+            <a:r>
+              <a:rPr lang="ja-JP" altLang="en-US" dirty="0">
+                <a:latin typeface="M+ 1p light" panose="020B0402020203020204" pitchFamily="50" charset="-128"/>
+                <a:ea typeface="M+ 1p light" panose="020B0402020203020204" pitchFamily="50" charset="-128"/>
+                <a:cs typeface="M+ 1p light" panose="020B0402020203020204" pitchFamily="50" charset="-128"/>
+              </a:rPr>
+              <a:t>ユークリッド幾何学を</a:t>
+            </a:r>
+            <a:r>
+              <a:rPr lang="en-US" altLang="ja-JP" dirty="0">
+                <a:latin typeface="M+ 1p light" panose="020B0402020203020204" pitchFamily="50" charset="-128"/>
+                <a:ea typeface="M+ 1p light" panose="020B0402020203020204" pitchFamily="50" charset="-128"/>
+                <a:cs typeface="M+ 1p light" panose="020B0402020203020204" pitchFamily="50" charset="-128"/>
+              </a:rPr>
+              <a:t>, </a:t>
+            </a:r>
+            <a:r>
+              <a:rPr lang="ja-JP" altLang="en-US" dirty="0">
+                <a:latin typeface="M+ 1p light" panose="020B0402020203020204" pitchFamily="50" charset="-128"/>
+                <a:ea typeface="M+ 1p light" panose="020B0402020203020204" pitchFamily="50" charset="-128"/>
+                <a:cs typeface="M+ 1p light" panose="020B0402020203020204" pitchFamily="50" charset="-128"/>
+              </a:rPr>
+              <a:t>現代幾何の根底概念の一つである</a:t>
+            </a:r>
+            <a:r>
+              <a:rPr lang="en-US" altLang="ja-JP" dirty="0">
+                <a:latin typeface="M+ 1p light" panose="020B0402020203020204" pitchFamily="50" charset="-128"/>
+                <a:ea typeface="M+ 1p light" panose="020B0402020203020204" pitchFamily="50" charset="-128"/>
+                <a:cs typeface="M+ 1p light" panose="020B0402020203020204" pitchFamily="50" charset="-128"/>
+              </a:rPr>
+              <a:t>, </a:t>
+            </a:r>
+            <a:r>
+              <a:rPr lang="ja-JP" altLang="en-US" dirty="0">
+                <a:latin typeface="M+ 1p light" panose="020B0402020203020204" pitchFamily="50" charset="-128"/>
+                <a:ea typeface="M+ 1p light" panose="020B0402020203020204" pitchFamily="50" charset="-128"/>
+                <a:cs typeface="M+ 1p light" panose="020B0402020203020204" pitchFamily="50" charset="-128"/>
+              </a:rPr>
+              <a:t>クライン流のとらえ方</a:t>
+            </a:r>
+            <a:r>
+              <a:rPr lang="en-US" altLang="ja-JP" dirty="0">
+                <a:latin typeface="M+ 1p light" panose="020B0402020203020204" pitchFamily="50" charset="-128"/>
+                <a:ea typeface="M+ 1p light" panose="020B0402020203020204" pitchFamily="50" charset="-128"/>
+                <a:cs typeface="M+ 1p light" panose="020B0402020203020204" pitchFamily="50" charset="-128"/>
+              </a:rPr>
+              <a:t>(</a:t>
+            </a:r>
+            <a:r>
+              <a:rPr lang="ja-JP" altLang="en-US" dirty="0">
+                <a:latin typeface="M+ 1p light" panose="020B0402020203020204" pitchFamily="50" charset="-128"/>
+                <a:ea typeface="M+ 1p light" panose="020B0402020203020204" pitchFamily="50" charset="-128"/>
+                <a:cs typeface="M+ 1p light" panose="020B0402020203020204" pitchFamily="50" charset="-128"/>
+              </a:rPr>
+              <a:t>クライン幾何</a:t>
+            </a:r>
+            <a:r>
+              <a:rPr lang="en-US" altLang="ja-JP" dirty="0">
+                <a:latin typeface="M+ 1p light" panose="020B0402020203020204" pitchFamily="50" charset="-128"/>
+                <a:ea typeface="M+ 1p light" panose="020B0402020203020204" pitchFamily="50" charset="-128"/>
+                <a:cs typeface="M+ 1p light" panose="020B0402020203020204" pitchFamily="50" charset="-128"/>
+              </a:rPr>
+              <a:t>)</a:t>
+            </a:r>
+            <a:r>
+              <a:rPr lang="ja-JP" altLang="en-US" dirty="0">
+                <a:latin typeface="M+ 1p light" panose="020B0402020203020204" pitchFamily="50" charset="-128"/>
+                <a:ea typeface="M+ 1p light" panose="020B0402020203020204" pitchFamily="50" charset="-128"/>
+                <a:cs typeface="M+ 1p light" panose="020B0402020203020204" pitchFamily="50" charset="-128"/>
+              </a:rPr>
+              <a:t>から</a:t>
+            </a:r>
+            <a:r>
+              <a:rPr lang="en-US" altLang="ja-JP" dirty="0">
+                <a:latin typeface="M+ 1p light" panose="020B0402020203020204" pitchFamily="50" charset="-128"/>
+                <a:ea typeface="M+ 1p light" panose="020B0402020203020204" pitchFamily="50" charset="-128"/>
+                <a:cs typeface="M+ 1p light" panose="020B0402020203020204" pitchFamily="50" charset="-128"/>
+              </a:rPr>
+              <a:t>, </a:t>
+            </a:r>
+            <a:r>
+              <a:rPr lang="ja-JP" altLang="en-US" dirty="0">
+                <a:latin typeface="M+ 1p light" panose="020B0402020203020204" pitchFamily="50" charset="-128"/>
+                <a:ea typeface="M+ 1p light" panose="020B0402020203020204" pitchFamily="50" charset="-128"/>
+                <a:cs typeface="M+ 1p light" panose="020B0402020203020204" pitchFamily="50" charset="-128"/>
+              </a:rPr>
+              <a:t>表現してみようという物でした</a:t>
+            </a:r>
+            <a:r>
+              <a:rPr lang="en-US" altLang="ja-JP" dirty="0">
+                <a:latin typeface="M+ 1p light" panose="020B0402020203020204" pitchFamily="50" charset="-128"/>
+                <a:ea typeface="M+ 1p light" panose="020B0402020203020204" pitchFamily="50" charset="-128"/>
+                <a:cs typeface="M+ 1p light" panose="020B0402020203020204" pitchFamily="50" charset="-128"/>
+              </a:rPr>
+              <a:t>.</a:t>
+            </a:r>
+          </a:p>
+          <a:p>
+            <a:pPr marL="0" lvl="0" indent="0">
+              <a:buNone/>
+            </a:pPr>
+            <a:endParaRPr lang="en-US" altLang="ja-JP" dirty="0">
+              <a:latin typeface="M+ 1p light" panose="020B0402020203020204" pitchFamily="50" charset="-128"/>
+              <a:ea typeface="M+ 1p light" panose="020B0402020203020204" pitchFamily="50" charset="-128"/>
+              <a:cs typeface="M+ 1p light" panose="020B0402020203020204" pitchFamily="50" charset="-128"/>
+            </a:endParaRPr>
+          </a:p>
+          <a:p>
+            <a:pPr marL="0" lvl="0" indent="0">
+              <a:buNone/>
+            </a:pPr>
+            <a:r>
+              <a:rPr lang="en-US" altLang="ja-JP" dirty="0">
+                <a:latin typeface="M+ 1p light" panose="020B0402020203020204" pitchFamily="50" charset="-128"/>
+                <a:ea typeface="M+ 1p light" panose="020B0402020203020204" pitchFamily="50" charset="-128"/>
+                <a:cs typeface="M+ 1p light" panose="020B0402020203020204" pitchFamily="50" charset="-128"/>
+              </a:rPr>
+              <a:t>Q. </a:t>
+            </a:r>
+            <a:r>
+              <a:rPr lang="ja-JP" altLang="en-US" dirty="0">
+                <a:latin typeface="M+ 1p light" panose="020B0402020203020204" pitchFamily="50" charset="-128"/>
+                <a:ea typeface="M+ 1p light" panose="020B0402020203020204" pitchFamily="50" charset="-128"/>
+                <a:cs typeface="M+ 1p light" panose="020B0402020203020204" pitchFamily="50" charset="-128"/>
+              </a:rPr>
+              <a:t>クライン幾何とは</a:t>
+            </a:r>
+            <a:r>
+              <a:rPr lang="en-US" altLang="ja-JP" dirty="0">
+                <a:latin typeface="M+ 1p light" panose="020B0402020203020204" pitchFamily="50" charset="-128"/>
+                <a:ea typeface="M+ 1p light" panose="020B0402020203020204" pitchFamily="50" charset="-128"/>
+                <a:cs typeface="M+ 1p light" panose="020B0402020203020204" pitchFamily="50" charset="-128"/>
+              </a:rPr>
+              <a:t>?</a:t>
+            </a:r>
+          </a:p>
+          <a:p>
+            <a:pPr marL="0" lvl="0" indent="0">
+              <a:buNone/>
+            </a:pPr>
+            <a:r>
+              <a:rPr lang="ja-JP" altLang="en-US" dirty="0">
+                <a:latin typeface="M+ 1p light" panose="020B0402020203020204" pitchFamily="50" charset="-128"/>
+                <a:ea typeface="M+ 1p light" panose="020B0402020203020204" pitchFamily="50" charset="-128"/>
+                <a:cs typeface="M+ 1p light" panose="020B0402020203020204" pitchFamily="50" charset="-128"/>
+              </a:rPr>
+              <a:t>幾何学を</a:t>
+            </a:r>
+            <a:r>
+              <a:rPr lang="en-US" altLang="ja-JP" dirty="0">
+                <a:latin typeface="M+ 1p light" panose="020B0402020203020204" pitchFamily="50" charset="-128"/>
+                <a:ea typeface="M+ 1p light" panose="020B0402020203020204" pitchFamily="50" charset="-128"/>
+                <a:cs typeface="M+ 1p light" panose="020B0402020203020204" pitchFamily="50" charset="-128"/>
+              </a:rPr>
+              <a:t>, </a:t>
+            </a:r>
+            <a:r>
+              <a:rPr lang="ja-JP" altLang="en-US" dirty="0">
+                <a:latin typeface="M+ 1p light" panose="020B0402020203020204" pitchFamily="50" charset="-128"/>
+                <a:ea typeface="M+ 1p light" panose="020B0402020203020204" pitchFamily="50" charset="-128"/>
+                <a:cs typeface="M+ 1p light" panose="020B0402020203020204" pitchFamily="50" charset="-128"/>
+              </a:rPr>
+              <a:t>ある集合とある群の作用を考えた時に</a:t>
+            </a:r>
+            <a:r>
+              <a:rPr lang="en-US" altLang="ja-JP" dirty="0">
+                <a:latin typeface="M+ 1p light" panose="020B0402020203020204" pitchFamily="50" charset="-128"/>
+                <a:ea typeface="M+ 1p light" panose="020B0402020203020204" pitchFamily="50" charset="-128"/>
+                <a:cs typeface="M+ 1p light" panose="020B0402020203020204" pitchFamily="50" charset="-128"/>
+              </a:rPr>
+              <a:t>, </a:t>
+            </a:r>
+            <a:r>
+              <a:rPr lang="ja-JP" altLang="en-US" dirty="0">
+                <a:latin typeface="M+ 1p light" panose="020B0402020203020204" pitchFamily="50" charset="-128"/>
+                <a:ea typeface="M+ 1p light" panose="020B0402020203020204" pitchFamily="50" charset="-128"/>
+                <a:cs typeface="M+ 1p light" panose="020B0402020203020204" pitchFamily="50" charset="-128"/>
+              </a:rPr>
+              <a:t>不変の性質について考える学問</a:t>
+            </a:r>
+            <a:endParaRPr lang="en-US" altLang="ja-JP" dirty="0">
+              <a:latin typeface="M+ 1p light" panose="020B0402020203020204" pitchFamily="50" charset="-128"/>
+              <a:ea typeface="M+ 1p light" panose="020B0402020203020204" pitchFamily="50" charset="-128"/>
+              <a:cs typeface="M+ 1p light" panose="020B0402020203020204" pitchFamily="50" charset="-128"/>
+            </a:endParaRPr>
+          </a:p>
+          <a:p>
+            <a:pPr marL="0" lvl="0" indent="0">
+              <a:buNone/>
+            </a:pPr>
+            <a:endParaRPr lang="en-US" altLang="ja-JP" dirty="0">
+              <a:latin typeface="M+ 1p light" panose="020B0402020203020204" pitchFamily="50" charset="-128"/>
+              <a:ea typeface="M+ 1p light" panose="020B0402020203020204" pitchFamily="50" charset="-128"/>
+              <a:cs typeface="M+ 1p light" panose="020B0402020203020204" pitchFamily="50" charset="-128"/>
+            </a:endParaRPr>
+          </a:p>
+          <a:p>
+            <a:pPr marL="0" lvl="0" indent="0">
+              <a:buNone/>
+            </a:pPr>
+            <a:r>
+              <a:rPr lang="en-US" altLang="ja-JP" dirty="0">
+                <a:latin typeface="M+ 1p light" panose="020B0402020203020204" pitchFamily="50" charset="-128"/>
+                <a:ea typeface="M+ 1p light" panose="020B0402020203020204" pitchFamily="50" charset="-128"/>
+                <a:cs typeface="M+ 1p light" panose="020B0402020203020204" pitchFamily="50" charset="-128"/>
+              </a:rPr>
+              <a:t>Q2.</a:t>
+            </a:r>
+            <a:r>
+              <a:rPr lang="ja-JP" altLang="en-US" dirty="0">
+                <a:latin typeface="M+ 1p light" panose="020B0402020203020204" pitchFamily="50" charset="-128"/>
+                <a:ea typeface="M+ 1p light" panose="020B0402020203020204" pitchFamily="50" charset="-128"/>
+                <a:cs typeface="M+ 1p light" panose="020B0402020203020204" pitchFamily="50" charset="-128"/>
+              </a:rPr>
+              <a:t>この観点から見てみると</a:t>
+            </a:r>
+            <a:r>
+              <a:rPr lang="en-US" altLang="ja-JP" dirty="0">
+                <a:latin typeface="M+ 1p light" panose="020B0402020203020204" pitchFamily="50" charset="-128"/>
+                <a:ea typeface="M+ 1p light" panose="020B0402020203020204" pitchFamily="50" charset="-128"/>
+                <a:cs typeface="M+ 1p light" panose="020B0402020203020204" pitchFamily="50" charset="-128"/>
+              </a:rPr>
+              <a:t>, </a:t>
+            </a:r>
+            <a:r>
+              <a:rPr lang="ja-JP" altLang="en-US" dirty="0">
+                <a:latin typeface="M+ 1p light" panose="020B0402020203020204" pitchFamily="50" charset="-128"/>
+                <a:ea typeface="M+ 1p light" panose="020B0402020203020204" pitchFamily="50" charset="-128"/>
+                <a:cs typeface="M+ 1p light" panose="020B0402020203020204" pitchFamily="50" charset="-128"/>
+              </a:rPr>
+              <a:t>ユークリッド幾何は</a:t>
+            </a:r>
+            <a:endParaRPr lang="en-US" altLang="ja-JP" dirty="0">
+              <a:latin typeface="M+ 1p light" panose="020B0402020203020204" pitchFamily="50" charset="-128"/>
+              <a:ea typeface="M+ 1p light" panose="020B0402020203020204" pitchFamily="50" charset="-128"/>
+              <a:cs typeface="M+ 1p light" panose="020B0402020203020204" pitchFamily="50" charset="-128"/>
+            </a:endParaRPr>
+          </a:p>
+          <a:p>
+            <a:pPr marL="0" lvl="0" indent="0">
+              <a:buNone/>
+            </a:pPr>
+            <a:r>
+              <a:rPr lang="ja-JP" altLang="en-US" dirty="0">
+                <a:latin typeface="M+ 1p light" panose="020B0402020203020204" pitchFamily="50" charset="-128"/>
+                <a:ea typeface="M+ 1p light" panose="020B0402020203020204" pitchFamily="50" charset="-128"/>
+                <a:cs typeface="M+ 1p light" panose="020B0402020203020204" pitchFamily="50" charset="-128"/>
+              </a:rPr>
+              <a:t>長さが変化しない性質を用いて証明や値を求める学問なので</a:t>
+            </a:r>
+            <a:r>
+              <a:rPr lang="en-US" altLang="ja-JP" dirty="0">
+                <a:latin typeface="M+ 1p light" panose="020B0402020203020204" pitchFamily="50" charset="-128"/>
+                <a:ea typeface="M+ 1p light" panose="020B0402020203020204" pitchFamily="50" charset="-128"/>
+                <a:cs typeface="M+ 1p light" panose="020B0402020203020204" pitchFamily="50" charset="-128"/>
+              </a:rPr>
+              <a:t>, </a:t>
+            </a:r>
+            <a:r>
+              <a:rPr lang="ja-JP" altLang="en-US" dirty="0">
+                <a:latin typeface="M+ 1p light" panose="020B0402020203020204" pitchFamily="50" charset="-128"/>
+                <a:ea typeface="M+ 1p light" panose="020B0402020203020204" pitchFamily="50" charset="-128"/>
+                <a:cs typeface="M+ 1p light" panose="020B0402020203020204" pitchFamily="50" charset="-128"/>
+              </a:rPr>
+              <a:t>空間と変換は</a:t>
+            </a:r>
+            <a:endParaRPr lang="en-US" altLang="ja-JP" dirty="0">
+              <a:latin typeface="M+ 1p light" panose="020B0402020203020204" pitchFamily="50" charset="-128"/>
+              <a:ea typeface="M+ 1p light" panose="020B0402020203020204" pitchFamily="50" charset="-128"/>
+              <a:cs typeface="M+ 1p light" panose="020B0402020203020204" pitchFamily="50" charset="-128"/>
+            </a:endParaRPr>
+          </a:p>
+          <a:p>
+            <a:pPr marL="285750" lvl="0" indent="-285750">
+              <a:buFontTx/>
+              <a:buChar char="-"/>
+            </a:pPr>
+            <a:r>
+              <a:rPr lang="ja-JP" altLang="en-US" dirty="0">
+                <a:latin typeface="M+ 1p light" panose="020B0402020203020204" pitchFamily="50" charset="-128"/>
+                <a:ea typeface="M+ 1p light" panose="020B0402020203020204" pitchFamily="50" charset="-128"/>
+                <a:cs typeface="M+ 1p light" panose="020B0402020203020204" pitchFamily="50" charset="-128"/>
+              </a:rPr>
+              <a:t>空間</a:t>
+            </a:r>
+            <a:r>
+              <a:rPr lang="en-US" altLang="ja-JP" dirty="0">
+                <a:latin typeface="M+ 1p light" panose="020B0402020203020204" pitchFamily="50" charset="-128"/>
+                <a:ea typeface="M+ 1p light" panose="020B0402020203020204" pitchFamily="50" charset="-128"/>
+                <a:cs typeface="M+ 1p light" panose="020B0402020203020204" pitchFamily="50" charset="-128"/>
+              </a:rPr>
+              <a:t>: </a:t>
+            </a:r>
+            <a:r>
+              <a:rPr lang="ja-JP" altLang="en-US" dirty="0">
+                <a:latin typeface="M+ 1p light" panose="020B0402020203020204" pitchFamily="50" charset="-128"/>
+                <a:ea typeface="M+ 1p light" panose="020B0402020203020204" pitchFamily="50" charset="-128"/>
+                <a:cs typeface="M+ 1p light" panose="020B0402020203020204" pitchFamily="50" charset="-128"/>
+              </a:rPr>
+              <a:t>距離が存在する空間</a:t>
+            </a:r>
+            <a:endParaRPr lang="en-US" altLang="ja-JP" dirty="0">
+              <a:latin typeface="M+ 1p light" panose="020B0402020203020204" pitchFamily="50" charset="-128"/>
+              <a:ea typeface="M+ 1p light" panose="020B0402020203020204" pitchFamily="50" charset="-128"/>
+              <a:cs typeface="M+ 1p light" panose="020B0402020203020204" pitchFamily="50" charset="-128"/>
+            </a:endParaRPr>
+          </a:p>
+          <a:p>
+            <a:pPr marL="285750" lvl="0" indent="-285750">
+              <a:buFontTx/>
+              <a:buChar char="-"/>
+            </a:pPr>
+            <a:r>
+              <a:rPr lang="ja-JP" altLang="en-US" dirty="0">
+                <a:latin typeface="M+ 1p light" panose="020B0402020203020204" pitchFamily="50" charset="-128"/>
+                <a:ea typeface="M+ 1p light" panose="020B0402020203020204" pitchFamily="50" charset="-128"/>
+                <a:cs typeface="M+ 1p light" panose="020B0402020203020204" pitchFamily="50" charset="-128"/>
+              </a:rPr>
+              <a:t>変換</a:t>
+            </a:r>
+            <a:r>
+              <a:rPr lang="en-US" altLang="ja-JP" dirty="0">
+                <a:latin typeface="M+ 1p light" panose="020B0402020203020204" pitchFamily="50" charset="-128"/>
+                <a:ea typeface="M+ 1p light" panose="020B0402020203020204" pitchFamily="50" charset="-128"/>
+                <a:cs typeface="M+ 1p light" panose="020B0402020203020204" pitchFamily="50" charset="-128"/>
+              </a:rPr>
+              <a:t>: </a:t>
+            </a:r>
+            <a:r>
+              <a:rPr lang="ja-JP" altLang="en-US" dirty="0">
+                <a:latin typeface="M+ 1p light" panose="020B0402020203020204" pitchFamily="50" charset="-128"/>
+                <a:ea typeface="M+ 1p light" panose="020B0402020203020204" pitchFamily="50" charset="-128"/>
+                <a:cs typeface="M+ 1p light" panose="020B0402020203020204" pitchFamily="50" charset="-128"/>
+              </a:rPr>
+              <a:t>長さの変化しない変換</a:t>
+            </a:r>
+          </a:p>
+        </p:txBody>
+      </p:sp>
+      <p:sp>
+        <p:nvSpPr>
+          <p:cNvPr id="62" name="Google Shape;62;p14"/>
+          <p:cNvSpPr txBox="1">
+            <a:spLocks noGrp="1"/>
+          </p:cNvSpPr>
+          <p:nvPr>
+            <p:ph type="title"/>
+          </p:nvPr>
+        </p:nvSpPr>
+        <p:spPr>
+          <a:xfrm>
+            <a:off x="6916625" y="45750"/>
+            <a:ext cx="2144400" cy="347700"/>
+          </a:xfrm>
+          <a:prstGeom prst="rect">
+            <a:avLst/>
+          </a:prstGeom>
+        </p:spPr>
+        <p:txBody>
+          <a:bodyPr spcFirstLastPara="1" wrap="square" lIns="91425" tIns="91425" rIns="91425" bIns="91425" anchor="t" anchorCtr="0">
+            <a:noAutofit/>
+          </a:bodyPr>
+          <a:lstStyle/>
+          <a:p>
+            <a:pPr marL="0" lvl="0" indent="0" algn="ctr" rtl="0">
+              <a:spcBef>
+                <a:spcPts val="0"/>
+              </a:spcBef>
+              <a:spcAft>
+                <a:spcPts val="0"/>
+              </a:spcAft>
+              <a:buNone/>
+            </a:pPr>
+            <a:r>
+              <a:rPr lang="ja-JP" altLang="en-US" sz="1400" dirty="0">
+                <a:solidFill>
+                  <a:schemeClr val="bg1">
+                    <a:lumMod val="50000"/>
+                  </a:schemeClr>
+                </a:solidFill>
+                <a:latin typeface="M+ 1p light" panose="020B0402020203020204" pitchFamily="50" charset="-128"/>
+                <a:ea typeface="M+ 1p light" panose="020B0402020203020204" pitchFamily="50" charset="-128"/>
+                <a:cs typeface="M+ 1p light" panose="020B0402020203020204" pitchFamily="50" charset="-128"/>
+              </a:rPr>
+              <a:t>復習</a:t>
+            </a:r>
+            <a:r>
+              <a:rPr lang="en-US" altLang="ja-JP" sz="1400" dirty="0">
+                <a:solidFill>
+                  <a:schemeClr val="bg1">
+                    <a:lumMod val="50000"/>
+                  </a:schemeClr>
+                </a:solidFill>
+                <a:latin typeface="M+ 1p light" panose="020B0402020203020204" pitchFamily="50" charset="-128"/>
+                <a:ea typeface="M+ 1p light" panose="020B0402020203020204" pitchFamily="50" charset="-128"/>
+                <a:cs typeface="M+ 1p light" panose="020B0402020203020204" pitchFamily="50" charset="-128"/>
+              </a:rPr>
+              <a:t>: </a:t>
+            </a:r>
+            <a:r>
+              <a:rPr lang="ja-JP" altLang="en-US" sz="1400" dirty="0">
+                <a:solidFill>
+                  <a:schemeClr val="bg1">
+                    <a:lumMod val="50000"/>
+                  </a:schemeClr>
+                </a:solidFill>
+                <a:latin typeface="M+ 1p light" panose="020B0402020203020204" pitchFamily="50" charset="-128"/>
+                <a:ea typeface="M+ 1p light" panose="020B0402020203020204" pitchFamily="50" charset="-128"/>
+                <a:cs typeface="M+ 1p light" panose="020B0402020203020204" pitchFamily="50" charset="-128"/>
+              </a:rPr>
+              <a:t>ユークリッド幾何</a:t>
+            </a:r>
+            <a:endParaRPr sz="1400" dirty="0">
+              <a:solidFill>
+                <a:schemeClr val="bg1">
+                  <a:lumMod val="50000"/>
+                </a:schemeClr>
+              </a:solidFill>
+              <a:latin typeface="M+ 1p light" panose="020B0402020203020204" pitchFamily="50" charset="-128"/>
+              <a:ea typeface="M+ 1p light" panose="020B0402020203020204" pitchFamily="50" charset="-128"/>
+              <a:cs typeface="M+ 1p light" panose="020B0402020203020204" pitchFamily="50" charset="-128"/>
+            </a:endParaRPr>
+          </a:p>
+        </p:txBody>
+      </p:sp>
+    </p:spTree>
+    <p:extLst>
+      <p:ext uri="{BB962C8B-B14F-4D97-AF65-F5344CB8AC3E}">
+        <p14:creationId xmlns:p14="http://schemas.microsoft.com/office/powerpoint/2010/main" val="3400552348"/>
+      </p:ext>
+    </p:extLst>
+  </p:cSld>
+  <p:clrMapOvr>
+    <a:masterClrMapping/>
+  </p:clrMapOvr>
+  <p:timing>
+    <p:tnLst>
+      <p:par>
+        <p:cTn id="1" dur="indefinite" restart="never" nodeType="tmRoot">
+          <p:childTnLst>
+            <p:seq concurrent="1" nextAc="seek">
+              <p:cTn id="2" dur="indefinite" nodeType="mainSeq">
+                <p:childTnLst>
+                  <p:par>
+                    <p:cTn id="3" fill="hold">
+                      <p:stCondLst>
+                        <p:cond delay="indefinite"/>
+                      </p:stCondLst>
+                      <p:childTnLst>
+                        <p:par>
+                          <p:cTn id="4" fill="hold">
+                            <p:stCondLst>
+                              <p:cond delay="0"/>
+                            </p:stCondLst>
+                            <p:childTnLst>
+                              <p:par>
+                                <p:cTn id="5" presetID="10" presetClass="entr" presetSubtype="0" fill="hold" nodeType="clickEffect">
+                                  <p:stCondLst>
+                                    <p:cond delay="0"/>
+                                  </p:stCondLst>
+                                  <p:childTnLst>
+                                    <p:set>
+                                      <p:cBhvr>
+                                        <p:cTn id="6" dur="1" fill="hold">
+                                          <p:stCondLst>
+                                            <p:cond delay="0"/>
+                                          </p:stCondLst>
+                                        </p:cTn>
+                                        <p:tgtEl>
+                                          <p:spTgt spid="61">
+                                            <p:txEl>
+                                              <p:pRg st="3" end="3"/>
+                                            </p:txEl>
+                                          </p:spTgt>
+                                        </p:tgtEl>
+                                        <p:attrNameLst>
+                                          <p:attrName>style.visibility</p:attrName>
+                                        </p:attrNameLst>
+                                      </p:cBhvr>
+                                      <p:to>
+                                        <p:strVal val="visible"/>
+                                      </p:to>
+                                    </p:set>
+                                    <p:animEffect transition="in" filter="fade">
+                                      <p:cBhvr>
+                                        <p:cTn id="7" dur="500"/>
+                                        <p:tgtEl>
+                                          <p:spTgt spid="61">
+                                            <p:txEl>
+                                              <p:pRg st="3" end="3"/>
+                                            </p:txEl>
+                                          </p:spTgt>
+                                        </p:tgtEl>
+                                      </p:cBhvr>
+                                    </p:animEffect>
+                                  </p:childTnLst>
+                                </p:cTn>
+                              </p:par>
+                            </p:childTnLst>
+                          </p:cTn>
+                        </p:par>
+                      </p:childTnLst>
+                    </p:cTn>
+                  </p:par>
+                  <p:par>
+                    <p:cTn id="8" fill="hold">
+                      <p:stCondLst>
+                        <p:cond delay="indefinite"/>
+                      </p:stCondLst>
+                      <p:childTnLst>
+                        <p:par>
+                          <p:cTn id="9" fill="hold">
+                            <p:stCondLst>
+                              <p:cond delay="0"/>
+                            </p:stCondLst>
+                            <p:childTnLst>
+                              <p:par>
+                                <p:cTn id="10" presetID="10" presetClass="entr" presetSubtype="0" fill="hold" nodeType="clickEffect">
+                                  <p:stCondLst>
+                                    <p:cond delay="0"/>
+                                  </p:stCondLst>
+                                  <p:childTnLst>
+                                    <p:set>
+                                      <p:cBhvr>
+                                        <p:cTn id="11" dur="1" fill="hold">
+                                          <p:stCondLst>
+                                            <p:cond delay="0"/>
+                                          </p:stCondLst>
+                                        </p:cTn>
+                                        <p:tgtEl>
+                                          <p:spTgt spid="61">
+                                            <p:txEl>
+                                              <p:pRg st="7" end="7"/>
+                                            </p:txEl>
+                                          </p:spTgt>
+                                        </p:tgtEl>
+                                        <p:attrNameLst>
+                                          <p:attrName>style.visibility</p:attrName>
+                                        </p:attrNameLst>
+                                      </p:cBhvr>
+                                      <p:to>
+                                        <p:strVal val="visible"/>
+                                      </p:to>
+                                    </p:set>
+                                    <p:animEffect transition="in" filter="fade">
+                                      <p:cBhvr>
+                                        <p:cTn id="12" dur="500"/>
+                                        <p:tgtEl>
+                                          <p:spTgt spid="61">
+                                            <p:txEl>
+                                              <p:pRg st="7" end="7"/>
+                                            </p:txEl>
+                                          </p:spTgt>
+                                        </p:tgtEl>
+                                      </p:cBhvr>
+                                    </p:animEffect>
+                                  </p:childTnLst>
+                                </p:cTn>
+                              </p:par>
+                            </p:childTnLst>
+                          </p:cTn>
+                        </p:par>
+                      </p:childTnLst>
+                    </p:cTn>
+                  </p:par>
+                  <p:par>
+                    <p:cTn id="13" fill="hold">
+                      <p:stCondLst>
+                        <p:cond delay="indefinite"/>
+                      </p:stCondLst>
+                      <p:childTnLst>
+                        <p:par>
+                          <p:cTn id="14" fill="hold">
+                            <p:stCondLst>
+                              <p:cond delay="0"/>
+                            </p:stCondLst>
+                            <p:childTnLst>
+                              <p:par>
+                                <p:cTn id="15" presetID="10" presetClass="entr" presetSubtype="0" fill="hold" nodeType="clickEffect">
+                                  <p:stCondLst>
+                                    <p:cond delay="0"/>
+                                  </p:stCondLst>
+                                  <p:childTnLst>
+                                    <p:set>
+                                      <p:cBhvr>
+                                        <p:cTn id="16" dur="1" fill="hold">
+                                          <p:stCondLst>
+                                            <p:cond delay="0"/>
+                                          </p:stCondLst>
+                                        </p:cTn>
+                                        <p:tgtEl>
+                                          <p:spTgt spid="61">
+                                            <p:txEl>
+                                              <p:pRg st="8" end="8"/>
+                                            </p:txEl>
+                                          </p:spTgt>
+                                        </p:tgtEl>
+                                        <p:attrNameLst>
+                                          <p:attrName>style.visibility</p:attrName>
+                                        </p:attrNameLst>
+                                      </p:cBhvr>
+                                      <p:to>
+                                        <p:strVal val="visible"/>
+                                      </p:to>
+                                    </p:set>
+                                    <p:animEffect transition="in" filter="fade">
+                                      <p:cBhvr>
+                                        <p:cTn id="17" dur="500"/>
+                                        <p:tgtEl>
+                                          <p:spTgt spid="61">
+                                            <p:txEl>
+                                              <p:pRg st="8" end="8"/>
+                                            </p:txEl>
+                                          </p:spTgt>
+                                        </p:tgtEl>
+                                      </p:cBhvr>
+                                    </p:animEffect>
+                                  </p:childTnLst>
+                                </p:cTn>
+                              </p:par>
+                            </p:childTnLst>
+                          </p:cTn>
+                        </p:par>
+                      </p:childTnLst>
+                    </p:cTn>
+                  </p:par>
+                </p:childTnLst>
+              </p:cTn>
+              <p:prevCondLst>
+                <p:cond evt="onPrev" delay="0">
+                  <p:tgtEl>
+                    <p:sldTgt/>
+                  </p:tgtEl>
+                </p:cond>
+              </p:prevCondLst>
+              <p:nextCondLst>
+                <p:cond evt="onNext" delay="0">
+                  <p:tgtEl>
+                    <p:sldTgt/>
+                  </p:tgtEl>
+                </p:cond>
+              </p:nextCondLst>
+            </p:seq>
+          </p:childTnLst>
+        </p:cTn>
+      </p:par>
+    </p:tnLst>
+  </p:timing>
+</p:sld>
+</file>
+
+<file path=ppt/slides/slide9.xml><?xml version="1.0" encoding="utf-8"?>
+<p:sld xmlns:a="http://schemas.openxmlformats.org/drawingml/2006/main" xmlns:r="http://schemas.openxmlformats.org/officeDocument/2006/relationships" xmlns:p="http://schemas.openxmlformats.org/presentationml/2006/main">
+  <p:cSld>
+    <p:spTree>
+      <p:nvGrpSpPr>
+        <p:cNvPr id="1" name="Shape 59"/>
+        <p:cNvGrpSpPr/>
+        <p:nvPr/>
+      </p:nvGrpSpPr>
+      <p:grpSpPr>
+        <a:xfrm>
+          <a:off x="0" y="0"/>
+          <a:ext cx="0" cy="0"/>
+          <a:chOff x="0" y="0"/>
+          <a:chExt cx="0" cy="0"/>
+        </a:xfrm>
+      </p:grpSpPr>
+      <p:sp>
+        <p:nvSpPr>
+          <p:cNvPr id="10" name="二等辺三角形 9">
+            <a:extLst>
+              <a:ext uri="{FF2B5EF4-FFF2-40B4-BE49-F238E27FC236}">
+                <a16:creationId xmlns:a16="http://schemas.microsoft.com/office/drawing/2014/main" id="{5DBF3215-13AD-4FE7-AE3B-208FB74012AE}"/>
+              </a:ext>
+            </a:extLst>
+          </p:cNvPr>
+          <p:cNvSpPr/>
+          <p:nvPr/>
+        </p:nvSpPr>
+        <p:spPr>
+          <a:xfrm rot="16200000">
+            <a:off x="4285650" y="-4285650"/>
+            <a:ext cx="572701" cy="9144002"/>
+          </a:xfrm>
+          <a:prstGeom prst="triangle">
+            <a:avLst>
+              <a:gd name="adj" fmla="val 100000"/>
+            </a:avLst>
+          </a:prstGeom>
+          <a:solidFill>
+            <a:srgbClr val="FFF4E7">
+              <a:alpha val="80000"/>
+            </a:srgbClr>
+          </a:solidFill>
+          <a:ln>
+            <a:noFill/>
+          </a:ln>
+        </p:spPr>
+        <p:style>
+          <a:lnRef idx="2">
+            <a:schemeClr val="accent1">
+              <a:shade val="50000"/>
+            </a:schemeClr>
+          </a:lnRef>
+          <a:fillRef idx="1">
+            <a:schemeClr val="accent1"/>
+          </a:fillRef>
+          <a:effectRef idx="0">
+            <a:schemeClr val="accent1"/>
+          </a:effectRef>
+          <a:fontRef idx="minor">
+            <a:schemeClr val="lt1"/>
+          </a:fontRef>
+        </p:style>
+        <p:txBody>
+          <a:bodyPr rtlCol="0" anchor="ctr"/>
+          <a:lstStyle/>
+          <a:p>
+            <a:pPr algn="ctr"/>
+            <a:endParaRPr kumimoji="1" lang="ja-JP" altLang="en-US" dirty="0"/>
+          </a:p>
+        </p:txBody>
+      </p:sp>
+      <p:sp>
+        <p:nvSpPr>
+          <p:cNvPr id="11" name="正方形/長方形 10">
+            <a:extLst>
+              <a:ext uri="{FF2B5EF4-FFF2-40B4-BE49-F238E27FC236}">
+                <a16:creationId xmlns:a16="http://schemas.microsoft.com/office/drawing/2014/main" id="{FBC25266-4EBA-4EB8-A354-624A1F8420E4}"/>
+              </a:ext>
+            </a:extLst>
+          </p:cNvPr>
+          <p:cNvSpPr/>
+          <p:nvPr/>
+        </p:nvSpPr>
+        <p:spPr>
+          <a:xfrm>
+            <a:off x="1" y="4568873"/>
+            <a:ext cx="9143999" cy="572702"/>
+          </a:xfrm>
+          <a:prstGeom prst="rect">
+            <a:avLst/>
+          </a:prstGeom>
+          <a:solidFill>
+            <a:srgbClr val="FFF5EB"/>
+          </a:solidFill>
+          <a:ln>
+            <a:noFill/>
+          </a:ln>
+        </p:spPr>
+        <p:style>
+          <a:lnRef idx="2">
+            <a:schemeClr val="accent1">
+              <a:shade val="50000"/>
+            </a:schemeClr>
+          </a:lnRef>
+          <a:fillRef idx="1">
+            <a:schemeClr val="accent1"/>
+          </a:fillRef>
+          <a:effectRef idx="0">
+            <a:schemeClr val="accent1"/>
+          </a:effectRef>
+          <a:fontRef idx="minor">
+            <a:schemeClr val="lt1"/>
+          </a:fontRef>
+        </p:style>
+        <p:txBody>
+          <a:bodyPr rtlCol="0" anchor="ctr"/>
+          <a:lstStyle/>
+          <a:p>
+            <a:pPr algn="ctr"/>
+            <a:endParaRPr kumimoji="1" lang="ja-JP" altLang="en-US" dirty="0"/>
+          </a:p>
+        </p:txBody>
+      </p:sp>
+      <p:pic>
+        <p:nvPicPr>
+          <p:cNvPr id="1026" name="Picture 2" descr="ããã¯ãã±å ä¸»äººå+¬ãã®ç»åæ¤ç´¢çµæ">
+            <a:extLst>
+              <a:ext uri="{FF2B5EF4-FFF2-40B4-BE49-F238E27FC236}">
+                <a16:creationId xmlns:a16="http://schemas.microsoft.com/office/drawing/2014/main" id="{B3348C27-15A3-454B-B667-BA5AAADA1B42}"/>
+              </a:ext>
+            </a:extLst>
+          </p:cNvPr>
+          <p:cNvPicPr>
+            <a:picLocks noChangeAspect="1" noChangeArrowheads="1"/>
+          </p:cNvPicPr>
+          <p:nvPr/>
+        </p:nvPicPr>
+        <p:blipFill>
+          <a:blip r:embed="rId3">
+            <a:alphaModFix amt="50000"/>
+            <a:extLst>
+              <a:ext uri="{28A0092B-C50C-407E-A947-70E740481C1C}">
+                <a14:useLocalDpi xmlns:a14="http://schemas.microsoft.com/office/drawing/2010/main" val="0"/>
+              </a:ext>
+            </a:extLst>
+          </a:blip>
+          <a:srcRect/>
+          <a:stretch>
+            <a:fillRect/>
+          </a:stretch>
+        </p:blipFill>
+        <p:spPr bwMode="auto">
+          <a:xfrm>
+            <a:off x="133738" y="4577558"/>
+            <a:ext cx="555332" cy="555332"/>
+          </a:xfrm>
+          <a:prstGeom prst="rect">
+            <a:avLst/>
+          </a:prstGeom>
+          <a:noFill/>
+          <a:extLst>
+            <a:ext uri="{909E8E84-426E-40DD-AFC4-6F175D3DCCD1}">
+              <a14:hiddenFill xmlns:a14="http://schemas.microsoft.com/office/drawing/2010/main">
+                <a:solidFill>
+                  <a:srgbClr val="FFFFFF"/>
+                </a:solidFill>
+              </a14:hiddenFill>
+            </a:ext>
+          </a:extLst>
+        </p:spPr>
+      </p:pic>
+      <p:sp>
+        <p:nvSpPr>
+          <p:cNvPr id="4" name="吹き出し: 四角形 3">
+            <a:extLst>
+              <a:ext uri="{FF2B5EF4-FFF2-40B4-BE49-F238E27FC236}">
+                <a16:creationId xmlns:a16="http://schemas.microsoft.com/office/drawing/2014/main" id="{9E66183E-78B4-4767-A511-09039646B1AC}"/>
+              </a:ext>
+            </a:extLst>
+          </p:cNvPr>
+          <p:cNvSpPr/>
+          <p:nvPr/>
+        </p:nvSpPr>
+        <p:spPr>
+          <a:xfrm>
+            <a:off x="822807" y="4612297"/>
+            <a:ext cx="7596515" cy="491547"/>
+          </a:xfrm>
+          <a:prstGeom prst="wedgeRectCallout">
+            <a:avLst>
+              <a:gd name="adj1" fmla="val -51006"/>
+              <a:gd name="adj2" fmla="val 20927"/>
+            </a:avLst>
+          </a:prstGeom>
+          <a:solidFill>
+            <a:srgbClr val="EEEEEE">
+              <a:alpha val="50196"/>
+            </a:srgbClr>
+          </a:solidFill>
+          <a:ln w="6350">
+            <a:solidFill>
+              <a:schemeClr val="bg1">
+                <a:lumMod val="75000"/>
+              </a:schemeClr>
+            </a:solidFill>
+          </a:ln>
+        </p:spPr>
+        <p:style>
+          <a:lnRef idx="2">
+            <a:schemeClr val="accent1">
+              <a:shade val="50000"/>
+            </a:schemeClr>
+          </a:lnRef>
+          <a:fillRef idx="1">
+            <a:schemeClr val="accent1"/>
+          </a:fillRef>
+          <a:effectRef idx="0">
+            <a:schemeClr val="accent1"/>
+          </a:effectRef>
+          <a:fontRef idx="minor">
+            <a:schemeClr val="lt1"/>
+          </a:fontRef>
+        </p:style>
+        <p:txBody>
+          <a:bodyPr rtlCol="0" anchor="ctr"/>
+          <a:lstStyle/>
+          <a:p>
+            <a:pPr algn="ctr"/>
+            <a:r>
+              <a:rPr kumimoji="1" lang="ja-JP" altLang="en-US" dirty="0">
+                <a:solidFill>
+                  <a:schemeClr val="bg1">
+                    <a:lumMod val="50000"/>
+                  </a:schemeClr>
+                </a:solidFill>
+                <a:latin typeface="M+ 1p light" panose="020B0402020203020204" pitchFamily="50" charset="-128"/>
+                <a:ea typeface="M+ 1p light" panose="020B0402020203020204" pitchFamily="50" charset="-128"/>
+                <a:cs typeface="M+ 1p light" panose="020B0402020203020204" pitchFamily="50" charset="-128"/>
+              </a:rPr>
+              <a:t>距離は</a:t>
+            </a:r>
+            <a:r>
+              <a:rPr kumimoji="1" lang="en-US" altLang="ja-JP" dirty="0">
+                <a:solidFill>
+                  <a:schemeClr val="bg1">
+                    <a:lumMod val="50000"/>
+                  </a:schemeClr>
+                </a:solidFill>
+                <a:latin typeface="M+ 1p light" panose="020B0402020203020204" pitchFamily="50" charset="-128"/>
+                <a:ea typeface="M+ 1p light" panose="020B0402020203020204" pitchFamily="50" charset="-128"/>
+                <a:cs typeface="M+ 1p light" panose="020B0402020203020204" pitchFamily="50" charset="-128"/>
+              </a:rPr>
+              <a:t>4</a:t>
+            </a:r>
+            <a:r>
+              <a:rPr kumimoji="1" lang="ja-JP" altLang="en-US" dirty="0">
+                <a:solidFill>
+                  <a:schemeClr val="bg1">
+                    <a:lumMod val="50000"/>
+                  </a:schemeClr>
+                </a:solidFill>
+                <a:latin typeface="M+ 1p light" panose="020B0402020203020204" pitchFamily="50" charset="-128"/>
+                <a:ea typeface="M+ 1p light" panose="020B0402020203020204" pitchFamily="50" charset="-128"/>
+                <a:cs typeface="M+ 1p light" panose="020B0402020203020204" pitchFamily="50" charset="-128"/>
+              </a:rPr>
+              <a:t>つの公理さえ満たせば全部距離になる</a:t>
+            </a:r>
+            <a:r>
+              <a:rPr kumimoji="1" lang="en-US" altLang="ja-JP" dirty="0">
+                <a:solidFill>
+                  <a:schemeClr val="bg1">
+                    <a:lumMod val="50000"/>
+                  </a:schemeClr>
+                </a:solidFill>
+                <a:latin typeface="M+ 1p light" panose="020B0402020203020204" pitchFamily="50" charset="-128"/>
+                <a:ea typeface="M+ 1p light" panose="020B0402020203020204" pitchFamily="50" charset="-128"/>
+                <a:cs typeface="M+ 1p light" panose="020B0402020203020204" pitchFamily="50" charset="-128"/>
+              </a:rPr>
+              <a:t>.</a:t>
+            </a:r>
+          </a:p>
+          <a:p>
+            <a:pPr algn="ctr"/>
+            <a:r>
+              <a:rPr kumimoji="1" lang="ja-JP" altLang="en-US" dirty="0">
+                <a:solidFill>
+                  <a:schemeClr val="bg1">
+                    <a:lumMod val="50000"/>
+                  </a:schemeClr>
+                </a:solidFill>
+                <a:latin typeface="M+ 1p light" panose="020B0402020203020204" pitchFamily="50" charset="-128"/>
+                <a:ea typeface="M+ 1p light" panose="020B0402020203020204" pitchFamily="50" charset="-128"/>
+                <a:cs typeface="M+ 1p light" panose="020B0402020203020204" pitchFamily="50" charset="-128"/>
+              </a:rPr>
+              <a:t>ユークリッド以外には</a:t>
+            </a:r>
+            <a:r>
+              <a:rPr kumimoji="1" lang="en-US" altLang="ja-JP" dirty="0">
+                <a:solidFill>
+                  <a:schemeClr val="bg1">
+                    <a:lumMod val="50000"/>
+                  </a:schemeClr>
+                </a:solidFill>
+                <a:latin typeface="M+ 1p light" panose="020B0402020203020204" pitchFamily="50" charset="-128"/>
+                <a:ea typeface="M+ 1p light" panose="020B0402020203020204" pitchFamily="50" charset="-128"/>
+                <a:cs typeface="M+ 1p light" panose="020B0402020203020204" pitchFamily="50" charset="-128"/>
+              </a:rPr>
+              <a:t>, </a:t>
+            </a:r>
+            <a:r>
+              <a:rPr kumimoji="1" lang="ja-JP" altLang="en-US" dirty="0">
+                <a:solidFill>
+                  <a:schemeClr val="bg1">
+                    <a:lumMod val="50000"/>
+                  </a:schemeClr>
+                </a:solidFill>
+                <a:latin typeface="M+ 1p light" panose="020B0402020203020204" pitchFamily="50" charset="-128"/>
+                <a:ea typeface="M+ 1p light" panose="020B0402020203020204" pitchFamily="50" charset="-128"/>
+                <a:cs typeface="M+ 1p light" panose="020B0402020203020204" pitchFamily="50" charset="-128"/>
+              </a:rPr>
+              <a:t>マンハッタン距離</a:t>
+            </a:r>
+            <a:r>
+              <a:rPr kumimoji="1" lang="en-US" altLang="ja-JP" dirty="0">
+                <a:solidFill>
+                  <a:schemeClr val="bg1">
+                    <a:lumMod val="50000"/>
+                  </a:schemeClr>
+                </a:solidFill>
+                <a:latin typeface="M+ 1p light" panose="020B0402020203020204" pitchFamily="50" charset="-128"/>
+                <a:ea typeface="M+ 1p light" panose="020B0402020203020204" pitchFamily="50" charset="-128"/>
+                <a:cs typeface="M+ 1p light" panose="020B0402020203020204" pitchFamily="50" charset="-128"/>
+              </a:rPr>
+              <a:t>, </a:t>
+            </a:r>
+            <a:r>
+              <a:rPr kumimoji="1" lang="ja-JP" altLang="en-US" dirty="0">
+                <a:solidFill>
+                  <a:schemeClr val="bg1">
+                    <a:lumMod val="50000"/>
+                  </a:schemeClr>
+                </a:solidFill>
+                <a:latin typeface="M+ 1p light" panose="020B0402020203020204" pitchFamily="50" charset="-128"/>
+                <a:ea typeface="M+ 1p light" panose="020B0402020203020204" pitchFamily="50" charset="-128"/>
+                <a:cs typeface="M+ 1p light" panose="020B0402020203020204" pitchFamily="50" charset="-128"/>
+              </a:rPr>
+              <a:t>マハラノビス距離とか</a:t>
+            </a:r>
+            <a:endParaRPr kumimoji="1" lang="en-US" altLang="ja-JP" dirty="0">
+              <a:solidFill>
+                <a:schemeClr val="bg1">
+                  <a:lumMod val="50000"/>
+                </a:schemeClr>
+              </a:solidFill>
+              <a:latin typeface="M+ 1p light" panose="020B0402020203020204" pitchFamily="50" charset="-128"/>
+              <a:ea typeface="M+ 1p light" panose="020B0402020203020204" pitchFamily="50" charset="-128"/>
+              <a:cs typeface="M+ 1p light" panose="020B0402020203020204" pitchFamily="50" charset="-128"/>
+            </a:endParaRPr>
+          </a:p>
+        </p:txBody>
+      </p:sp>
+      <p:sp>
+        <p:nvSpPr>
+          <p:cNvPr id="60" name="Google Shape;60;p14"/>
+          <p:cNvSpPr txBox="1">
+            <a:spLocks noGrp="1"/>
+          </p:cNvSpPr>
+          <p:nvPr>
+            <p:ph type="title"/>
+          </p:nvPr>
+        </p:nvSpPr>
+        <p:spPr>
+          <a:xfrm>
+            <a:off x="311700" y="445025"/>
+            <a:ext cx="8520600" cy="572700"/>
+          </a:xfrm>
+          <a:prstGeom prst="rect">
+            <a:avLst/>
+          </a:prstGeom>
+        </p:spPr>
+        <p:txBody>
+          <a:bodyPr spcFirstLastPara="1" wrap="square" lIns="91425" tIns="91425" rIns="91425" bIns="91425" anchor="t" anchorCtr="0">
+            <a:noAutofit/>
+          </a:bodyPr>
+          <a:lstStyle/>
+          <a:p>
+            <a:pPr lvl="0"/>
+            <a:r>
+              <a:rPr lang="ja-JP" altLang="en-US" dirty="0">
+                <a:solidFill>
+                  <a:schemeClr val="tx1">
+                    <a:lumMod val="75000"/>
+                    <a:lumOff val="25000"/>
+                  </a:schemeClr>
+                </a:solidFill>
+                <a:latin typeface="M+ 1p" panose="020B0503020203020204" pitchFamily="50" charset="-128"/>
+                <a:ea typeface="M+ 1p" panose="020B0503020203020204" pitchFamily="50" charset="-128"/>
+                <a:cs typeface="M+ 1p" panose="020B0503020203020204" pitchFamily="50" charset="-128"/>
+              </a:rPr>
+              <a:t>距離が存在する空間</a:t>
+            </a:r>
+            <a:endParaRPr dirty="0">
+              <a:solidFill>
+                <a:schemeClr val="tx1">
+                  <a:lumMod val="75000"/>
+                  <a:lumOff val="25000"/>
+                </a:schemeClr>
+              </a:solidFill>
+              <a:latin typeface="M+ 1p" panose="020B0503020203020204" pitchFamily="50" charset="-128"/>
+              <a:ea typeface="M+ 1p" panose="020B0503020203020204" pitchFamily="50" charset="-128"/>
+              <a:cs typeface="M+ 1p" panose="020B0503020203020204" pitchFamily="50" charset="-128"/>
+            </a:endParaRPr>
+          </a:p>
+        </p:txBody>
+      </p:sp>
+      <mc:AlternateContent xmlns:mc="http://schemas.openxmlformats.org/markup-compatibility/2006">
+        <mc:Choice xmlns:a14="http://schemas.microsoft.com/office/drawing/2010/main" Requires="a14">
+          <p:sp>
+            <p:nvSpPr>
+              <p:cNvPr id="61" name="Google Shape;61;p14"/>
+              <p:cNvSpPr txBox="1">
+                <a:spLocks noGrp="1"/>
+              </p:cNvSpPr>
+              <p:nvPr>
+                <p:ph type="body" idx="1"/>
+              </p:nvPr>
+            </p:nvSpPr>
+            <p:spPr>
+              <a:xfrm>
+                <a:off x="311700" y="1152475"/>
+                <a:ext cx="8520600" cy="3416400"/>
+              </a:xfrm>
+              <a:prstGeom prst="rect">
+                <a:avLst/>
+              </a:prstGeom>
+            </p:spPr>
+            <p:txBody>
+              <a:bodyPr spcFirstLastPara="1" wrap="square" lIns="91425" tIns="91425" rIns="91425" bIns="91425" anchor="t" anchorCtr="0">
+                <a:noAutofit/>
+              </a:bodyPr>
+              <a:lstStyle/>
+              <a:p>
+                <a:pPr marL="0" lvl="0" indent="0">
+                  <a:buNone/>
+                </a:pPr>
+                <a:r>
+                  <a:rPr lang="ja-JP" altLang="en-US" dirty="0">
+                    <a:latin typeface="M+ 1p light" panose="020B0402020203020204" pitchFamily="50" charset="-128"/>
+                    <a:ea typeface="M+ 1p light" panose="020B0402020203020204" pitchFamily="50" charset="-128"/>
+                    <a:cs typeface="M+ 1p light" panose="020B0402020203020204" pitchFamily="50" charset="-128"/>
+                  </a:rPr>
+                  <a:t>距離が定義されている空間の事を距離空間といいます</a:t>
+                </a:r>
+                <a:r>
+                  <a:rPr lang="en-US" altLang="ja-JP" dirty="0">
+                    <a:latin typeface="M+ 1p light" panose="020B0402020203020204" pitchFamily="50" charset="-128"/>
+                    <a:ea typeface="M+ 1p light" panose="020B0402020203020204" pitchFamily="50" charset="-128"/>
+                    <a:cs typeface="M+ 1p light" panose="020B0402020203020204" pitchFamily="50" charset="-128"/>
+                  </a:rPr>
+                  <a:t>.</a:t>
+                </a:r>
+              </a:p>
+              <a:p>
+                <a:pPr marL="0" lvl="0" indent="0">
+                  <a:buNone/>
+                </a:pPr>
+                <a:endParaRPr lang="en-US" altLang="ja-JP" dirty="0">
+                  <a:latin typeface="M+ 1p light" panose="020B0402020203020204" pitchFamily="50" charset="-128"/>
+                  <a:ea typeface="M+ 1p light" panose="020B0402020203020204" pitchFamily="50" charset="-128"/>
+                  <a:cs typeface="M+ 1p light" panose="020B0402020203020204" pitchFamily="50" charset="-128"/>
+                </a:endParaRPr>
+              </a:p>
+              <a:p>
+                <a:pPr marL="0" lvl="0" indent="0">
+                  <a:buNone/>
+                </a:pPr>
+                <a:r>
+                  <a:rPr lang="en-US" altLang="ja-JP" dirty="0">
+                    <a:latin typeface="M+ 1p light" panose="020B0402020203020204" pitchFamily="50" charset="-128"/>
+                    <a:ea typeface="M+ 1p light" panose="020B0402020203020204" pitchFamily="50" charset="-128"/>
+                    <a:cs typeface="M+ 1p light" panose="020B0402020203020204" pitchFamily="50" charset="-128"/>
+                  </a:rPr>
+                  <a:t>Q. Def </a:t>
+                </a:r>
+                <a:r>
+                  <a:rPr lang="ja-JP" altLang="en-US" dirty="0">
+                    <a:latin typeface="M+ 1p light" panose="020B0402020203020204" pitchFamily="50" charset="-128"/>
+                    <a:ea typeface="M+ 1p light" panose="020B0402020203020204" pitchFamily="50" charset="-128"/>
+                    <a:cs typeface="M+ 1p light" panose="020B0402020203020204" pitchFamily="50" charset="-128"/>
+                  </a:rPr>
+                  <a:t>距離空間</a:t>
+                </a:r>
+                <a:endParaRPr lang="en-US" altLang="ja-JP" dirty="0">
+                  <a:latin typeface="M+ 1p light" panose="020B0402020203020204" pitchFamily="50" charset="-128"/>
+                  <a:ea typeface="M+ 1p light" panose="020B0402020203020204" pitchFamily="50" charset="-128"/>
+                  <a:cs typeface="M+ 1p light" panose="020B0402020203020204" pitchFamily="50" charset="-128"/>
+                </a:endParaRPr>
+              </a:p>
+              <a:p>
+                <a:pPr marL="0" lvl="0" indent="0">
+                  <a:buNone/>
+                </a:pPr>
+                <a:r>
+                  <a:rPr lang="ja-JP" altLang="en-US" dirty="0">
+                    <a:latin typeface="M+ 1p light" panose="020B0402020203020204" pitchFamily="50" charset="-128"/>
+                    <a:ea typeface="M+ 1p light" panose="020B0402020203020204" pitchFamily="50" charset="-128"/>
+                    <a:cs typeface="M+ 1p light" panose="020B0402020203020204" pitchFamily="50" charset="-128"/>
+                  </a:rPr>
+                  <a:t>距離関数</a:t>
+                </a:r>
+                <a:r>
+                  <a:rPr lang="en-US" altLang="ja-JP" dirty="0">
+                    <a:latin typeface="M+ 1p light" panose="020B0402020203020204" pitchFamily="50" charset="-128"/>
+                    <a:ea typeface="M+ 1p light" panose="020B0402020203020204" pitchFamily="50" charset="-128"/>
+                    <a:cs typeface="M+ 1p light" panose="020B0402020203020204" pitchFamily="50" charset="-128"/>
+                  </a:rPr>
+                  <a:t>: </a:t>
+                </a:r>
+                <a14:m>
+                  <m:oMath xmlns:m="http://schemas.openxmlformats.org/officeDocument/2006/math">
+                    <m:r>
+                      <a:rPr lang="en-US" altLang="ja-JP" b="0" i="1" smtClean="0">
+                        <a:latin typeface="Cambria Math" panose="02040503050406030204" pitchFamily="18" charset="0"/>
+                        <a:ea typeface="M+ 1p light" panose="020B0402020203020204" pitchFamily="50" charset="-128"/>
+                        <a:cs typeface="M+ 1p light" panose="020B0402020203020204" pitchFamily="50" charset="-128"/>
+                      </a:rPr>
+                      <m:t>𝑑</m:t>
+                    </m:r>
+                    <m:r>
+                      <a:rPr lang="en-US" altLang="ja-JP" b="0" i="1" smtClean="0">
+                        <a:latin typeface="Cambria Math" panose="02040503050406030204" pitchFamily="18" charset="0"/>
+                        <a:ea typeface="M+ 1p light" panose="020B0402020203020204" pitchFamily="50" charset="-128"/>
+                        <a:cs typeface="M+ 1p light" panose="020B0402020203020204" pitchFamily="50" charset="-128"/>
+                      </a:rPr>
+                      <m:t>:</m:t>
+                    </m:r>
+                    <m:sSup>
+                      <m:sSupPr>
+                        <m:ctrlPr>
+                          <a:rPr lang="en-US" altLang="ja-JP" b="0" i="1" smtClean="0">
+                            <a:latin typeface="Cambria Math" panose="02040503050406030204" pitchFamily="18" charset="0"/>
+                            <a:ea typeface="M+ 1p light" panose="020B0402020203020204" pitchFamily="50" charset="-128"/>
+                            <a:cs typeface="M+ 1p light" panose="020B0402020203020204" pitchFamily="50" charset="-128"/>
+                          </a:rPr>
+                        </m:ctrlPr>
+                      </m:sSupPr>
+                      <m:e>
+                        <m:r>
+                          <a:rPr lang="en-US" altLang="ja-JP" b="0" i="1" smtClean="0">
+                            <a:latin typeface="Cambria Math" panose="02040503050406030204" pitchFamily="18" charset="0"/>
+                            <a:ea typeface="M+ 1p light" panose="020B0402020203020204" pitchFamily="50" charset="-128"/>
+                            <a:cs typeface="M+ 1p light" panose="020B0402020203020204" pitchFamily="50" charset="-128"/>
+                          </a:rPr>
+                          <m:t>𝐴</m:t>
+                        </m:r>
+                      </m:e>
+                      <m:sup>
+                        <m:r>
+                          <a:rPr lang="en-US" altLang="ja-JP" b="0" i="1" smtClean="0">
+                            <a:latin typeface="Cambria Math" panose="02040503050406030204" pitchFamily="18" charset="0"/>
+                            <a:ea typeface="M+ 1p light" panose="020B0402020203020204" pitchFamily="50" charset="-128"/>
+                            <a:cs typeface="M+ 1p light" panose="020B0402020203020204" pitchFamily="50" charset="-128"/>
+                          </a:rPr>
+                          <m:t>2</m:t>
+                        </m:r>
+                      </m:sup>
+                    </m:sSup>
+                    <m:r>
+                      <a:rPr lang="en-US" altLang="ja-JP" b="0" i="1" smtClean="0">
+                        <a:latin typeface="Cambria Math" panose="02040503050406030204" pitchFamily="18" charset="0"/>
+                        <a:ea typeface="M+ 1p light" panose="020B0402020203020204" pitchFamily="50" charset="-128"/>
+                        <a:cs typeface="M+ 1p light" panose="020B0402020203020204" pitchFamily="50" charset="-128"/>
+                      </a:rPr>
+                      <m:t>→</m:t>
+                    </m:r>
+                    <m:r>
+                      <a:rPr lang="en-US" altLang="ja-JP" b="0" i="1" smtClean="0">
+                        <a:latin typeface="Cambria Math" panose="02040503050406030204" pitchFamily="18" charset="0"/>
+                        <a:ea typeface="M+ 1p light" panose="020B0402020203020204" pitchFamily="50" charset="-128"/>
+                        <a:cs typeface="M+ 1p light" panose="020B0402020203020204" pitchFamily="50" charset="-128"/>
+                      </a:rPr>
+                      <m:t>ℝ</m:t>
+                    </m:r>
+                    <m:r>
+                      <a:rPr lang="en-US" altLang="ja-JP" b="0" i="1" smtClean="0">
+                        <a:latin typeface="Cambria Math" panose="02040503050406030204" pitchFamily="18" charset="0"/>
+                        <a:ea typeface="M+ 1p light" panose="020B0402020203020204" pitchFamily="50" charset="-128"/>
+                        <a:cs typeface="M+ 1p light" panose="020B0402020203020204" pitchFamily="50" charset="-128"/>
+                      </a:rPr>
+                      <m:t> </m:t>
+                    </m:r>
+                  </m:oMath>
+                </a14:m>
+                <a:r>
+                  <a:rPr lang="ja-JP" altLang="en-US" dirty="0">
+                    <a:latin typeface="M+ 1p light" panose="020B0402020203020204" pitchFamily="50" charset="-128"/>
+                    <a:ea typeface="M+ 1p light" panose="020B0402020203020204" pitchFamily="50" charset="-128"/>
+                    <a:cs typeface="M+ 1p light" panose="020B0402020203020204" pitchFamily="50" charset="-128"/>
+                  </a:rPr>
+                  <a:t>が</a:t>
+                </a:r>
+                <a:r>
+                  <a:rPr lang="en-US" altLang="ja-JP" dirty="0">
+                    <a:latin typeface="M+ 1p light" panose="020B0402020203020204" pitchFamily="50" charset="-128"/>
+                    <a:ea typeface="M+ 1p light" panose="020B0402020203020204" pitchFamily="50" charset="-128"/>
+                    <a:cs typeface="M+ 1p light" panose="020B0402020203020204" pitchFamily="50" charset="-128"/>
+                  </a:rPr>
+                  <a:t>4</a:t>
+                </a:r>
+                <a:r>
+                  <a:rPr lang="ja-JP" altLang="en-US" dirty="0">
+                    <a:latin typeface="M+ 1p light" panose="020B0402020203020204" pitchFamily="50" charset="-128"/>
+                    <a:ea typeface="M+ 1p light" panose="020B0402020203020204" pitchFamily="50" charset="-128"/>
+                    <a:cs typeface="M+ 1p light" panose="020B0402020203020204" pitchFamily="50" charset="-128"/>
+                  </a:rPr>
+                  <a:t>つの条件を満たすとき</a:t>
+                </a:r>
+                <a:r>
+                  <a:rPr lang="en-US" altLang="ja-JP" dirty="0">
+                    <a:latin typeface="M+ 1p light" panose="020B0402020203020204" pitchFamily="50" charset="-128"/>
+                    <a:ea typeface="M+ 1p light" panose="020B0402020203020204" pitchFamily="50" charset="-128"/>
+                    <a:cs typeface="M+ 1p light" panose="020B0402020203020204" pitchFamily="50" charset="-128"/>
+                  </a:rPr>
+                  <a:t>, </a:t>
+                </a:r>
+                <a:r>
+                  <a:rPr lang="ja-JP" altLang="en-US" dirty="0">
+                    <a:latin typeface="M+ 1p light" panose="020B0402020203020204" pitchFamily="50" charset="-128"/>
+                    <a:ea typeface="M+ 1p light" panose="020B0402020203020204" pitchFamily="50" charset="-128"/>
+                    <a:cs typeface="M+ 1p light" panose="020B0402020203020204" pitchFamily="50" charset="-128"/>
+                  </a:rPr>
+                  <a:t>この</a:t>
+                </a:r>
+                <a14:m>
+                  <m:oMath xmlns:m="http://schemas.openxmlformats.org/officeDocument/2006/math">
+                    <m:r>
+                      <a:rPr lang="en-US" altLang="ja-JP" b="0" i="1" smtClean="0">
+                        <a:latin typeface="Cambria Math" panose="02040503050406030204" pitchFamily="18" charset="0"/>
+                        <a:ea typeface="M+ 1p light" panose="020B0402020203020204" pitchFamily="50" charset="-128"/>
+                        <a:cs typeface="M+ 1p light" panose="020B0402020203020204" pitchFamily="50" charset="-128"/>
+                      </a:rPr>
+                      <m:t>𝑑</m:t>
+                    </m:r>
+                    <m:r>
+                      <a:rPr lang="ja-JP" altLang="en-US" i="1">
+                        <a:latin typeface="Cambria Math" panose="02040503050406030204" pitchFamily="18" charset="0"/>
+                        <a:ea typeface="M+ 1p light" panose="020B0402020203020204" pitchFamily="50" charset="-128"/>
+                        <a:cs typeface="M+ 1p light" panose="020B0402020203020204" pitchFamily="50" charset="-128"/>
+                      </a:rPr>
+                      <m:t>を</m:t>
+                    </m:r>
+                    <m:r>
+                      <a:rPr lang="en-US" altLang="ja-JP" b="0" i="1" smtClean="0">
+                        <a:latin typeface="Cambria Math" panose="02040503050406030204" pitchFamily="18" charset="0"/>
+                        <a:ea typeface="M+ 1p light" panose="020B0402020203020204" pitchFamily="50" charset="-128"/>
+                        <a:cs typeface="M+ 1p light" panose="020B0402020203020204" pitchFamily="50" charset="-128"/>
+                      </a:rPr>
+                      <m:t>𝐴</m:t>
+                    </m:r>
+                    <m:r>
+                      <a:rPr lang="ja-JP" altLang="en-US" i="1">
+                        <a:latin typeface="Cambria Math" panose="02040503050406030204" pitchFamily="18" charset="0"/>
+                        <a:ea typeface="M+ 1p light" panose="020B0402020203020204" pitchFamily="50" charset="-128"/>
+                        <a:cs typeface="M+ 1p light" panose="020B0402020203020204" pitchFamily="50" charset="-128"/>
+                      </a:rPr>
+                      <m:t>の</m:t>
+                    </m:r>
+                  </m:oMath>
+                </a14:m>
+                <a:r>
+                  <a:rPr lang="ja-JP" altLang="en-US" dirty="0">
+                    <a:latin typeface="M+ 1p light" panose="020B0402020203020204" pitchFamily="50" charset="-128"/>
+                    <a:ea typeface="M+ 1p light" panose="020B0402020203020204" pitchFamily="50" charset="-128"/>
+                    <a:cs typeface="M+ 1p light" panose="020B0402020203020204" pitchFamily="50" charset="-128"/>
+                  </a:rPr>
+                  <a:t>距離という</a:t>
+                </a:r>
+                <a:r>
+                  <a:rPr lang="en-US" altLang="ja-JP" dirty="0">
+                    <a:latin typeface="M+ 1p light" panose="020B0402020203020204" pitchFamily="50" charset="-128"/>
+                    <a:ea typeface="M+ 1p light" panose="020B0402020203020204" pitchFamily="50" charset="-128"/>
+                    <a:cs typeface="M+ 1p light" panose="020B0402020203020204" pitchFamily="50" charset="-128"/>
+                  </a:rPr>
+                  <a:t>.</a:t>
+                </a:r>
+              </a:p>
+              <a:p>
+                <a:pPr marL="342900" lvl="0">
+                  <a:buAutoNum type="arabicParenR"/>
+                </a:pPr>
+                <a14:m>
+                  <m:oMath xmlns:m="http://schemas.openxmlformats.org/officeDocument/2006/math">
+                    <m:r>
+                      <a:rPr lang="en-US" altLang="ja-JP" sz="1200" i="1">
+                        <a:latin typeface="Cambria Math" panose="02040503050406030204" pitchFamily="18" charset="0"/>
+                        <a:ea typeface="M+ 1p light" panose="020B0402020203020204" pitchFamily="50" charset="-128"/>
+                        <a:cs typeface="M+ 1p light" panose="020B0402020203020204" pitchFamily="50" charset="-128"/>
+                      </a:rPr>
+                      <m:t>𝑑</m:t>
+                    </m:r>
+                    <m:d>
+                      <m:dPr>
+                        <m:ctrlPr>
+                          <a:rPr lang="en-US" altLang="ja-JP" sz="1200" i="1">
+                            <a:latin typeface="Cambria Math" panose="02040503050406030204" pitchFamily="18" charset="0"/>
+                            <a:ea typeface="M+ 1p light" panose="020B0402020203020204" pitchFamily="50" charset="-128"/>
+                            <a:cs typeface="M+ 1p light" panose="020B0402020203020204" pitchFamily="50" charset="-128"/>
+                          </a:rPr>
+                        </m:ctrlPr>
+                      </m:dPr>
+                      <m:e>
+                        <m:r>
+                          <a:rPr lang="en-US" altLang="ja-JP" sz="1200" i="1">
+                            <a:latin typeface="Cambria Math" panose="02040503050406030204" pitchFamily="18" charset="0"/>
+                            <a:ea typeface="M+ 1p light" panose="020B0402020203020204" pitchFamily="50" charset="-128"/>
+                            <a:cs typeface="M+ 1p light" panose="020B0402020203020204" pitchFamily="50" charset="-128"/>
+                          </a:rPr>
+                          <m:t>𝑎</m:t>
+                        </m:r>
+                        <m:r>
+                          <a:rPr lang="en-US" altLang="ja-JP" sz="1200" i="1">
+                            <a:latin typeface="Cambria Math" panose="02040503050406030204" pitchFamily="18" charset="0"/>
+                            <a:ea typeface="M+ 1p light" panose="020B0402020203020204" pitchFamily="50" charset="-128"/>
+                            <a:cs typeface="M+ 1p light" panose="020B0402020203020204" pitchFamily="50" charset="-128"/>
+                          </a:rPr>
+                          <m:t>,</m:t>
+                        </m:r>
+                        <m:r>
+                          <a:rPr lang="en-US" altLang="ja-JP" sz="1200" i="1">
+                            <a:latin typeface="Cambria Math" panose="02040503050406030204" pitchFamily="18" charset="0"/>
+                            <a:ea typeface="M+ 1p light" panose="020B0402020203020204" pitchFamily="50" charset="-128"/>
+                            <a:cs typeface="M+ 1p light" panose="020B0402020203020204" pitchFamily="50" charset="-128"/>
+                          </a:rPr>
+                          <m:t>𝑏</m:t>
+                        </m:r>
+                      </m:e>
+                    </m:d>
+                    <m:r>
+                      <a:rPr lang="en-US" altLang="ja-JP" sz="1200" i="1">
+                        <a:latin typeface="Cambria Math" panose="02040503050406030204" pitchFamily="18" charset="0"/>
+                        <a:ea typeface="M+ 1p light" panose="020B0402020203020204" pitchFamily="50" charset="-128"/>
+                        <a:cs typeface="M+ 1p light" panose="020B0402020203020204" pitchFamily="50" charset="-128"/>
+                      </a:rPr>
+                      <m:t>≥0</m:t>
+                    </m:r>
+                  </m:oMath>
+                </a14:m>
+                <a:endParaRPr lang="en-US" altLang="ja-JP" sz="1200" dirty="0">
+                  <a:latin typeface="M+ 1p light" panose="020B0402020203020204" pitchFamily="50" charset="-128"/>
+                  <a:ea typeface="M+ 1p light" panose="020B0402020203020204" pitchFamily="50" charset="-128"/>
+                  <a:cs typeface="M+ 1p light" panose="020B0402020203020204" pitchFamily="50" charset="-128"/>
+                </a:endParaRPr>
+              </a:p>
+              <a:p>
+                <a:pPr marL="342900" lvl="0">
+                  <a:buAutoNum type="arabicParenR"/>
+                </a:pPr>
+                <a14:m>
+                  <m:oMath xmlns:m="http://schemas.openxmlformats.org/officeDocument/2006/math">
+                    <m:r>
+                      <a:rPr lang="en-US" altLang="ja-JP" sz="1200" b="0" i="1" smtClean="0">
+                        <a:latin typeface="Cambria Math" panose="02040503050406030204" pitchFamily="18" charset="0"/>
+                        <a:ea typeface="M+ 1p light" panose="020B0402020203020204" pitchFamily="50" charset="-128"/>
+                        <a:cs typeface="M+ 1p light" panose="020B0402020203020204" pitchFamily="50" charset="-128"/>
+                      </a:rPr>
+                      <m:t>𝑎</m:t>
+                    </m:r>
+                    <m:r>
+                      <a:rPr lang="en-US" altLang="ja-JP" sz="1200" b="0" i="1" smtClean="0">
+                        <a:latin typeface="Cambria Math" panose="02040503050406030204" pitchFamily="18" charset="0"/>
+                        <a:ea typeface="M+ 1p light" panose="020B0402020203020204" pitchFamily="50" charset="-128"/>
+                        <a:cs typeface="M+ 1p light" panose="020B0402020203020204" pitchFamily="50" charset="-128"/>
+                      </a:rPr>
+                      <m:t>=</m:t>
+                    </m:r>
+                    <m:r>
+                      <a:rPr lang="en-US" altLang="ja-JP" sz="1200" b="0" i="1" smtClean="0">
+                        <a:latin typeface="Cambria Math" panose="02040503050406030204" pitchFamily="18" charset="0"/>
+                        <a:ea typeface="M+ 1p light" panose="020B0402020203020204" pitchFamily="50" charset="-128"/>
+                        <a:cs typeface="M+ 1p light" panose="020B0402020203020204" pitchFamily="50" charset="-128"/>
+                      </a:rPr>
+                      <m:t>𝑏</m:t>
+                    </m:r>
+                    <m:r>
+                      <a:rPr lang="en-US" altLang="ja-JP" sz="1200" b="0" i="1" smtClean="0">
+                        <a:latin typeface="Cambria Math" panose="02040503050406030204" pitchFamily="18" charset="0"/>
+                        <a:ea typeface="M+ 1p light" panose="020B0402020203020204" pitchFamily="50" charset="-128"/>
+                        <a:cs typeface="M+ 1p light" panose="020B0402020203020204" pitchFamily="50" charset="-128"/>
+                      </a:rPr>
+                      <m:t>⇔</m:t>
+                    </m:r>
+                    <m:r>
+                      <a:rPr lang="en-US" altLang="ja-JP" sz="1200" i="1">
+                        <a:latin typeface="Cambria Math" panose="02040503050406030204" pitchFamily="18" charset="0"/>
+                        <a:ea typeface="M+ 1p light" panose="020B0402020203020204" pitchFamily="50" charset="-128"/>
+                        <a:cs typeface="M+ 1p light" panose="020B0402020203020204" pitchFamily="50" charset="-128"/>
+                      </a:rPr>
+                      <m:t>𝑑</m:t>
+                    </m:r>
+                    <m:d>
+                      <m:dPr>
+                        <m:ctrlPr>
+                          <a:rPr lang="en-US" altLang="ja-JP" sz="1200" i="1">
+                            <a:latin typeface="Cambria Math" panose="02040503050406030204" pitchFamily="18" charset="0"/>
+                            <a:ea typeface="M+ 1p light" panose="020B0402020203020204" pitchFamily="50" charset="-128"/>
+                            <a:cs typeface="M+ 1p light" panose="020B0402020203020204" pitchFamily="50" charset="-128"/>
+                          </a:rPr>
+                        </m:ctrlPr>
+                      </m:dPr>
+                      <m:e>
+                        <m:r>
+                          <a:rPr lang="en-US" altLang="ja-JP" sz="1200" i="1">
+                            <a:latin typeface="Cambria Math" panose="02040503050406030204" pitchFamily="18" charset="0"/>
+                            <a:ea typeface="M+ 1p light" panose="020B0402020203020204" pitchFamily="50" charset="-128"/>
+                            <a:cs typeface="M+ 1p light" panose="020B0402020203020204" pitchFamily="50" charset="-128"/>
+                          </a:rPr>
+                          <m:t>𝑎</m:t>
+                        </m:r>
+                        <m:r>
+                          <a:rPr lang="en-US" altLang="ja-JP" sz="1200" i="1">
+                            <a:latin typeface="Cambria Math" panose="02040503050406030204" pitchFamily="18" charset="0"/>
+                            <a:ea typeface="M+ 1p light" panose="020B0402020203020204" pitchFamily="50" charset="-128"/>
+                            <a:cs typeface="M+ 1p light" panose="020B0402020203020204" pitchFamily="50" charset="-128"/>
+                          </a:rPr>
+                          <m:t>,</m:t>
+                        </m:r>
+                        <m:r>
+                          <a:rPr lang="en-US" altLang="ja-JP" sz="1200" b="0" i="1" smtClean="0">
+                            <a:latin typeface="Cambria Math" panose="02040503050406030204" pitchFamily="18" charset="0"/>
+                            <a:ea typeface="M+ 1p light" panose="020B0402020203020204" pitchFamily="50" charset="-128"/>
+                            <a:cs typeface="M+ 1p light" panose="020B0402020203020204" pitchFamily="50" charset="-128"/>
+                          </a:rPr>
+                          <m:t>𝑏</m:t>
+                        </m:r>
+                      </m:e>
+                    </m:d>
+                    <m:r>
+                      <a:rPr lang="en-US" altLang="ja-JP" sz="1200" i="1">
+                        <a:latin typeface="Cambria Math" panose="02040503050406030204" pitchFamily="18" charset="0"/>
+                        <a:ea typeface="M+ 1p light" panose="020B0402020203020204" pitchFamily="50" charset="-128"/>
+                        <a:cs typeface="M+ 1p light" panose="020B0402020203020204" pitchFamily="50" charset="-128"/>
+                      </a:rPr>
+                      <m:t>=0</m:t>
+                    </m:r>
+                  </m:oMath>
+                </a14:m>
+                <a:endParaRPr lang="en-US" altLang="ja-JP" sz="1200" dirty="0">
+                  <a:latin typeface="M+ 1p light" panose="020B0402020203020204" pitchFamily="50" charset="-128"/>
+                  <a:ea typeface="M+ 1p light" panose="020B0402020203020204" pitchFamily="50" charset="-128"/>
+                  <a:cs typeface="M+ 1p light" panose="020B0402020203020204" pitchFamily="50" charset="-128"/>
+                </a:endParaRPr>
+              </a:p>
+              <a:p>
+                <a:pPr marL="342900" lvl="0">
+                  <a:buAutoNum type="arabicParenR"/>
+                </a:pPr>
+                <a14:m>
+                  <m:oMath xmlns:m="http://schemas.openxmlformats.org/officeDocument/2006/math">
+                    <m:r>
+                      <a:rPr lang="en-US" altLang="ja-JP" sz="1200" i="1">
+                        <a:latin typeface="Cambria Math" panose="02040503050406030204" pitchFamily="18" charset="0"/>
+                        <a:ea typeface="M+ 1p light" panose="020B0402020203020204" pitchFamily="50" charset="-128"/>
+                        <a:cs typeface="M+ 1p light" panose="020B0402020203020204" pitchFamily="50" charset="-128"/>
+                      </a:rPr>
+                      <m:t>𝑑</m:t>
+                    </m:r>
+                    <m:d>
+                      <m:dPr>
+                        <m:ctrlPr>
+                          <a:rPr lang="en-US" altLang="ja-JP" sz="1200" i="1">
+                            <a:latin typeface="Cambria Math" panose="02040503050406030204" pitchFamily="18" charset="0"/>
+                            <a:ea typeface="M+ 1p light" panose="020B0402020203020204" pitchFamily="50" charset="-128"/>
+                            <a:cs typeface="M+ 1p light" panose="020B0402020203020204" pitchFamily="50" charset="-128"/>
+                          </a:rPr>
+                        </m:ctrlPr>
+                      </m:dPr>
+                      <m:e>
+                        <m:r>
+                          <a:rPr lang="en-US" altLang="ja-JP" sz="1200" i="1">
+                            <a:latin typeface="Cambria Math" panose="02040503050406030204" pitchFamily="18" charset="0"/>
+                            <a:ea typeface="M+ 1p light" panose="020B0402020203020204" pitchFamily="50" charset="-128"/>
+                            <a:cs typeface="M+ 1p light" panose="020B0402020203020204" pitchFamily="50" charset="-128"/>
+                          </a:rPr>
+                          <m:t>𝑎</m:t>
+                        </m:r>
+                        <m:r>
+                          <a:rPr lang="en-US" altLang="ja-JP" sz="1200" i="1">
+                            <a:latin typeface="Cambria Math" panose="02040503050406030204" pitchFamily="18" charset="0"/>
+                            <a:ea typeface="M+ 1p light" panose="020B0402020203020204" pitchFamily="50" charset="-128"/>
+                            <a:cs typeface="M+ 1p light" panose="020B0402020203020204" pitchFamily="50" charset="-128"/>
+                          </a:rPr>
+                          <m:t>,</m:t>
+                        </m:r>
+                        <m:r>
+                          <a:rPr lang="en-US" altLang="ja-JP" sz="1200" i="1">
+                            <a:latin typeface="Cambria Math" panose="02040503050406030204" pitchFamily="18" charset="0"/>
+                            <a:ea typeface="M+ 1p light" panose="020B0402020203020204" pitchFamily="50" charset="-128"/>
+                            <a:cs typeface="M+ 1p light" panose="020B0402020203020204" pitchFamily="50" charset="-128"/>
+                          </a:rPr>
+                          <m:t>𝑏</m:t>
+                        </m:r>
+                      </m:e>
+                    </m:d>
+                    <m:r>
+                      <a:rPr lang="en-US" altLang="ja-JP" sz="1200" i="1">
+                        <a:latin typeface="Cambria Math" panose="02040503050406030204" pitchFamily="18" charset="0"/>
+                        <a:ea typeface="M+ 1p light" panose="020B0402020203020204" pitchFamily="50" charset="-128"/>
+                        <a:cs typeface="M+ 1p light" panose="020B0402020203020204" pitchFamily="50" charset="-128"/>
+                      </a:rPr>
+                      <m:t>=</m:t>
+                    </m:r>
+                    <m:r>
+                      <a:rPr lang="en-US" altLang="ja-JP" sz="1200" i="1">
+                        <a:latin typeface="Cambria Math" panose="02040503050406030204" pitchFamily="18" charset="0"/>
+                        <a:ea typeface="M+ 1p light" panose="020B0402020203020204" pitchFamily="50" charset="-128"/>
+                        <a:cs typeface="M+ 1p light" panose="020B0402020203020204" pitchFamily="50" charset="-128"/>
+                      </a:rPr>
+                      <m:t>𝑑</m:t>
+                    </m:r>
+                    <m:r>
+                      <a:rPr lang="en-US" altLang="ja-JP" sz="1200" i="1">
+                        <a:latin typeface="Cambria Math" panose="02040503050406030204" pitchFamily="18" charset="0"/>
+                        <a:ea typeface="M+ 1p light" panose="020B0402020203020204" pitchFamily="50" charset="-128"/>
+                        <a:cs typeface="M+ 1p light" panose="020B0402020203020204" pitchFamily="50" charset="-128"/>
+                      </a:rPr>
+                      <m:t>(</m:t>
+                    </m:r>
+                    <m:r>
+                      <a:rPr lang="en-US" altLang="ja-JP" sz="1200" i="1">
+                        <a:latin typeface="Cambria Math" panose="02040503050406030204" pitchFamily="18" charset="0"/>
+                        <a:ea typeface="M+ 1p light" panose="020B0402020203020204" pitchFamily="50" charset="-128"/>
+                        <a:cs typeface="M+ 1p light" panose="020B0402020203020204" pitchFamily="50" charset="-128"/>
+                      </a:rPr>
+                      <m:t>𝑏</m:t>
+                    </m:r>
+                    <m:r>
+                      <a:rPr lang="en-US" altLang="ja-JP" sz="1200" i="1">
+                        <a:latin typeface="Cambria Math" panose="02040503050406030204" pitchFamily="18" charset="0"/>
+                        <a:ea typeface="M+ 1p light" panose="020B0402020203020204" pitchFamily="50" charset="-128"/>
+                        <a:cs typeface="M+ 1p light" panose="020B0402020203020204" pitchFamily="50" charset="-128"/>
+                      </a:rPr>
+                      <m:t>,</m:t>
+                    </m:r>
+                    <m:r>
+                      <a:rPr lang="en-US" altLang="ja-JP" sz="1200" i="1">
+                        <a:latin typeface="Cambria Math" panose="02040503050406030204" pitchFamily="18" charset="0"/>
+                        <a:ea typeface="M+ 1p light" panose="020B0402020203020204" pitchFamily="50" charset="-128"/>
+                        <a:cs typeface="M+ 1p light" panose="020B0402020203020204" pitchFamily="50" charset="-128"/>
+                      </a:rPr>
+                      <m:t>𝑎</m:t>
+                    </m:r>
+                    <m:r>
+                      <a:rPr lang="en-US" altLang="ja-JP" sz="1200" i="1">
+                        <a:latin typeface="Cambria Math" panose="02040503050406030204" pitchFamily="18" charset="0"/>
+                        <a:ea typeface="M+ 1p light" panose="020B0402020203020204" pitchFamily="50" charset="-128"/>
+                        <a:cs typeface="M+ 1p light" panose="020B0402020203020204" pitchFamily="50" charset="-128"/>
+                      </a:rPr>
+                      <m:t>)</m:t>
+                    </m:r>
+                  </m:oMath>
+                </a14:m>
+                <a:endParaRPr lang="en-US" altLang="ja-JP" sz="1200" dirty="0">
+                  <a:latin typeface="M+ 1p light" panose="020B0402020203020204" pitchFamily="50" charset="-128"/>
+                  <a:ea typeface="M+ 1p light" panose="020B0402020203020204" pitchFamily="50" charset="-128"/>
+                  <a:cs typeface="M+ 1p light" panose="020B0402020203020204" pitchFamily="50" charset="-128"/>
+                </a:endParaRPr>
+              </a:p>
+              <a:p>
+                <a:pPr marL="342900" lvl="0">
+                  <a:buAutoNum type="arabicParenR"/>
+                </a:pPr>
+                <a14:m>
+                  <m:oMath xmlns:m="http://schemas.openxmlformats.org/officeDocument/2006/math">
+                    <m:r>
+                      <a:rPr lang="en-US" altLang="ja-JP" sz="1200" i="1">
+                        <a:latin typeface="Cambria Math" panose="02040503050406030204" pitchFamily="18" charset="0"/>
+                        <a:ea typeface="M+ 1p light" panose="020B0402020203020204" pitchFamily="50" charset="-128"/>
+                        <a:cs typeface="M+ 1p light" panose="020B0402020203020204" pitchFamily="50" charset="-128"/>
+                      </a:rPr>
+                      <m:t>𝑑</m:t>
+                    </m:r>
+                    <m:d>
+                      <m:dPr>
+                        <m:ctrlPr>
+                          <a:rPr lang="en-US" altLang="ja-JP" sz="1200" i="1">
+                            <a:latin typeface="Cambria Math" panose="02040503050406030204" pitchFamily="18" charset="0"/>
+                            <a:ea typeface="M+ 1p light" panose="020B0402020203020204" pitchFamily="50" charset="-128"/>
+                            <a:cs typeface="M+ 1p light" panose="020B0402020203020204" pitchFamily="50" charset="-128"/>
+                          </a:rPr>
+                        </m:ctrlPr>
+                      </m:dPr>
+                      <m:e>
+                        <m:r>
+                          <a:rPr lang="en-US" altLang="ja-JP" sz="1200" i="1">
+                            <a:latin typeface="Cambria Math" panose="02040503050406030204" pitchFamily="18" charset="0"/>
+                            <a:ea typeface="M+ 1p light" panose="020B0402020203020204" pitchFamily="50" charset="-128"/>
+                            <a:cs typeface="M+ 1p light" panose="020B0402020203020204" pitchFamily="50" charset="-128"/>
+                          </a:rPr>
+                          <m:t>𝑎</m:t>
+                        </m:r>
+                        <m:r>
+                          <a:rPr lang="en-US" altLang="ja-JP" sz="1200" i="1">
+                            <a:latin typeface="Cambria Math" panose="02040503050406030204" pitchFamily="18" charset="0"/>
+                            <a:ea typeface="M+ 1p light" panose="020B0402020203020204" pitchFamily="50" charset="-128"/>
+                            <a:cs typeface="M+ 1p light" panose="020B0402020203020204" pitchFamily="50" charset="-128"/>
+                          </a:rPr>
+                          <m:t>,</m:t>
+                        </m:r>
+                        <m:r>
+                          <a:rPr lang="en-US" altLang="ja-JP" sz="1200" i="1">
+                            <a:latin typeface="Cambria Math" panose="02040503050406030204" pitchFamily="18" charset="0"/>
+                            <a:ea typeface="M+ 1p light" panose="020B0402020203020204" pitchFamily="50" charset="-128"/>
+                            <a:cs typeface="M+ 1p light" panose="020B0402020203020204" pitchFamily="50" charset="-128"/>
+                          </a:rPr>
+                          <m:t>𝑏</m:t>
+                        </m:r>
+                      </m:e>
+                    </m:d>
+                    <m:r>
+                      <a:rPr lang="en-US" altLang="ja-JP" sz="1200" i="1">
+                        <a:latin typeface="Cambria Math" panose="02040503050406030204" pitchFamily="18" charset="0"/>
+                        <a:ea typeface="M+ 1p light" panose="020B0402020203020204" pitchFamily="50" charset="-128"/>
+                        <a:cs typeface="M+ 1p light" panose="020B0402020203020204" pitchFamily="50" charset="-128"/>
+                      </a:rPr>
+                      <m:t>+</m:t>
+                    </m:r>
+                    <m:r>
+                      <a:rPr lang="en-US" altLang="ja-JP" sz="1200" i="1">
+                        <a:latin typeface="Cambria Math" panose="02040503050406030204" pitchFamily="18" charset="0"/>
+                        <a:ea typeface="M+ 1p light" panose="020B0402020203020204" pitchFamily="50" charset="-128"/>
+                        <a:cs typeface="M+ 1p light" panose="020B0402020203020204" pitchFamily="50" charset="-128"/>
+                      </a:rPr>
+                      <m:t>𝑑</m:t>
+                    </m:r>
+                    <m:d>
+                      <m:dPr>
+                        <m:ctrlPr>
+                          <a:rPr lang="en-US" altLang="ja-JP" sz="1200" i="1">
+                            <a:latin typeface="Cambria Math" panose="02040503050406030204" pitchFamily="18" charset="0"/>
+                            <a:ea typeface="M+ 1p light" panose="020B0402020203020204" pitchFamily="50" charset="-128"/>
+                            <a:cs typeface="M+ 1p light" panose="020B0402020203020204" pitchFamily="50" charset="-128"/>
+                          </a:rPr>
+                        </m:ctrlPr>
+                      </m:dPr>
+                      <m:e>
+                        <m:r>
+                          <a:rPr lang="en-US" altLang="ja-JP" sz="1200" i="1">
+                            <a:latin typeface="Cambria Math" panose="02040503050406030204" pitchFamily="18" charset="0"/>
+                            <a:ea typeface="M+ 1p light" panose="020B0402020203020204" pitchFamily="50" charset="-128"/>
+                            <a:cs typeface="M+ 1p light" panose="020B0402020203020204" pitchFamily="50" charset="-128"/>
+                          </a:rPr>
+                          <m:t>𝑎</m:t>
+                        </m:r>
+                        <m:r>
+                          <a:rPr lang="en-US" altLang="ja-JP" sz="1200" i="1">
+                            <a:latin typeface="Cambria Math" panose="02040503050406030204" pitchFamily="18" charset="0"/>
+                            <a:ea typeface="M+ 1p light" panose="020B0402020203020204" pitchFamily="50" charset="-128"/>
+                            <a:cs typeface="M+ 1p light" panose="020B0402020203020204" pitchFamily="50" charset="-128"/>
+                          </a:rPr>
+                          <m:t>,</m:t>
+                        </m:r>
+                        <m:r>
+                          <a:rPr lang="en-US" altLang="ja-JP" sz="1200" i="1">
+                            <a:latin typeface="Cambria Math" panose="02040503050406030204" pitchFamily="18" charset="0"/>
+                            <a:ea typeface="M+ 1p light" panose="020B0402020203020204" pitchFamily="50" charset="-128"/>
+                            <a:cs typeface="M+ 1p light" panose="020B0402020203020204" pitchFamily="50" charset="-128"/>
+                          </a:rPr>
+                          <m:t>𝑐</m:t>
+                        </m:r>
+                      </m:e>
+                    </m:d>
+                    <m:r>
+                      <a:rPr lang="en-US" altLang="ja-JP" sz="1200" i="1">
+                        <a:latin typeface="Cambria Math" panose="02040503050406030204" pitchFamily="18" charset="0"/>
+                        <a:ea typeface="M+ 1p light" panose="020B0402020203020204" pitchFamily="50" charset="-128"/>
+                        <a:cs typeface="M+ 1p light" panose="020B0402020203020204" pitchFamily="50" charset="-128"/>
+                      </a:rPr>
+                      <m:t>≥</m:t>
+                    </m:r>
+                    <m:r>
+                      <a:rPr lang="en-US" altLang="ja-JP" sz="1200" i="1">
+                        <a:latin typeface="Cambria Math" panose="02040503050406030204" pitchFamily="18" charset="0"/>
+                        <a:ea typeface="M+ 1p light" panose="020B0402020203020204" pitchFamily="50" charset="-128"/>
+                        <a:cs typeface="M+ 1p light" panose="020B0402020203020204" pitchFamily="50" charset="-128"/>
+                      </a:rPr>
+                      <m:t>𝑑</m:t>
+                    </m:r>
+                    <m:r>
+                      <a:rPr lang="en-US" altLang="ja-JP" sz="1200" i="1">
+                        <a:latin typeface="Cambria Math" panose="02040503050406030204" pitchFamily="18" charset="0"/>
+                        <a:ea typeface="M+ 1p light" panose="020B0402020203020204" pitchFamily="50" charset="-128"/>
+                        <a:cs typeface="M+ 1p light" panose="020B0402020203020204" pitchFamily="50" charset="-128"/>
+                      </a:rPr>
+                      <m:t>(</m:t>
+                    </m:r>
+                    <m:r>
+                      <a:rPr lang="en-US" altLang="ja-JP" sz="1200" i="1">
+                        <a:latin typeface="Cambria Math" panose="02040503050406030204" pitchFamily="18" charset="0"/>
+                        <a:ea typeface="M+ 1p light" panose="020B0402020203020204" pitchFamily="50" charset="-128"/>
+                        <a:cs typeface="M+ 1p light" panose="020B0402020203020204" pitchFamily="50" charset="-128"/>
+                      </a:rPr>
+                      <m:t>𝑎</m:t>
+                    </m:r>
+                    <m:r>
+                      <a:rPr lang="en-US" altLang="ja-JP" sz="1200" i="1">
+                        <a:latin typeface="Cambria Math" panose="02040503050406030204" pitchFamily="18" charset="0"/>
+                        <a:ea typeface="M+ 1p light" panose="020B0402020203020204" pitchFamily="50" charset="-128"/>
+                        <a:cs typeface="M+ 1p light" panose="020B0402020203020204" pitchFamily="50" charset="-128"/>
+                      </a:rPr>
+                      <m:t>,</m:t>
+                    </m:r>
+                    <m:r>
+                      <a:rPr lang="en-US" altLang="ja-JP" sz="1200" i="1">
+                        <a:latin typeface="Cambria Math" panose="02040503050406030204" pitchFamily="18" charset="0"/>
+                        <a:ea typeface="M+ 1p light" panose="020B0402020203020204" pitchFamily="50" charset="-128"/>
+                        <a:cs typeface="M+ 1p light" panose="020B0402020203020204" pitchFamily="50" charset="-128"/>
+                      </a:rPr>
+                      <m:t>𝑐</m:t>
+                    </m:r>
+                    <m:r>
+                      <a:rPr lang="en-US" altLang="ja-JP" sz="1200" i="1">
+                        <a:latin typeface="Cambria Math" panose="02040503050406030204" pitchFamily="18" charset="0"/>
+                        <a:ea typeface="M+ 1p light" panose="020B0402020203020204" pitchFamily="50" charset="-128"/>
+                        <a:cs typeface="M+ 1p light" panose="020B0402020203020204" pitchFamily="50" charset="-128"/>
+                      </a:rPr>
+                      <m:t>)(</m:t>
+                    </m:r>
+                    <m:r>
+                      <a:rPr lang="ja-JP" altLang="en-US" sz="1200" i="1">
+                        <a:latin typeface="Cambria Math" panose="02040503050406030204" pitchFamily="18" charset="0"/>
+                        <a:ea typeface="M+ 1p light" panose="020B0402020203020204" pitchFamily="50" charset="-128"/>
+                        <a:cs typeface="M+ 1p light" panose="020B0402020203020204" pitchFamily="50" charset="-128"/>
+                      </a:rPr>
+                      <m:t>三角不等式</m:t>
+                    </m:r>
+                    <m:r>
+                      <a:rPr lang="en-US" altLang="ja-JP" sz="1200" b="0" i="1" smtClean="0">
+                        <a:latin typeface="Cambria Math" panose="02040503050406030204" pitchFamily="18" charset="0"/>
+                        <a:ea typeface="M+ 1p light" panose="020B0402020203020204" pitchFamily="50" charset="-128"/>
+                        <a:cs typeface="M+ 1p light" panose="020B0402020203020204" pitchFamily="50" charset="-128"/>
+                      </a:rPr>
+                      <m:t>)</m:t>
+                    </m:r>
+                  </m:oMath>
+                </a14:m>
+                <a:endParaRPr lang="en-US" altLang="ja-JP" dirty="0">
+                  <a:latin typeface="M+ 1p light" panose="020B0402020203020204" pitchFamily="50" charset="-128"/>
+                  <a:ea typeface="M+ 1p light" panose="020B0402020203020204" pitchFamily="50" charset="-128"/>
+                  <a:cs typeface="M+ 1p light" panose="020B0402020203020204" pitchFamily="50" charset="-128"/>
+                </a:endParaRPr>
+              </a:p>
+              <a:p>
+                <a:pPr marL="0" lvl="0" indent="0">
+                  <a:buNone/>
+                </a:pPr>
+                <a:r>
+                  <a:rPr lang="ja-JP" altLang="en-US" dirty="0">
+                    <a:latin typeface="M+ 1p light" panose="020B0402020203020204" pitchFamily="50" charset="-128"/>
+                    <a:ea typeface="M+ 1p light" panose="020B0402020203020204" pitchFamily="50" charset="-128"/>
+                    <a:cs typeface="M+ 1p light" panose="020B0402020203020204" pitchFamily="50" charset="-128"/>
+                  </a:rPr>
+                  <a:t>距離空間</a:t>
+                </a:r>
+                <a:r>
+                  <a:rPr lang="en-US" altLang="ja-JP" dirty="0">
+                    <a:latin typeface="M+ 1p light" panose="020B0402020203020204" pitchFamily="50" charset="-128"/>
+                    <a:ea typeface="M+ 1p light" panose="020B0402020203020204" pitchFamily="50" charset="-128"/>
+                    <a:cs typeface="M+ 1p light" panose="020B0402020203020204" pitchFamily="50" charset="-128"/>
+                  </a:rPr>
+                  <a:t>: </a:t>
+                </a:r>
+                <a14:m>
+                  <m:oMath xmlns:m="http://schemas.openxmlformats.org/officeDocument/2006/math">
+                    <m:r>
+                      <a:rPr lang="en-US" altLang="ja-JP" b="0" i="1" smtClean="0">
+                        <a:latin typeface="Cambria Math" panose="02040503050406030204" pitchFamily="18" charset="0"/>
+                        <a:ea typeface="M+ 1p light" panose="020B0402020203020204" pitchFamily="50" charset="-128"/>
+                        <a:cs typeface="M+ 1p light" panose="020B0402020203020204" pitchFamily="50" charset="-128"/>
+                      </a:rPr>
+                      <m:t>(</m:t>
+                    </m:r>
+                    <m:r>
+                      <a:rPr lang="en-US" altLang="ja-JP" b="0" i="1" smtClean="0">
+                        <a:latin typeface="Cambria Math" panose="02040503050406030204" pitchFamily="18" charset="0"/>
+                        <a:ea typeface="M+ 1p light" panose="020B0402020203020204" pitchFamily="50" charset="-128"/>
+                        <a:cs typeface="M+ 1p light" panose="020B0402020203020204" pitchFamily="50" charset="-128"/>
+                      </a:rPr>
+                      <m:t>𝐴</m:t>
+                    </m:r>
+                    <m:r>
+                      <a:rPr lang="en-US" altLang="ja-JP" b="0" i="1" smtClean="0">
+                        <a:latin typeface="Cambria Math" panose="02040503050406030204" pitchFamily="18" charset="0"/>
+                        <a:ea typeface="M+ 1p light" panose="020B0402020203020204" pitchFamily="50" charset="-128"/>
+                        <a:cs typeface="M+ 1p light" panose="020B0402020203020204" pitchFamily="50" charset="-128"/>
+                      </a:rPr>
+                      <m:t>, </m:t>
+                    </m:r>
+                    <m:r>
+                      <a:rPr lang="en-US" altLang="ja-JP" b="0" i="1" smtClean="0">
+                        <a:latin typeface="Cambria Math" panose="02040503050406030204" pitchFamily="18" charset="0"/>
+                        <a:ea typeface="M+ 1p light" panose="020B0402020203020204" pitchFamily="50" charset="-128"/>
+                        <a:cs typeface="M+ 1p light" panose="020B0402020203020204" pitchFamily="50" charset="-128"/>
+                      </a:rPr>
+                      <m:t>𝑑</m:t>
+                    </m:r>
+                    <m:r>
+                      <a:rPr lang="en-US" altLang="ja-JP" b="0" i="1" smtClean="0">
+                        <a:latin typeface="Cambria Math" panose="02040503050406030204" pitchFamily="18" charset="0"/>
+                        <a:ea typeface="M+ 1p light" panose="020B0402020203020204" pitchFamily="50" charset="-128"/>
+                        <a:cs typeface="M+ 1p light" panose="020B0402020203020204" pitchFamily="50" charset="-128"/>
+                      </a:rPr>
+                      <m:t>)</m:t>
+                    </m:r>
+                    <m:r>
+                      <a:rPr lang="ja-JP" altLang="en-US" i="1">
+                        <a:latin typeface="Cambria Math" panose="02040503050406030204" pitchFamily="18" charset="0"/>
+                        <a:ea typeface="M+ 1p light" panose="020B0402020203020204" pitchFamily="50" charset="-128"/>
+                        <a:cs typeface="M+ 1p light" panose="020B0402020203020204" pitchFamily="50" charset="-128"/>
+                      </a:rPr>
+                      <m:t>の</m:t>
+                    </m:r>
+                  </m:oMath>
+                </a14:m>
+                <a:r>
+                  <a:rPr lang="ja-JP" altLang="en-US" dirty="0">
+                    <a:latin typeface="M+ 1p light" panose="020B0402020203020204" pitchFamily="50" charset="-128"/>
+                    <a:ea typeface="M+ 1p light" panose="020B0402020203020204" pitchFamily="50" charset="-128"/>
+                    <a:cs typeface="M+ 1p light" panose="020B0402020203020204" pitchFamily="50" charset="-128"/>
+                  </a:rPr>
+                  <a:t>組み合わせの事を距離空間という</a:t>
+                </a:r>
+                <a:r>
+                  <a:rPr lang="en-US" altLang="ja-JP" dirty="0">
+                    <a:latin typeface="M+ 1p light" panose="020B0402020203020204" pitchFamily="50" charset="-128"/>
+                    <a:ea typeface="M+ 1p light" panose="020B0402020203020204" pitchFamily="50" charset="-128"/>
+                    <a:cs typeface="M+ 1p light" panose="020B0402020203020204" pitchFamily="50" charset="-128"/>
+                  </a:rPr>
+                  <a:t>.</a:t>
+                </a:r>
+              </a:p>
+              <a:p>
+                <a:pPr marL="0" lvl="0" indent="0">
+                  <a:buNone/>
+                </a:pPr>
+                <a:endParaRPr lang="en-US" altLang="ja-JP" dirty="0">
+                  <a:latin typeface="M+ 1p light" panose="020B0402020203020204" pitchFamily="50" charset="-128"/>
+                  <a:ea typeface="M+ 1p light" panose="020B0402020203020204" pitchFamily="50" charset="-128"/>
+                  <a:cs typeface="M+ 1p light" panose="020B0402020203020204" pitchFamily="50" charset="-128"/>
+                </a:endParaRPr>
+              </a:p>
+              <a:p>
+                <a:pPr marL="0" lvl="0" indent="0">
+                  <a:buNone/>
+                </a:pPr>
+                <a:r>
+                  <a:rPr lang="ja-JP" altLang="en-US" dirty="0">
+                    <a:latin typeface="M+ 1p light" panose="020B0402020203020204" pitchFamily="50" charset="-128"/>
+                    <a:ea typeface="M+ 1p light" panose="020B0402020203020204" pitchFamily="50" charset="-128"/>
+                    <a:cs typeface="M+ 1p light" panose="020B0402020203020204" pitchFamily="50" charset="-128"/>
+                  </a:rPr>
+                  <a:t>よってユークリッド距離の定義されたユークリッド空間は</a:t>
+                </a:r>
+                <a:endParaRPr lang="en-US" altLang="ja-JP" dirty="0">
+                  <a:latin typeface="M+ 1p light" panose="020B0402020203020204" pitchFamily="50" charset="-128"/>
+                  <a:ea typeface="M+ 1p light" panose="020B0402020203020204" pitchFamily="50" charset="-128"/>
+                  <a:cs typeface="M+ 1p light" panose="020B0402020203020204" pitchFamily="50" charset="-128"/>
+                </a:endParaRPr>
+              </a:p>
+              <a:p>
+                <a:pPr marL="0" indent="0">
+                  <a:buNone/>
+                </a:pPr>
+                <a14:m>
+                  <m:oMathPara xmlns:m="http://schemas.openxmlformats.org/officeDocument/2006/math">
+                    <m:oMathParaPr>
+                      <m:jc m:val="centerGroup"/>
+                    </m:oMathParaPr>
+                    <m:oMath xmlns:m="http://schemas.openxmlformats.org/officeDocument/2006/math">
+                      <m:d>
+                        <m:dPr>
+                          <m:ctrlPr>
+                            <a:rPr lang="en-US" altLang="ja-JP" sz="1400" b="0" i="1" smtClean="0">
+                              <a:latin typeface="Cambria Math" panose="02040503050406030204" pitchFamily="18" charset="0"/>
+                              <a:ea typeface="M+ 1p light" panose="020B0402020203020204" pitchFamily="50" charset="-128"/>
+                              <a:cs typeface="M+ 1p light" panose="020B0402020203020204" pitchFamily="50" charset="-128"/>
+                            </a:rPr>
+                          </m:ctrlPr>
+                        </m:dPr>
+                        <m:e>
+                          <m:sSup>
+                            <m:sSupPr>
+                              <m:ctrlPr>
+                                <a:rPr lang="en-US" altLang="ja-JP" sz="1400" b="0" i="1" smtClean="0">
+                                  <a:latin typeface="Cambria Math" panose="02040503050406030204" pitchFamily="18" charset="0"/>
+                                  <a:ea typeface="M+ 1p light" panose="020B0402020203020204" pitchFamily="50" charset="-128"/>
+                                  <a:cs typeface="M+ 1p light" panose="020B0402020203020204" pitchFamily="50" charset="-128"/>
+                                </a:rPr>
+                              </m:ctrlPr>
+                            </m:sSupPr>
+                            <m:e>
+                              <m:r>
+                                <a:rPr lang="en-US" altLang="ja-JP" sz="1400" b="0" i="1" smtClean="0">
+                                  <a:latin typeface="Cambria Math" panose="02040503050406030204" pitchFamily="18" charset="0"/>
+                                  <a:ea typeface="M+ 1p light" panose="020B0402020203020204" pitchFamily="50" charset="-128"/>
+                                  <a:cs typeface="M+ 1p light" panose="020B0402020203020204" pitchFamily="50" charset="-128"/>
+                                </a:rPr>
+                                <m:t>ℝ</m:t>
+                              </m:r>
+                            </m:e>
+                            <m:sup>
+                              <m:r>
+                                <a:rPr lang="en-US" altLang="ja-JP" sz="1400" b="0" i="1" smtClean="0">
+                                  <a:latin typeface="Cambria Math" panose="02040503050406030204" pitchFamily="18" charset="0"/>
+                                  <a:ea typeface="M+ 1p light" panose="020B0402020203020204" pitchFamily="50" charset="-128"/>
+                                  <a:cs typeface="M+ 1p light" panose="020B0402020203020204" pitchFamily="50" charset="-128"/>
+                                </a:rPr>
+                                <m:t>2</m:t>
+                              </m:r>
+                            </m:sup>
+                          </m:sSup>
+                          <m:r>
+                            <a:rPr lang="en-US" altLang="ja-JP" sz="1400" b="0" i="1" smtClean="0">
+                              <a:latin typeface="Cambria Math" panose="02040503050406030204" pitchFamily="18" charset="0"/>
+                              <a:ea typeface="M+ 1p light" panose="020B0402020203020204" pitchFamily="50" charset="-128"/>
+                              <a:cs typeface="M+ 1p light" panose="020B0402020203020204" pitchFamily="50" charset="-128"/>
+                            </a:rPr>
+                            <m:t>, </m:t>
+                          </m:r>
+                          <m:r>
+                            <a:rPr lang="en-US" altLang="ja-JP" sz="1400" b="0" i="1" smtClean="0">
+                              <a:latin typeface="Cambria Math" panose="02040503050406030204" pitchFamily="18" charset="0"/>
+                              <a:ea typeface="M+ 1p light" panose="020B0402020203020204" pitchFamily="50" charset="-128"/>
+                              <a:cs typeface="M+ 1p light" panose="020B0402020203020204" pitchFamily="50" charset="-128"/>
+                            </a:rPr>
+                            <m:t>𝑑</m:t>
+                          </m:r>
+                        </m:e>
+                      </m:d>
+                      <m:r>
+                        <a:rPr lang="ja-JP" altLang="en-US" sz="1400" i="1">
+                          <a:latin typeface="Cambria Math" panose="02040503050406030204" pitchFamily="18" charset="0"/>
+                          <a:ea typeface="M+ 1p light" panose="020B0402020203020204" pitchFamily="50" charset="-128"/>
+                          <a:cs typeface="M+ 1p light" panose="020B0402020203020204" pitchFamily="50" charset="-128"/>
+                        </a:rPr>
+                        <m:t>ただし</m:t>
+                      </m:r>
+                      <m:r>
+                        <a:rPr lang="en-US" altLang="ja-JP" sz="1400" i="1">
+                          <a:latin typeface="Cambria Math" panose="02040503050406030204" pitchFamily="18" charset="0"/>
+                          <a:ea typeface="M+ 1p light" panose="020B0402020203020204" pitchFamily="50" charset="-128"/>
+                          <a:cs typeface="M+ 1p light" panose="020B0402020203020204" pitchFamily="50" charset="-128"/>
+                        </a:rPr>
+                        <m:t>𝑑</m:t>
+                      </m:r>
+                      <m:d>
+                        <m:dPr>
+                          <m:ctrlPr>
+                            <a:rPr lang="en-US" altLang="ja-JP" sz="1400" i="1">
+                              <a:latin typeface="Cambria Math" panose="02040503050406030204" pitchFamily="18" charset="0"/>
+                              <a:ea typeface="M+ 1p light" panose="020B0402020203020204" pitchFamily="50" charset="-128"/>
+                              <a:cs typeface="M+ 1p light" panose="020B0402020203020204" pitchFamily="50" charset="-128"/>
+                            </a:rPr>
+                          </m:ctrlPr>
+                        </m:dPr>
+                        <m:e>
+                          <m:r>
+                            <a:rPr lang="en-US" altLang="ja-JP" sz="1400" i="1">
+                              <a:latin typeface="Cambria Math" panose="02040503050406030204" pitchFamily="18" charset="0"/>
+                              <a:ea typeface="M+ 1p light" panose="020B0402020203020204" pitchFamily="50" charset="-128"/>
+                              <a:cs typeface="M+ 1p light" panose="020B0402020203020204" pitchFamily="50" charset="-128"/>
+                            </a:rPr>
+                            <m:t>𝕩</m:t>
+                          </m:r>
+                          <m:r>
+                            <a:rPr lang="en-US" altLang="ja-JP" sz="1400" i="1">
+                              <a:latin typeface="Cambria Math" panose="02040503050406030204" pitchFamily="18" charset="0"/>
+                              <a:ea typeface="M+ 1p light" panose="020B0402020203020204" pitchFamily="50" charset="-128"/>
+                              <a:cs typeface="M+ 1p light" panose="020B0402020203020204" pitchFamily="50" charset="-128"/>
+                            </a:rPr>
+                            <m:t>,</m:t>
+                          </m:r>
+                          <m:r>
+                            <a:rPr lang="en-US" altLang="ja-JP" sz="1400" i="1">
+                              <a:latin typeface="Cambria Math" panose="02040503050406030204" pitchFamily="18" charset="0"/>
+                              <a:ea typeface="M+ 1p light" panose="020B0402020203020204" pitchFamily="50" charset="-128"/>
+                              <a:cs typeface="M+ 1p light" panose="020B0402020203020204" pitchFamily="50" charset="-128"/>
+                            </a:rPr>
+                            <m:t>𝕪</m:t>
+                          </m:r>
+                        </m:e>
+                      </m:d>
+                      <m:r>
+                        <a:rPr lang="en-US" altLang="ja-JP" sz="1400" i="1">
+                          <a:latin typeface="Cambria Math" panose="02040503050406030204" pitchFamily="18" charset="0"/>
+                          <a:ea typeface="M+ 1p light" panose="020B0402020203020204" pitchFamily="50" charset="-128"/>
+                          <a:cs typeface="M+ 1p light" panose="020B0402020203020204" pitchFamily="50" charset="-128"/>
+                        </a:rPr>
+                        <m:t>=</m:t>
+                      </m:r>
+                      <m:rad>
+                        <m:radPr>
+                          <m:degHide m:val="on"/>
+                          <m:ctrlPr>
+                            <a:rPr lang="en-US" altLang="ja-JP" sz="1400" i="1">
+                              <a:latin typeface="Cambria Math" panose="02040503050406030204" pitchFamily="18" charset="0"/>
+                              <a:ea typeface="Cambria Math" panose="02040503050406030204" pitchFamily="18" charset="0"/>
+                              <a:cs typeface="M+ 1p light" panose="020B0402020203020204" pitchFamily="50" charset="-128"/>
+                            </a:rPr>
+                          </m:ctrlPr>
+                        </m:radPr>
+                        <m:deg/>
+                        <m:e>
+                          <m:sSup>
+                            <m:sSupPr>
+                              <m:ctrlPr>
+                                <a:rPr lang="en-US" altLang="ja-JP" sz="1400" i="1">
+                                  <a:latin typeface="Cambria Math" panose="02040503050406030204" pitchFamily="18" charset="0"/>
+                                  <a:ea typeface="Cambria Math" panose="02040503050406030204" pitchFamily="18" charset="0"/>
+                                  <a:cs typeface="M+ 1p light" panose="020B0402020203020204" pitchFamily="50" charset="-128"/>
+                                </a:rPr>
+                              </m:ctrlPr>
+                            </m:sSupPr>
+                            <m:e>
+                              <m:d>
+                                <m:dPr>
+                                  <m:ctrlPr>
+                                    <a:rPr lang="en-US" altLang="ja-JP" sz="1400" i="1">
+                                      <a:latin typeface="Cambria Math" panose="02040503050406030204" pitchFamily="18" charset="0"/>
+                                      <a:ea typeface="Cambria Math" panose="02040503050406030204" pitchFamily="18" charset="0"/>
+                                      <a:cs typeface="M+ 1p light" panose="020B0402020203020204" pitchFamily="50" charset="-128"/>
+                                    </a:rPr>
+                                  </m:ctrlPr>
+                                </m:dPr>
+                                <m:e>
+                                  <m:sSub>
+                                    <m:sSubPr>
+                                      <m:ctrlPr>
+                                        <a:rPr lang="en-US" altLang="ja-JP" sz="1400" i="1">
+                                          <a:latin typeface="Cambria Math" panose="02040503050406030204" pitchFamily="18" charset="0"/>
+                                          <a:ea typeface="Cambria Math" panose="02040503050406030204" pitchFamily="18" charset="0"/>
+                                          <a:cs typeface="M+ 1p light" panose="020B0402020203020204" pitchFamily="50" charset="-128"/>
+                                        </a:rPr>
+                                      </m:ctrlPr>
+                                    </m:sSubPr>
+                                    <m:e>
+                                      <m:r>
+                                        <a:rPr lang="en-US" altLang="ja-JP" sz="1400" i="1">
+                                          <a:latin typeface="Cambria Math" panose="02040503050406030204" pitchFamily="18" charset="0"/>
+                                          <a:ea typeface="Cambria Math" panose="02040503050406030204" pitchFamily="18" charset="0"/>
+                                          <a:cs typeface="M+ 1p light" panose="020B0402020203020204" pitchFamily="50" charset="-128"/>
+                                        </a:rPr>
+                                        <m:t>𝑦</m:t>
+                                      </m:r>
+                                    </m:e>
+                                    <m:sub>
+                                      <m:r>
+                                        <a:rPr lang="en-US" altLang="ja-JP" sz="1400" i="1">
+                                          <a:latin typeface="Cambria Math" panose="02040503050406030204" pitchFamily="18" charset="0"/>
+                                          <a:ea typeface="Cambria Math" panose="02040503050406030204" pitchFamily="18" charset="0"/>
+                                          <a:cs typeface="M+ 1p light" panose="020B0402020203020204" pitchFamily="50" charset="-128"/>
+                                        </a:rPr>
+                                        <m:t>1</m:t>
+                                      </m:r>
+                                    </m:sub>
+                                  </m:sSub>
+                                  <m:r>
+                                    <a:rPr lang="en-US" altLang="ja-JP" sz="1400" i="1">
+                                      <a:latin typeface="Cambria Math" panose="02040503050406030204" pitchFamily="18" charset="0"/>
+                                      <a:ea typeface="Cambria Math" panose="02040503050406030204" pitchFamily="18" charset="0"/>
+                                      <a:cs typeface="M+ 1p light" panose="020B0402020203020204" pitchFamily="50" charset="-128"/>
+                                    </a:rPr>
+                                    <m:t>−</m:t>
+                                  </m:r>
+                                  <m:sSub>
+                                    <m:sSubPr>
+                                      <m:ctrlPr>
+                                        <a:rPr lang="en-US" altLang="ja-JP" sz="1400" i="1">
+                                          <a:latin typeface="Cambria Math" panose="02040503050406030204" pitchFamily="18" charset="0"/>
+                                          <a:ea typeface="Cambria Math" panose="02040503050406030204" pitchFamily="18" charset="0"/>
+                                          <a:cs typeface="M+ 1p light" panose="020B0402020203020204" pitchFamily="50" charset="-128"/>
+                                        </a:rPr>
+                                      </m:ctrlPr>
+                                    </m:sSubPr>
+                                    <m:e>
+                                      <m:r>
+                                        <a:rPr lang="en-US" altLang="ja-JP" sz="1400" i="1">
+                                          <a:latin typeface="Cambria Math" panose="02040503050406030204" pitchFamily="18" charset="0"/>
+                                          <a:ea typeface="Cambria Math" panose="02040503050406030204" pitchFamily="18" charset="0"/>
+                                          <a:cs typeface="M+ 1p light" panose="020B0402020203020204" pitchFamily="50" charset="-128"/>
+                                        </a:rPr>
+                                        <m:t>𝑥</m:t>
+                                      </m:r>
+                                    </m:e>
+                                    <m:sub>
+                                      <m:r>
+                                        <a:rPr lang="en-US" altLang="ja-JP" sz="1400" i="1">
+                                          <a:latin typeface="Cambria Math" panose="02040503050406030204" pitchFamily="18" charset="0"/>
+                                          <a:ea typeface="Cambria Math" panose="02040503050406030204" pitchFamily="18" charset="0"/>
+                                          <a:cs typeface="M+ 1p light" panose="020B0402020203020204" pitchFamily="50" charset="-128"/>
+                                        </a:rPr>
+                                        <m:t>1</m:t>
+                                      </m:r>
+                                    </m:sub>
+                                  </m:sSub>
+                                </m:e>
+                              </m:d>
+                            </m:e>
+                            <m:sup>
+                              <m:r>
+                                <a:rPr lang="en-US" altLang="ja-JP" sz="1400" i="1">
+                                  <a:latin typeface="Cambria Math" panose="02040503050406030204" pitchFamily="18" charset="0"/>
+                                  <a:ea typeface="Cambria Math" panose="02040503050406030204" pitchFamily="18" charset="0"/>
+                                  <a:cs typeface="M+ 1p light" panose="020B0402020203020204" pitchFamily="50" charset="-128"/>
+                                </a:rPr>
+                                <m:t>2</m:t>
+                              </m:r>
+                            </m:sup>
+                          </m:sSup>
+                          <m:r>
+                            <a:rPr lang="en-US" altLang="ja-JP" sz="1400" i="1">
+                              <a:latin typeface="Cambria Math" panose="02040503050406030204" pitchFamily="18" charset="0"/>
+                              <a:ea typeface="Cambria Math" panose="02040503050406030204" pitchFamily="18" charset="0"/>
+                              <a:cs typeface="M+ 1p light" panose="020B0402020203020204" pitchFamily="50" charset="-128"/>
+                            </a:rPr>
+                            <m:t>+</m:t>
+                          </m:r>
+                          <m:sSup>
+                            <m:sSupPr>
+                              <m:ctrlPr>
+                                <a:rPr lang="en-US" altLang="ja-JP" sz="1400" i="1">
+                                  <a:latin typeface="Cambria Math" panose="02040503050406030204" pitchFamily="18" charset="0"/>
+                                  <a:ea typeface="Cambria Math" panose="02040503050406030204" pitchFamily="18" charset="0"/>
+                                  <a:cs typeface="M+ 1p light" panose="020B0402020203020204" pitchFamily="50" charset="-128"/>
+                                </a:rPr>
+                              </m:ctrlPr>
+                            </m:sSupPr>
+                            <m:e>
+                              <m:d>
+                                <m:dPr>
+                                  <m:ctrlPr>
+                                    <a:rPr lang="en-US" altLang="ja-JP" sz="1400" i="1">
+                                      <a:latin typeface="Cambria Math" panose="02040503050406030204" pitchFamily="18" charset="0"/>
+                                      <a:ea typeface="Cambria Math" panose="02040503050406030204" pitchFamily="18" charset="0"/>
+                                      <a:cs typeface="M+ 1p light" panose="020B0402020203020204" pitchFamily="50" charset="-128"/>
+                                    </a:rPr>
+                                  </m:ctrlPr>
+                                </m:dPr>
+                                <m:e>
+                                  <m:sSub>
+                                    <m:sSubPr>
+                                      <m:ctrlPr>
+                                        <a:rPr lang="en-US" altLang="ja-JP" sz="1400" i="1">
+                                          <a:latin typeface="Cambria Math" panose="02040503050406030204" pitchFamily="18" charset="0"/>
+                                          <a:ea typeface="Cambria Math" panose="02040503050406030204" pitchFamily="18" charset="0"/>
+                                          <a:cs typeface="M+ 1p light" panose="020B0402020203020204" pitchFamily="50" charset="-128"/>
+                                        </a:rPr>
+                                      </m:ctrlPr>
+                                    </m:sSubPr>
+                                    <m:e>
+                                      <m:r>
+                                        <a:rPr lang="en-US" altLang="ja-JP" sz="1400" i="1">
+                                          <a:latin typeface="Cambria Math" panose="02040503050406030204" pitchFamily="18" charset="0"/>
+                                          <a:ea typeface="Cambria Math" panose="02040503050406030204" pitchFamily="18" charset="0"/>
+                                          <a:cs typeface="M+ 1p light" panose="020B0402020203020204" pitchFamily="50" charset="-128"/>
+                                        </a:rPr>
+                                        <m:t>𝑦</m:t>
+                                      </m:r>
+                                    </m:e>
+                                    <m:sub>
+                                      <m:r>
+                                        <a:rPr lang="en-US" altLang="ja-JP" sz="1400" i="1">
+                                          <a:latin typeface="Cambria Math" panose="02040503050406030204" pitchFamily="18" charset="0"/>
+                                          <a:ea typeface="Cambria Math" panose="02040503050406030204" pitchFamily="18" charset="0"/>
+                                          <a:cs typeface="M+ 1p light" panose="020B0402020203020204" pitchFamily="50" charset="-128"/>
+                                        </a:rPr>
+                                        <m:t>2</m:t>
+                                      </m:r>
+                                    </m:sub>
+                                  </m:sSub>
+                                  <m:r>
+                                    <a:rPr lang="en-US" altLang="ja-JP" sz="1400" i="1">
+                                      <a:latin typeface="Cambria Math" panose="02040503050406030204" pitchFamily="18" charset="0"/>
+                                      <a:ea typeface="Cambria Math" panose="02040503050406030204" pitchFamily="18" charset="0"/>
+                                      <a:cs typeface="M+ 1p light" panose="020B0402020203020204" pitchFamily="50" charset="-128"/>
+                                    </a:rPr>
+                                    <m:t>−</m:t>
+                                  </m:r>
+                                  <m:sSub>
+                                    <m:sSubPr>
+                                      <m:ctrlPr>
+                                        <a:rPr lang="en-US" altLang="ja-JP" sz="1400" i="1">
+                                          <a:latin typeface="Cambria Math" panose="02040503050406030204" pitchFamily="18" charset="0"/>
+                                          <a:ea typeface="Cambria Math" panose="02040503050406030204" pitchFamily="18" charset="0"/>
+                                          <a:cs typeface="M+ 1p light" panose="020B0402020203020204" pitchFamily="50" charset="-128"/>
+                                        </a:rPr>
+                                      </m:ctrlPr>
+                                    </m:sSubPr>
+                                    <m:e>
+                                      <m:r>
+                                        <a:rPr lang="en-US" altLang="ja-JP" sz="1400" i="1">
+                                          <a:latin typeface="Cambria Math" panose="02040503050406030204" pitchFamily="18" charset="0"/>
+                                          <a:ea typeface="Cambria Math" panose="02040503050406030204" pitchFamily="18" charset="0"/>
+                                          <a:cs typeface="M+ 1p light" panose="020B0402020203020204" pitchFamily="50" charset="-128"/>
+                                        </a:rPr>
+                                        <m:t>𝑥</m:t>
+                                      </m:r>
+                                    </m:e>
+                                    <m:sub>
+                                      <m:r>
+                                        <a:rPr lang="en-US" altLang="ja-JP" sz="1400" i="1">
+                                          <a:latin typeface="Cambria Math" panose="02040503050406030204" pitchFamily="18" charset="0"/>
+                                          <a:ea typeface="Cambria Math" panose="02040503050406030204" pitchFamily="18" charset="0"/>
+                                          <a:cs typeface="M+ 1p light" panose="020B0402020203020204" pitchFamily="50" charset="-128"/>
+                                        </a:rPr>
+                                        <m:t>2</m:t>
+                                      </m:r>
+                                    </m:sub>
+                                  </m:sSub>
+                                </m:e>
+                              </m:d>
+                            </m:e>
+                            <m:sup>
+                              <m:r>
+                                <a:rPr lang="en-US" altLang="ja-JP" sz="1400" i="1">
+                                  <a:latin typeface="Cambria Math" panose="02040503050406030204" pitchFamily="18" charset="0"/>
+                                  <a:ea typeface="Cambria Math" panose="02040503050406030204" pitchFamily="18" charset="0"/>
+                                  <a:cs typeface="M+ 1p light" panose="020B0402020203020204" pitchFamily="50" charset="-128"/>
+                                </a:rPr>
+                                <m:t>2</m:t>
+                              </m:r>
+                            </m:sup>
+                          </m:sSup>
+                        </m:e>
+                      </m:rad>
+                      <m:r>
+                        <a:rPr lang="en-US" altLang="ja-JP" sz="1400" i="1">
+                          <a:latin typeface="Cambria Math" panose="02040503050406030204" pitchFamily="18" charset="0"/>
+                          <a:ea typeface="Cambria Math" panose="02040503050406030204" pitchFamily="18" charset="0"/>
+                          <a:cs typeface="M+ 1p light" panose="020B0402020203020204" pitchFamily="50" charset="-128"/>
+                        </a:rPr>
+                        <m:t>=|</m:t>
+                      </m:r>
+                      <m:r>
+                        <a:rPr lang="en-US" altLang="ja-JP" sz="1400" i="1">
+                          <a:latin typeface="Cambria Math" panose="02040503050406030204" pitchFamily="18" charset="0"/>
+                          <a:ea typeface="Cambria Math" panose="02040503050406030204" pitchFamily="18" charset="0"/>
+                          <a:cs typeface="M+ 1p light" panose="020B0402020203020204" pitchFamily="50" charset="-128"/>
+                        </a:rPr>
+                        <m:t>𝕩</m:t>
+                      </m:r>
+                      <m:r>
+                        <a:rPr lang="en-US" altLang="ja-JP" sz="1400" i="1">
+                          <a:latin typeface="Cambria Math" panose="02040503050406030204" pitchFamily="18" charset="0"/>
+                          <a:ea typeface="Cambria Math" panose="02040503050406030204" pitchFamily="18" charset="0"/>
+                          <a:cs typeface="M+ 1p light" panose="020B0402020203020204" pitchFamily="50" charset="-128"/>
+                        </a:rPr>
+                        <m:t>−</m:t>
+                      </m:r>
+                      <m:r>
+                        <a:rPr lang="en-US" altLang="ja-JP" sz="1400" i="1">
+                          <a:latin typeface="Cambria Math" panose="02040503050406030204" pitchFamily="18" charset="0"/>
+                          <a:ea typeface="Cambria Math" panose="02040503050406030204" pitchFamily="18" charset="0"/>
+                          <a:cs typeface="M+ 1p light" panose="020B0402020203020204" pitchFamily="50" charset="-128"/>
+                        </a:rPr>
+                        <m:t>𝕪</m:t>
+                      </m:r>
+                      <m:r>
+                        <a:rPr lang="en-US" altLang="ja-JP" sz="1400" i="1">
+                          <a:latin typeface="Cambria Math" panose="02040503050406030204" pitchFamily="18" charset="0"/>
+                          <a:ea typeface="Cambria Math" panose="02040503050406030204" pitchFamily="18" charset="0"/>
+                          <a:cs typeface="M+ 1p light" panose="020B0402020203020204" pitchFamily="50" charset="-128"/>
+                        </a:rPr>
+                        <m:t>|</m:t>
+                      </m:r>
+                    </m:oMath>
+                  </m:oMathPara>
+                </a14:m>
+                <a:endParaRPr lang="en-US" altLang="ja-JP" sz="1400" dirty="0">
+                  <a:latin typeface="M+ 1p light" panose="020B0402020203020204" pitchFamily="50" charset="-128"/>
+                  <a:ea typeface="M+ 1p light" panose="020B0402020203020204" pitchFamily="50" charset="-128"/>
+                  <a:cs typeface="M+ 1p light" panose="020B0402020203020204" pitchFamily="50" charset="-128"/>
+                </a:endParaRPr>
+              </a:p>
+            </p:txBody>
+          </p:sp>
+        </mc:Choice>
+        <mc:Fallback>
+          <p:sp>
+            <p:nvSpPr>
+              <p:cNvPr id="61" name="Google Shape;61;p14"/>
+              <p:cNvSpPr txBox="1">
+                <a:spLocks noGrp="1" noRot="1" noChangeAspect="1" noMove="1" noResize="1" noEditPoints="1" noAdjustHandles="1" noChangeArrowheads="1" noChangeShapeType="1" noTextEdit="1"/>
+              </p:cNvSpPr>
+              <p:nvPr>
+                <p:ph type="body" idx="1"/>
+              </p:nvPr>
+            </p:nvSpPr>
+            <p:spPr>
+              <a:xfrm>
+                <a:off x="311700" y="1152475"/>
+                <a:ext cx="8520600" cy="3416400"/>
+              </a:xfrm>
+              <a:prstGeom prst="rect">
+                <a:avLst/>
+              </a:prstGeom>
+              <a:blipFill>
+                <a:blip r:embed="rId4"/>
+                <a:stretch>
+                  <a:fillRect l="-572" b="-2143"/>
+                </a:stretch>
+              </a:blipFill>
+            </p:spPr>
+            <p:txBody>
+              <a:bodyPr/>
+              <a:lstStyle/>
+              <a:p>
+                <a:r>
+                  <a:rPr lang="ja-JP" altLang="en-US">
+                    <a:noFill/>
+                  </a:rPr>
+                  <a:t> </a:t>
+                </a:r>
+              </a:p>
+            </p:txBody>
+          </p:sp>
+        </mc:Fallback>
+      </mc:AlternateContent>
+      <p:sp>
+        <p:nvSpPr>
+          <p:cNvPr id="62" name="Google Shape;62;p14"/>
+          <p:cNvSpPr txBox="1">
+            <a:spLocks noGrp="1"/>
+          </p:cNvSpPr>
+          <p:nvPr>
+            <p:ph type="title"/>
+          </p:nvPr>
+        </p:nvSpPr>
+        <p:spPr>
+          <a:xfrm>
+            <a:off x="6916625" y="45750"/>
+            <a:ext cx="2144400" cy="347700"/>
+          </a:xfrm>
+          <a:prstGeom prst="rect">
+            <a:avLst/>
+          </a:prstGeom>
+        </p:spPr>
+        <p:txBody>
+          <a:bodyPr spcFirstLastPara="1" wrap="square" lIns="91425" tIns="91425" rIns="91425" bIns="91425" anchor="t" anchorCtr="0">
+            <a:noAutofit/>
+          </a:bodyPr>
+          <a:lstStyle/>
+          <a:p>
+            <a:pPr marL="0" lvl="0" indent="0" algn="ctr" rtl="0">
+              <a:spcBef>
+                <a:spcPts val="0"/>
+              </a:spcBef>
+              <a:spcAft>
+                <a:spcPts val="0"/>
+              </a:spcAft>
+              <a:buNone/>
+            </a:pPr>
+            <a:r>
+              <a:rPr lang="ja-JP" altLang="en-US" sz="1400" dirty="0">
+                <a:solidFill>
+                  <a:schemeClr val="bg1">
+                    <a:lumMod val="50000"/>
+                  </a:schemeClr>
+                </a:solidFill>
+                <a:latin typeface="M+ 1p light" panose="020B0402020203020204" pitchFamily="50" charset="-128"/>
+                <a:ea typeface="M+ 1p light" panose="020B0402020203020204" pitchFamily="50" charset="-128"/>
+                <a:cs typeface="M+ 1p light" panose="020B0402020203020204" pitchFamily="50" charset="-128"/>
+              </a:rPr>
+              <a:t>復習</a:t>
+            </a:r>
+            <a:r>
+              <a:rPr lang="en-US" altLang="ja-JP" sz="1400" dirty="0">
+                <a:solidFill>
+                  <a:schemeClr val="bg1">
+                    <a:lumMod val="50000"/>
+                  </a:schemeClr>
+                </a:solidFill>
+                <a:latin typeface="M+ 1p light" panose="020B0402020203020204" pitchFamily="50" charset="-128"/>
+                <a:ea typeface="M+ 1p light" panose="020B0402020203020204" pitchFamily="50" charset="-128"/>
+                <a:cs typeface="M+ 1p light" panose="020B0402020203020204" pitchFamily="50" charset="-128"/>
+              </a:rPr>
+              <a:t>: </a:t>
+            </a:r>
+            <a:r>
+              <a:rPr lang="ja-JP" altLang="en-US" sz="1400" dirty="0">
+                <a:solidFill>
+                  <a:schemeClr val="bg1">
+                    <a:lumMod val="50000"/>
+                  </a:schemeClr>
+                </a:solidFill>
+                <a:latin typeface="M+ 1p light" panose="020B0402020203020204" pitchFamily="50" charset="-128"/>
+                <a:ea typeface="M+ 1p light" panose="020B0402020203020204" pitchFamily="50" charset="-128"/>
+                <a:cs typeface="M+ 1p light" panose="020B0402020203020204" pitchFamily="50" charset="-128"/>
+              </a:rPr>
+              <a:t>ユークリッド幾何</a:t>
+            </a:r>
+            <a:endParaRPr sz="1400" dirty="0">
+              <a:solidFill>
+                <a:schemeClr val="bg1">
+                  <a:lumMod val="50000"/>
+                </a:schemeClr>
+              </a:solidFill>
+              <a:latin typeface="M+ 1p light" panose="020B0402020203020204" pitchFamily="50" charset="-128"/>
+              <a:ea typeface="M+ 1p light" panose="020B0402020203020204" pitchFamily="50" charset="-128"/>
+              <a:cs typeface="M+ 1p light" panose="020B0402020203020204" pitchFamily="50" charset="-128"/>
+            </a:endParaRPr>
+          </a:p>
+        </p:txBody>
+      </p:sp>
+    </p:spTree>
+    <p:extLst>
+      <p:ext uri="{BB962C8B-B14F-4D97-AF65-F5344CB8AC3E}">
+        <p14:creationId xmlns:p14="http://schemas.microsoft.com/office/powerpoint/2010/main" val="3162217868"/>
+      </p:ext>
+    </p:extLst>
+  </p:cSld>
+  <p:clrMapOvr>
+    <a:masterClrMapping/>
+  </p:clrMapOvr>
+  <p:timing>
+    <p:tnLst>
+      <p:par>
+        <p:cTn id="1" dur="indefinite" restart="never" nodeType="tmRoot">
+          <p:childTnLst>
+            <p:seq concurrent="1" nextAc="seek">
+              <p:cTn id="2" dur="indefinite" nodeType="mainSeq">
+                <p:childTnLst>
+                  <p:par>
+                    <p:cTn id="3" fill="hold">
+                      <p:stCondLst>
+                        <p:cond delay="indefinite"/>
+                      </p:stCondLst>
+                      <p:childTnLst>
+                        <p:par>
+                          <p:cTn id="4" fill="hold">
+                            <p:stCondLst>
+                              <p:cond delay="0"/>
+                            </p:stCondLst>
+                            <p:childTnLst>
+                              <p:par>
+                                <p:cTn id="5" presetID="10" presetClass="entr" presetSubtype="0" fill="hold" nodeType="clickEffect">
+                                  <p:stCondLst>
+                                    <p:cond delay="0"/>
+                                  </p:stCondLst>
+                                  <p:childTnLst>
+                                    <p:set>
+                                      <p:cBhvr>
+                                        <p:cTn id="6" dur="1" fill="hold">
+                                          <p:stCondLst>
+                                            <p:cond delay="0"/>
+                                          </p:stCondLst>
+                                        </p:cTn>
+                                        <p:tgtEl>
+                                          <p:spTgt spid="61">
+                                            <p:txEl>
+                                              <p:pRg st="4" end="4"/>
+                                            </p:txEl>
+                                          </p:spTgt>
+                                        </p:tgtEl>
+                                        <p:attrNameLst>
+                                          <p:attrName>style.visibility</p:attrName>
+                                        </p:attrNameLst>
+                                      </p:cBhvr>
+                                      <p:to>
+                                        <p:strVal val="visible"/>
+                                      </p:to>
+                                    </p:set>
+                                    <p:animEffect transition="in" filter="fade">
+                                      <p:cBhvr>
+                                        <p:cTn id="7" dur="500"/>
+                                        <p:tgtEl>
+                                          <p:spTgt spid="61">
+                                            <p:txEl>
+                                              <p:pRg st="4" end="4"/>
+                                            </p:txEl>
+                                          </p:spTgt>
+                                        </p:tgtEl>
+                                      </p:cBhvr>
+                                    </p:animEffect>
+                                  </p:childTnLst>
+                                </p:cTn>
+                              </p:par>
+                              <p:par>
+                                <p:cTn id="8" presetID="10" presetClass="entr" presetSubtype="0" fill="hold" nodeType="withEffect">
+                                  <p:stCondLst>
+                                    <p:cond delay="0"/>
+                                  </p:stCondLst>
+                                  <p:childTnLst>
+                                    <p:set>
+                                      <p:cBhvr>
+                                        <p:cTn id="9" dur="1" fill="hold">
+                                          <p:stCondLst>
+                                            <p:cond delay="0"/>
+                                          </p:stCondLst>
+                                        </p:cTn>
+                                        <p:tgtEl>
+                                          <p:spTgt spid="61">
+                                            <p:txEl>
+                                              <p:pRg st="5" end="5"/>
+                                            </p:txEl>
+                                          </p:spTgt>
+                                        </p:tgtEl>
+                                        <p:attrNameLst>
+                                          <p:attrName>style.visibility</p:attrName>
+                                        </p:attrNameLst>
+                                      </p:cBhvr>
+                                      <p:to>
+                                        <p:strVal val="visible"/>
+                                      </p:to>
+                                    </p:set>
+                                    <p:animEffect transition="in" filter="fade">
+                                      <p:cBhvr>
+                                        <p:cTn id="10" dur="500"/>
+                                        <p:tgtEl>
+                                          <p:spTgt spid="61">
+                                            <p:txEl>
+                                              <p:pRg st="5" end="5"/>
+                                            </p:txEl>
+                                          </p:spTgt>
+                                        </p:tgtEl>
+                                      </p:cBhvr>
+                                    </p:animEffect>
+                                  </p:childTnLst>
+                                </p:cTn>
+                              </p:par>
+                              <p:par>
+                                <p:cTn id="11" presetID="10" presetClass="entr" presetSubtype="0" fill="hold" nodeType="withEffect">
+                                  <p:stCondLst>
+                                    <p:cond delay="0"/>
+                                  </p:stCondLst>
+                                  <p:childTnLst>
+                                    <p:set>
+                                      <p:cBhvr>
+                                        <p:cTn id="12" dur="1" fill="hold">
+                                          <p:stCondLst>
+                                            <p:cond delay="0"/>
+                                          </p:stCondLst>
+                                        </p:cTn>
+                                        <p:tgtEl>
+                                          <p:spTgt spid="61">
+                                            <p:txEl>
+                                              <p:pRg st="6" end="6"/>
+                                            </p:txEl>
+                                          </p:spTgt>
+                                        </p:tgtEl>
+                                        <p:attrNameLst>
+                                          <p:attrName>style.visibility</p:attrName>
+                                        </p:attrNameLst>
+                                      </p:cBhvr>
+                                      <p:to>
+                                        <p:strVal val="visible"/>
+                                      </p:to>
+                                    </p:set>
+                                    <p:animEffect transition="in" filter="fade">
+                                      <p:cBhvr>
+                                        <p:cTn id="13" dur="500"/>
+                                        <p:tgtEl>
+                                          <p:spTgt spid="61">
+                                            <p:txEl>
+                                              <p:pRg st="6" end="6"/>
+                                            </p:txEl>
+                                          </p:spTgt>
+                                        </p:tgtEl>
+                                      </p:cBhvr>
+                                    </p:animEffect>
+                                  </p:childTnLst>
+                                </p:cTn>
+                              </p:par>
+                              <p:par>
+                                <p:cTn id="14" presetID="10" presetClass="entr" presetSubtype="0" fill="hold" nodeType="withEffect">
+                                  <p:stCondLst>
+                                    <p:cond delay="0"/>
+                                  </p:stCondLst>
+                                  <p:childTnLst>
+                                    <p:set>
+                                      <p:cBhvr>
+                                        <p:cTn id="15" dur="1" fill="hold">
+                                          <p:stCondLst>
+                                            <p:cond delay="0"/>
+                                          </p:stCondLst>
+                                        </p:cTn>
+                                        <p:tgtEl>
+                                          <p:spTgt spid="61">
+                                            <p:txEl>
+                                              <p:pRg st="7" end="7"/>
+                                            </p:txEl>
+                                          </p:spTgt>
+                                        </p:tgtEl>
+                                        <p:attrNameLst>
+                                          <p:attrName>style.visibility</p:attrName>
+                                        </p:attrNameLst>
+                                      </p:cBhvr>
+                                      <p:to>
+                                        <p:strVal val="visible"/>
+                                      </p:to>
+                                    </p:set>
+                                    <p:animEffect transition="in" filter="fade">
+                                      <p:cBhvr>
+                                        <p:cTn id="16" dur="500"/>
+                                        <p:tgtEl>
+                                          <p:spTgt spid="61">
+                                            <p:txEl>
+                                              <p:pRg st="7" end="7"/>
+                                            </p:txEl>
+                                          </p:spTgt>
+                                        </p:tgtEl>
+                                      </p:cBhvr>
+                                    </p:animEffect>
+                                  </p:childTnLst>
+                                </p:cTn>
+                              </p:par>
+                            </p:childTnLst>
+                          </p:cTn>
+                        </p:par>
+                      </p:childTnLst>
+                    </p:cTn>
+                  </p:par>
+                  <p:par>
+                    <p:cTn id="17" fill="hold">
+                      <p:stCondLst>
+                        <p:cond delay="indefinite"/>
+                      </p:stCondLst>
+                      <p:childTnLst>
+                        <p:par>
+                          <p:cTn id="18" fill="hold">
+                            <p:stCondLst>
+                              <p:cond delay="0"/>
+                            </p:stCondLst>
+                            <p:childTnLst>
+                              <p:par>
+                                <p:cTn id="19" presetID="10" presetClass="entr" presetSubtype="0" fill="hold" nodeType="clickEffect">
+                                  <p:stCondLst>
+                                    <p:cond delay="0"/>
+                                  </p:stCondLst>
+                                  <p:childTnLst>
+                                    <p:set>
+                                      <p:cBhvr>
+                                        <p:cTn id="20" dur="1" fill="hold">
+                                          <p:stCondLst>
+                                            <p:cond delay="0"/>
+                                          </p:stCondLst>
+                                        </p:cTn>
+                                        <p:tgtEl>
+                                          <p:spTgt spid="61">
+                                            <p:txEl>
+                                              <p:pRg st="11" end="11"/>
+                                            </p:txEl>
+                                          </p:spTgt>
+                                        </p:tgtEl>
+                                        <p:attrNameLst>
+                                          <p:attrName>style.visibility</p:attrName>
+                                        </p:attrNameLst>
+                                      </p:cBhvr>
+                                      <p:to>
+                                        <p:strVal val="visible"/>
+                                      </p:to>
+                                    </p:set>
+                                    <p:animEffect transition="in" filter="fade">
+                                      <p:cBhvr>
+                                        <p:cTn id="21" dur="500"/>
+                                        <p:tgtEl>
+                                          <p:spTgt spid="61">
+                                            <p:txEl>
+                                              <p:pRg st="11" end="11"/>
+                                            </p:txEl>
+                                          </p:spTgt>
+                                        </p:tgtEl>
+                                      </p:cBhvr>
+                                    </p:animEffect>
+                                  </p:childTnLst>
+                                </p:cTn>
+                              </p:par>
+                            </p:childTnLst>
+                          </p:cTn>
+                        </p:par>
+                      </p:childTnLst>
+                    </p:cTn>
+                  </p:par>
+                </p:childTnLst>
+              </p:cTn>
+              <p:prevCondLst>
+                <p:cond evt="onPrev" delay="0">
+                  <p:tgtEl>
+                    <p:sldTgt/>
+                  </p:tgtEl>
+                </p:cond>
+              </p:prevCondLst>
+              <p:nextCondLst>
+                <p:cond evt="onNext" delay="0">
+                  <p:tgtEl>
+                    <p:sldTgt/>
+                  </p:tgtEl>
+                </p:cond>
+              </p:nextCondLst>
+            </p:seq>
+          </p:childTnLst>
+        </p:cTn>
+      </p:par>
+    </p:tnLst>
   </p:timing>
 </p:sld>
 </file>

</xml_diff>

<commit_message>
:bug: Update Overview for review
</commit_message>
<xml_diff>
--- a/Section2(上半平面とポアンカレ計量)/0-Overview&Review.pptx
+++ b/Section2(上半平面とポアンカレ計量)/0-Overview&Review.pptx
@@ -5,7 +5,7 @@
     <p:sldMasterId id="2147483659" r:id="rId1"/>
   </p:sldMasterIdLst>
   <p:notesMasterIdLst>
-    <p:notesMasterId r:id="rId11"/>
+    <p:notesMasterId r:id="rId13"/>
   </p:notesMasterIdLst>
   <p:sldIdLst>
     <p:sldId id="287" r:id="rId2"/>
@@ -17,6 +17,8 @@
     <p:sldId id="293" r:id="rId8"/>
     <p:sldId id="294" r:id="rId9"/>
     <p:sldId id="295" r:id="rId10"/>
+    <p:sldId id="296" r:id="rId11"/>
+    <p:sldId id="297" r:id="rId12"/>
   </p:sldIdLst>
   <p:sldSz cx="9144000" cy="5143500" type="screen16x9"/>
   <p:notesSz cx="6858000" cy="9144000"/>
@@ -806,6 +808,224 @@
         </p:txBody>
       </p:sp>
     </p:spTree>
+  </p:cSld>
+  <p:clrMapOvr>
+    <a:masterClrMapping/>
+  </p:clrMapOvr>
+</p:notes>
+</file>
+
+<file path=ppt/notesSlides/notesSlide10.xml><?xml version="1.0" encoding="utf-8"?>
+<p:notes xmlns:a="http://schemas.openxmlformats.org/drawingml/2006/main" xmlns:r="http://schemas.openxmlformats.org/officeDocument/2006/relationships" xmlns:p="http://schemas.openxmlformats.org/presentationml/2006/main" showMasterSp="0" showMasterPhAnim="0">
+  <p:cSld>
+    <p:spTree>
+      <p:nvGrpSpPr>
+        <p:cNvPr id="1" name="Shape 56"/>
+        <p:cNvGrpSpPr/>
+        <p:nvPr/>
+      </p:nvGrpSpPr>
+      <p:grpSpPr>
+        <a:xfrm>
+          <a:off x="0" y="0"/>
+          <a:ext cx="0" cy="0"/>
+          <a:chOff x="0" y="0"/>
+          <a:chExt cx="0" cy="0"/>
+        </a:xfrm>
+      </p:grpSpPr>
+      <p:sp>
+        <p:nvSpPr>
+          <p:cNvPr id="57" name="Google Shape;57;g5fb8af1956_0_0:notes"/>
+          <p:cNvSpPr>
+            <a:spLocks noGrp="1" noRot="1" noChangeAspect="1"/>
+          </p:cNvSpPr>
+          <p:nvPr>
+            <p:ph type="sldImg" idx="2"/>
+          </p:nvPr>
+        </p:nvSpPr>
+        <p:spPr>
+          <a:xfrm>
+            <a:off x="381000" y="685800"/>
+            <a:ext cx="6096000" cy="3429000"/>
+          </a:xfrm>
+          <a:custGeom>
+            <a:avLst/>
+            <a:gdLst/>
+            <a:ahLst/>
+            <a:cxnLst/>
+            <a:rect l="l" t="t" r="r" b="b"/>
+            <a:pathLst>
+              <a:path w="120000" h="120000" extrusionOk="0">
+                <a:moveTo>
+                  <a:pt x="0" y="0"/>
+                </a:moveTo>
+                <a:lnTo>
+                  <a:pt x="120000" y="0"/>
+                </a:lnTo>
+                <a:lnTo>
+                  <a:pt x="120000" y="120000"/>
+                </a:lnTo>
+                <a:lnTo>
+                  <a:pt x="0" y="120000"/>
+                </a:lnTo>
+                <a:close/>
+              </a:path>
+            </a:pathLst>
+          </a:custGeom>
+        </p:spPr>
+      </p:sp>
+      <p:sp>
+        <p:nvSpPr>
+          <p:cNvPr id="58" name="Google Shape;58;g5fb8af1956_0_0:notes"/>
+          <p:cNvSpPr txBox="1">
+            <a:spLocks noGrp="1"/>
+          </p:cNvSpPr>
+          <p:nvPr>
+            <p:ph type="body" idx="1"/>
+          </p:nvPr>
+        </p:nvSpPr>
+        <p:spPr>
+          <a:xfrm>
+            <a:off x="685800" y="4343400"/>
+            <a:ext cx="5486400" cy="4114800"/>
+          </a:xfrm>
+          <a:prstGeom prst="rect">
+            <a:avLst/>
+          </a:prstGeom>
+        </p:spPr>
+        <p:txBody>
+          <a:bodyPr spcFirstLastPara="1" wrap="square" lIns="91425" tIns="91425" rIns="91425" bIns="91425" anchor="t" anchorCtr="0">
+            <a:noAutofit/>
+          </a:bodyPr>
+          <a:lstStyle/>
+          <a:p>
+            <a:pPr marL="0" lvl="0" indent="0" algn="l" rtl="0">
+              <a:spcBef>
+                <a:spcPts val="0"/>
+              </a:spcBef>
+              <a:spcAft>
+                <a:spcPts val="0"/>
+              </a:spcAft>
+              <a:buNone/>
+            </a:pPr>
+            <a:endParaRPr dirty="0"/>
+          </a:p>
+        </p:txBody>
+      </p:sp>
+    </p:spTree>
+    <p:extLst>
+      <p:ext uri="{BB962C8B-B14F-4D97-AF65-F5344CB8AC3E}">
+        <p14:creationId xmlns:p14="http://schemas.microsoft.com/office/powerpoint/2010/main" val="1091643680"/>
+      </p:ext>
+    </p:extLst>
+  </p:cSld>
+  <p:clrMapOvr>
+    <a:masterClrMapping/>
+  </p:clrMapOvr>
+</p:notes>
+</file>
+
+<file path=ppt/notesSlides/notesSlide11.xml><?xml version="1.0" encoding="utf-8"?>
+<p:notes xmlns:a="http://schemas.openxmlformats.org/drawingml/2006/main" xmlns:r="http://schemas.openxmlformats.org/officeDocument/2006/relationships" xmlns:p="http://schemas.openxmlformats.org/presentationml/2006/main" showMasterSp="0" showMasterPhAnim="0">
+  <p:cSld>
+    <p:spTree>
+      <p:nvGrpSpPr>
+        <p:cNvPr id="1" name="Shape 56"/>
+        <p:cNvGrpSpPr/>
+        <p:nvPr/>
+      </p:nvGrpSpPr>
+      <p:grpSpPr>
+        <a:xfrm>
+          <a:off x="0" y="0"/>
+          <a:ext cx="0" cy="0"/>
+          <a:chOff x="0" y="0"/>
+          <a:chExt cx="0" cy="0"/>
+        </a:xfrm>
+      </p:grpSpPr>
+      <p:sp>
+        <p:nvSpPr>
+          <p:cNvPr id="57" name="Google Shape;57;g5fb8af1956_0_0:notes"/>
+          <p:cNvSpPr>
+            <a:spLocks noGrp="1" noRot="1" noChangeAspect="1"/>
+          </p:cNvSpPr>
+          <p:nvPr>
+            <p:ph type="sldImg" idx="2"/>
+          </p:nvPr>
+        </p:nvSpPr>
+        <p:spPr>
+          <a:xfrm>
+            <a:off x="381000" y="685800"/>
+            <a:ext cx="6096000" cy="3429000"/>
+          </a:xfrm>
+          <a:custGeom>
+            <a:avLst/>
+            <a:gdLst/>
+            <a:ahLst/>
+            <a:cxnLst/>
+            <a:rect l="l" t="t" r="r" b="b"/>
+            <a:pathLst>
+              <a:path w="120000" h="120000" extrusionOk="0">
+                <a:moveTo>
+                  <a:pt x="0" y="0"/>
+                </a:moveTo>
+                <a:lnTo>
+                  <a:pt x="120000" y="0"/>
+                </a:lnTo>
+                <a:lnTo>
+                  <a:pt x="120000" y="120000"/>
+                </a:lnTo>
+                <a:lnTo>
+                  <a:pt x="0" y="120000"/>
+                </a:lnTo>
+                <a:close/>
+              </a:path>
+            </a:pathLst>
+          </a:custGeom>
+        </p:spPr>
+      </p:sp>
+      <p:sp>
+        <p:nvSpPr>
+          <p:cNvPr id="58" name="Google Shape;58;g5fb8af1956_0_0:notes"/>
+          <p:cNvSpPr txBox="1">
+            <a:spLocks noGrp="1"/>
+          </p:cNvSpPr>
+          <p:nvPr>
+            <p:ph type="body" idx="1"/>
+          </p:nvPr>
+        </p:nvSpPr>
+        <p:spPr>
+          <a:xfrm>
+            <a:off x="685800" y="4343400"/>
+            <a:ext cx="5486400" cy="4114800"/>
+          </a:xfrm>
+          <a:prstGeom prst="rect">
+            <a:avLst/>
+          </a:prstGeom>
+        </p:spPr>
+        <p:txBody>
+          <a:bodyPr spcFirstLastPara="1" wrap="square" lIns="91425" tIns="91425" rIns="91425" bIns="91425" anchor="t" anchorCtr="0">
+            <a:noAutofit/>
+          </a:bodyPr>
+          <a:lstStyle/>
+          <a:p>
+            <a:pPr marL="0" lvl="0" indent="0" algn="l" rtl="0">
+              <a:spcBef>
+                <a:spcPts val="0"/>
+              </a:spcBef>
+              <a:spcAft>
+                <a:spcPts val="0"/>
+              </a:spcAft>
+              <a:buNone/>
+            </a:pPr>
+            <a:endParaRPr dirty="0"/>
+          </a:p>
+        </p:txBody>
+      </p:sp>
+    </p:spTree>
+    <p:extLst>
+      <p:ext uri="{BB962C8B-B14F-4D97-AF65-F5344CB8AC3E}">
+        <p14:creationId xmlns:p14="http://schemas.microsoft.com/office/powerpoint/2010/main" val="4058453238"/>
+      </p:ext>
+    </p:extLst>
   </p:cSld>
   <p:clrMapOvr>
     <a:masterClrMapping/>
@@ -6771,6 +6991,2743 @@
         </p:sp>
       </p:grpSp>
     </p:spTree>
+  </p:cSld>
+  <p:clrMapOvr>
+    <a:masterClrMapping/>
+  </p:clrMapOvr>
+</p:sld>
+</file>
+
+<file path=ppt/slides/slide10.xml><?xml version="1.0" encoding="utf-8"?>
+<p:sld xmlns:a="http://schemas.openxmlformats.org/drawingml/2006/main" xmlns:r="http://schemas.openxmlformats.org/officeDocument/2006/relationships" xmlns:p="http://schemas.openxmlformats.org/presentationml/2006/main">
+  <p:cSld>
+    <p:spTree>
+      <p:nvGrpSpPr>
+        <p:cNvPr id="1" name="Shape 59"/>
+        <p:cNvGrpSpPr/>
+        <p:nvPr/>
+      </p:nvGrpSpPr>
+      <p:grpSpPr>
+        <a:xfrm>
+          <a:off x="0" y="0"/>
+          <a:ext cx="0" cy="0"/>
+          <a:chOff x="0" y="0"/>
+          <a:chExt cx="0" cy="0"/>
+        </a:xfrm>
+      </p:grpSpPr>
+      <p:sp>
+        <p:nvSpPr>
+          <p:cNvPr id="10" name="二等辺三角形 9">
+            <a:extLst>
+              <a:ext uri="{FF2B5EF4-FFF2-40B4-BE49-F238E27FC236}">
+                <a16:creationId xmlns:a16="http://schemas.microsoft.com/office/drawing/2014/main" id="{5DBF3215-13AD-4FE7-AE3B-208FB74012AE}"/>
+              </a:ext>
+            </a:extLst>
+          </p:cNvPr>
+          <p:cNvSpPr/>
+          <p:nvPr/>
+        </p:nvSpPr>
+        <p:spPr>
+          <a:xfrm rot="16200000">
+            <a:off x="4285650" y="-4285650"/>
+            <a:ext cx="572701" cy="9144002"/>
+          </a:xfrm>
+          <a:prstGeom prst="triangle">
+            <a:avLst>
+              <a:gd name="adj" fmla="val 100000"/>
+            </a:avLst>
+          </a:prstGeom>
+          <a:solidFill>
+            <a:srgbClr val="FFF4E7">
+              <a:alpha val="80000"/>
+            </a:srgbClr>
+          </a:solidFill>
+          <a:ln>
+            <a:noFill/>
+          </a:ln>
+        </p:spPr>
+        <p:style>
+          <a:lnRef idx="2">
+            <a:schemeClr val="accent1">
+              <a:shade val="50000"/>
+            </a:schemeClr>
+          </a:lnRef>
+          <a:fillRef idx="1">
+            <a:schemeClr val="accent1"/>
+          </a:fillRef>
+          <a:effectRef idx="0">
+            <a:schemeClr val="accent1"/>
+          </a:effectRef>
+          <a:fontRef idx="minor">
+            <a:schemeClr val="lt1"/>
+          </a:fontRef>
+        </p:style>
+        <p:txBody>
+          <a:bodyPr rtlCol="0" anchor="ctr"/>
+          <a:lstStyle/>
+          <a:p>
+            <a:pPr algn="ctr"/>
+            <a:endParaRPr kumimoji="1" lang="ja-JP" altLang="en-US" dirty="0"/>
+          </a:p>
+        </p:txBody>
+      </p:sp>
+      <p:sp>
+        <p:nvSpPr>
+          <p:cNvPr id="11" name="正方形/長方形 10">
+            <a:extLst>
+              <a:ext uri="{FF2B5EF4-FFF2-40B4-BE49-F238E27FC236}">
+                <a16:creationId xmlns:a16="http://schemas.microsoft.com/office/drawing/2014/main" id="{FBC25266-4EBA-4EB8-A354-624A1F8420E4}"/>
+              </a:ext>
+            </a:extLst>
+          </p:cNvPr>
+          <p:cNvSpPr/>
+          <p:nvPr/>
+        </p:nvSpPr>
+        <p:spPr>
+          <a:xfrm>
+            <a:off x="1" y="4568873"/>
+            <a:ext cx="9143999" cy="572702"/>
+          </a:xfrm>
+          <a:prstGeom prst="rect">
+            <a:avLst/>
+          </a:prstGeom>
+          <a:solidFill>
+            <a:srgbClr val="FFF5EB"/>
+          </a:solidFill>
+          <a:ln>
+            <a:noFill/>
+          </a:ln>
+        </p:spPr>
+        <p:style>
+          <a:lnRef idx="2">
+            <a:schemeClr val="accent1">
+              <a:shade val="50000"/>
+            </a:schemeClr>
+          </a:lnRef>
+          <a:fillRef idx="1">
+            <a:schemeClr val="accent1"/>
+          </a:fillRef>
+          <a:effectRef idx="0">
+            <a:schemeClr val="accent1"/>
+          </a:effectRef>
+          <a:fontRef idx="minor">
+            <a:schemeClr val="lt1"/>
+          </a:fontRef>
+        </p:style>
+        <p:txBody>
+          <a:bodyPr rtlCol="0" anchor="ctr"/>
+          <a:lstStyle/>
+          <a:p>
+            <a:pPr algn="ctr"/>
+            <a:endParaRPr kumimoji="1" lang="ja-JP" altLang="en-US" dirty="0"/>
+          </a:p>
+        </p:txBody>
+      </p:sp>
+      <p:pic>
+        <p:nvPicPr>
+          <p:cNvPr id="1026" name="Picture 2" descr="ããã¯ãã±å ä¸»äººå+¬ãã®ç»åæ¤ç´¢çµæ">
+            <a:extLst>
+              <a:ext uri="{FF2B5EF4-FFF2-40B4-BE49-F238E27FC236}">
+                <a16:creationId xmlns:a16="http://schemas.microsoft.com/office/drawing/2014/main" id="{B3348C27-15A3-454B-B667-BA5AAADA1B42}"/>
+              </a:ext>
+            </a:extLst>
+          </p:cNvPr>
+          <p:cNvPicPr>
+            <a:picLocks noChangeAspect="1" noChangeArrowheads="1"/>
+          </p:cNvPicPr>
+          <p:nvPr/>
+        </p:nvPicPr>
+        <p:blipFill>
+          <a:blip r:embed="rId3">
+            <a:alphaModFix amt="50000"/>
+            <a:extLst>
+              <a:ext uri="{28A0092B-C50C-407E-A947-70E740481C1C}">
+                <a14:useLocalDpi xmlns:a14="http://schemas.microsoft.com/office/drawing/2010/main" val="0"/>
+              </a:ext>
+            </a:extLst>
+          </a:blip>
+          <a:srcRect/>
+          <a:stretch>
+            <a:fillRect/>
+          </a:stretch>
+        </p:blipFill>
+        <p:spPr bwMode="auto">
+          <a:xfrm>
+            <a:off x="133738" y="4577558"/>
+            <a:ext cx="555332" cy="555332"/>
+          </a:xfrm>
+          <a:prstGeom prst="rect">
+            <a:avLst/>
+          </a:prstGeom>
+          <a:noFill/>
+          <a:extLst>
+            <a:ext uri="{909E8E84-426E-40DD-AFC4-6F175D3DCCD1}">
+              <a14:hiddenFill xmlns:a14="http://schemas.microsoft.com/office/drawing/2010/main">
+                <a:solidFill>
+                  <a:srgbClr val="FFFFFF"/>
+                </a:solidFill>
+              </a14:hiddenFill>
+            </a:ext>
+          </a:extLst>
+        </p:spPr>
+      </p:pic>
+      <p:sp>
+        <p:nvSpPr>
+          <p:cNvPr id="4" name="吹き出し: 四角形 3">
+            <a:extLst>
+              <a:ext uri="{FF2B5EF4-FFF2-40B4-BE49-F238E27FC236}">
+                <a16:creationId xmlns:a16="http://schemas.microsoft.com/office/drawing/2014/main" id="{9E66183E-78B4-4767-A511-09039646B1AC}"/>
+              </a:ext>
+            </a:extLst>
+          </p:cNvPr>
+          <p:cNvSpPr/>
+          <p:nvPr/>
+        </p:nvSpPr>
+        <p:spPr>
+          <a:xfrm>
+            <a:off x="822807" y="4612297"/>
+            <a:ext cx="7596515" cy="491547"/>
+          </a:xfrm>
+          <a:prstGeom prst="wedgeRectCallout">
+            <a:avLst>
+              <a:gd name="adj1" fmla="val -51006"/>
+              <a:gd name="adj2" fmla="val 20927"/>
+            </a:avLst>
+          </a:prstGeom>
+          <a:solidFill>
+            <a:srgbClr val="EEEEEE">
+              <a:alpha val="50196"/>
+            </a:srgbClr>
+          </a:solidFill>
+          <a:ln w="6350">
+            <a:solidFill>
+              <a:schemeClr val="bg1">
+                <a:lumMod val="75000"/>
+              </a:schemeClr>
+            </a:solidFill>
+          </a:ln>
+        </p:spPr>
+        <p:style>
+          <a:lnRef idx="2">
+            <a:schemeClr val="accent1">
+              <a:shade val="50000"/>
+            </a:schemeClr>
+          </a:lnRef>
+          <a:fillRef idx="1">
+            <a:schemeClr val="accent1"/>
+          </a:fillRef>
+          <a:effectRef idx="0">
+            <a:schemeClr val="accent1"/>
+          </a:effectRef>
+          <a:fontRef idx="minor">
+            <a:schemeClr val="lt1"/>
+          </a:fontRef>
+        </p:style>
+        <p:txBody>
+          <a:bodyPr rtlCol="0" anchor="ctr"/>
+          <a:lstStyle/>
+          <a:p>
+            <a:pPr algn="ctr"/>
+            <a:r>
+              <a:rPr kumimoji="1" lang="ja-JP" altLang="en-US" dirty="0">
+                <a:solidFill>
+                  <a:schemeClr val="bg1">
+                    <a:lumMod val="50000"/>
+                  </a:schemeClr>
+                </a:solidFill>
+                <a:latin typeface="M+ 1p light" panose="020B0402020203020204" pitchFamily="50" charset="-128"/>
+                <a:ea typeface="M+ 1p light" panose="020B0402020203020204" pitchFamily="50" charset="-128"/>
+                <a:cs typeface="M+ 1p light" panose="020B0402020203020204" pitchFamily="50" charset="-128"/>
+              </a:rPr>
+              <a:t>距離は</a:t>
+            </a:r>
+            <a:r>
+              <a:rPr kumimoji="1" lang="en-US" altLang="ja-JP" dirty="0">
+                <a:solidFill>
+                  <a:schemeClr val="bg1">
+                    <a:lumMod val="50000"/>
+                  </a:schemeClr>
+                </a:solidFill>
+                <a:latin typeface="M+ 1p light" panose="020B0402020203020204" pitchFamily="50" charset="-128"/>
+                <a:ea typeface="M+ 1p light" panose="020B0402020203020204" pitchFamily="50" charset="-128"/>
+                <a:cs typeface="M+ 1p light" panose="020B0402020203020204" pitchFamily="50" charset="-128"/>
+              </a:rPr>
+              <a:t>4</a:t>
+            </a:r>
+            <a:r>
+              <a:rPr kumimoji="1" lang="ja-JP" altLang="en-US" dirty="0">
+                <a:solidFill>
+                  <a:schemeClr val="bg1">
+                    <a:lumMod val="50000"/>
+                  </a:schemeClr>
+                </a:solidFill>
+                <a:latin typeface="M+ 1p light" panose="020B0402020203020204" pitchFamily="50" charset="-128"/>
+                <a:ea typeface="M+ 1p light" panose="020B0402020203020204" pitchFamily="50" charset="-128"/>
+                <a:cs typeface="M+ 1p light" panose="020B0402020203020204" pitchFamily="50" charset="-128"/>
+              </a:rPr>
+              <a:t>つの公理さえ満たせば全部距離になる</a:t>
+            </a:r>
+            <a:r>
+              <a:rPr kumimoji="1" lang="en-US" altLang="ja-JP" dirty="0">
+                <a:solidFill>
+                  <a:schemeClr val="bg1">
+                    <a:lumMod val="50000"/>
+                  </a:schemeClr>
+                </a:solidFill>
+                <a:latin typeface="M+ 1p light" panose="020B0402020203020204" pitchFamily="50" charset="-128"/>
+                <a:ea typeface="M+ 1p light" panose="020B0402020203020204" pitchFamily="50" charset="-128"/>
+                <a:cs typeface="M+ 1p light" panose="020B0402020203020204" pitchFamily="50" charset="-128"/>
+              </a:rPr>
+              <a:t>.</a:t>
+            </a:r>
+          </a:p>
+          <a:p>
+            <a:pPr algn="ctr"/>
+            <a:r>
+              <a:rPr kumimoji="1" lang="ja-JP" altLang="en-US" dirty="0">
+                <a:solidFill>
+                  <a:schemeClr val="bg1">
+                    <a:lumMod val="50000"/>
+                  </a:schemeClr>
+                </a:solidFill>
+                <a:latin typeface="M+ 1p light" panose="020B0402020203020204" pitchFamily="50" charset="-128"/>
+                <a:ea typeface="M+ 1p light" panose="020B0402020203020204" pitchFamily="50" charset="-128"/>
+                <a:cs typeface="M+ 1p light" panose="020B0402020203020204" pitchFamily="50" charset="-128"/>
+              </a:rPr>
+              <a:t>ユークリッド以外には</a:t>
+            </a:r>
+            <a:r>
+              <a:rPr kumimoji="1" lang="en-US" altLang="ja-JP" dirty="0">
+                <a:solidFill>
+                  <a:schemeClr val="bg1">
+                    <a:lumMod val="50000"/>
+                  </a:schemeClr>
+                </a:solidFill>
+                <a:latin typeface="M+ 1p light" panose="020B0402020203020204" pitchFamily="50" charset="-128"/>
+                <a:ea typeface="M+ 1p light" panose="020B0402020203020204" pitchFamily="50" charset="-128"/>
+                <a:cs typeface="M+ 1p light" panose="020B0402020203020204" pitchFamily="50" charset="-128"/>
+              </a:rPr>
+              <a:t>, </a:t>
+            </a:r>
+            <a:r>
+              <a:rPr kumimoji="1" lang="ja-JP" altLang="en-US" dirty="0">
+                <a:solidFill>
+                  <a:schemeClr val="bg1">
+                    <a:lumMod val="50000"/>
+                  </a:schemeClr>
+                </a:solidFill>
+                <a:latin typeface="M+ 1p light" panose="020B0402020203020204" pitchFamily="50" charset="-128"/>
+                <a:ea typeface="M+ 1p light" panose="020B0402020203020204" pitchFamily="50" charset="-128"/>
+                <a:cs typeface="M+ 1p light" panose="020B0402020203020204" pitchFamily="50" charset="-128"/>
+              </a:rPr>
+              <a:t>マンハッタン距離</a:t>
+            </a:r>
+            <a:r>
+              <a:rPr kumimoji="1" lang="en-US" altLang="ja-JP" dirty="0">
+                <a:solidFill>
+                  <a:schemeClr val="bg1">
+                    <a:lumMod val="50000"/>
+                  </a:schemeClr>
+                </a:solidFill>
+                <a:latin typeface="M+ 1p light" panose="020B0402020203020204" pitchFamily="50" charset="-128"/>
+                <a:ea typeface="M+ 1p light" panose="020B0402020203020204" pitchFamily="50" charset="-128"/>
+                <a:cs typeface="M+ 1p light" panose="020B0402020203020204" pitchFamily="50" charset="-128"/>
+              </a:rPr>
+              <a:t>, </a:t>
+            </a:r>
+            <a:r>
+              <a:rPr kumimoji="1" lang="ja-JP" altLang="en-US" dirty="0">
+                <a:solidFill>
+                  <a:schemeClr val="bg1">
+                    <a:lumMod val="50000"/>
+                  </a:schemeClr>
+                </a:solidFill>
+                <a:latin typeface="M+ 1p light" panose="020B0402020203020204" pitchFamily="50" charset="-128"/>
+                <a:ea typeface="M+ 1p light" panose="020B0402020203020204" pitchFamily="50" charset="-128"/>
+                <a:cs typeface="M+ 1p light" panose="020B0402020203020204" pitchFamily="50" charset="-128"/>
+              </a:rPr>
+              <a:t>マハラノビス距離とか</a:t>
+            </a:r>
+            <a:endParaRPr kumimoji="1" lang="en-US" altLang="ja-JP" dirty="0">
+              <a:solidFill>
+                <a:schemeClr val="bg1">
+                  <a:lumMod val="50000"/>
+                </a:schemeClr>
+              </a:solidFill>
+              <a:latin typeface="M+ 1p light" panose="020B0402020203020204" pitchFamily="50" charset="-128"/>
+              <a:ea typeface="M+ 1p light" panose="020B0402020203020204" pitchFamily="50" charset="-128"/>
+              <a:cs typeface="M+ 1p light" panose="020B0402020203020204" pitchFamily="50" charset="-128"/>
+            </a:endParaRPr>
+          </a:p>
+        </p:txBody>
+      </p:sp>
+      <p:sp>
+        <p:nvSpPr>
+          <p:cNvPr id="60" name="Google Shape;60;p14"/>
+          <p:cNvSpPr txBox="1">
+            <a:spLocks noGrp="1"/>
+          </p:cNvSpPr>
+          <p:nvPr>
+            <p:ph type="title"/>
+          </p:nvPr>
+        </p:nvSpPr>
+        <p:spPr>
+          <a:xfrm>
+            <a:off x="311700" y="445025"/>
+            <a:ext cx="8520600" cy="572700"/>
+          </a:xfrm>
+          <a:prstGeom prst="rect">
+            <a:avLst/>
+          </a:prstGeom>
+        </p:spPr>
+        <p:txBody>
+          <a:bodyPr spcFirstLastPara="1" wrap="square" lIns="91425" tIns="91425" rIns="91425" bIns="91425" anchor="t" anchorCtr="0">
+            <a:noAutofit/>
+          </a:bodyPr>
+          <a:lstStyle/>
+          <a:p>
+            <a:pPr lvl="0"/>
+            <a:r>
+              <a:rPr lang="ja-JP" altLang="en-US" dirty="0">
+                <a:solidFill>
+                  <a:schemeClr val="tx1">
+                    <a:lumMod val="75000"/>
+                    <a:lumOff val="25000"/>
+                  </a:schemeClr>
+                </a:solidFill>
+                <a:latin typeface="M+ 1p" panose="020B0503020203020204" pitchFamily="50" charset="-128"/>
+                <a:ea typeface="M+ 1p" panose="020B0503020203020204" pitchFamily="50" charset="-128"/>
+                <a:cs typeface="M+ 1p" panose="020B0503020203020204" pitchFamily="50" charset="-128"/>
+              </a:rPr>
+              <a:t>長さを保存する変換</a:t>
+            </a:r>
+            <a:endParaRPr dirty="0">
+              <a:solidFill>
+                <a:schemeClr val="tx1">
+                  <a:lumMod val="75000"/>
+                  <a:lumOff val="25000"/>
+                </a:schemeClr>
+              </a:solidFill>
+              <a:latin typeface="M+ 1p" panose="020B0503020203020204" pitchFamily="50" charset="-128"/>
+              <a:ea typeface="M+ 1p" panose="020B0503020203020204" pitchFamily="50" charset="-128"/>
+              <a:cs typeface="M+ 1p" panose="020B0503020203020204" pitchFamily="50" charset="-128"/>
+            </a:endParaRPr>
+          </a:p>
+        </p:txBody>
+      </p:sp>
+      <mc:AlternateContent xmlns:mc="http://schemas.openxmlformats.org/markup-compatibility/2006">
+        <mc:Choice xmlns:a14="http://schemas.microsoft.com/office/drawing/2010/main" Requires="a14">
+          <p:sp>
+            <p:nvSpPr>
+              <p:cNvPr id="61" name="Google Shape;61;p14"/>
+              <p:cNvSpPr txBox="1">
+                <a:spLocks noGrp="1"/>
+              </p:cNvSpPr>
+              <p:nvPr>
+                <p:ph type="body" idx="1"/>
+              </p:nvPr>
+            </p:nvSpPr>
+            <p:spPr>
+              <a:xfrm>
+                <a:off x="311700" y="1152475"/>
+                <a:ext cx="8520600" cy="3416400"/>
+              </a:xfrm>
+              <a:prstGeom prst="rect">
+                <a:avLst/>
+              </a:prstGeom>
+            </p:spPr>
+            <p:txBody>
+              <a:bodyPr spcFirstLastPara="1" wrap="square" lIns="91425" tIns="91425" rIns="91425" bIns="91425" anchor="t" anchorCtr="0">
+                <a:noAutofit/>
+              </a:bodyPr>
+              <a:lstStyle/>
+              <a:p>
+                <a:pPr marL="0" lvl="0" indent="0">
+                  <a:buNone/>
+                </a:pPr>
+                <a:r>
+                  <a:rPr lang="ja-JP" altLang="en-US" dirty="0">
+                    <a:latin typeface="M+ 1p light" panose="020B0402020203020204" pitchFamily="50" charset="-128"/>
+                    <a:ea typeface="M+ 1p light" panose="020B0402020203020204" pitchFamily="50" charset="-128"/>
+                    <a:cs typeface="M+ 1p light" panose="020B0402020203020204" pitchFamily="50" charset="-128"/>
+                  </a:rPr>
+                  <a:t>空間上の二点に</a:t>
+                </a:r>
+                <a:r>
+                  <a:rPr lang="en-US" altLang="ja-JP" dirty="0">
+                    <a:latin typeface="M+ 1p light" panose="020B0402020203020204" pitchFamily="50" charset="-128"/>
+                    <a:ea typeface="M+ 1p light" panose="020B0402020203020204" pitchFamily="50" charset="-128"/>
+                    <a:cs typeface="M+ 1p light" panose="020B0402020203020204" pitchFamily="50" charset="-128"/>
+                  </a:rPr>
+                  <a:t>, </a:t>
+                </a:r>
+                <a:r>
+                  <a:rPr lang="ja-JP" altLang="en-US" dirty="0">
+                    <a:latin typeface="M+ 1p light" panose="020B0402020203020204" pitchFamily="50" charset="-128"/>
+                    <a:ea typeface="M+ 1p light" panose="020B0402020203020204" pitchFamily="50" charset="-128"/>
+                    <a:cs typeface="M+ 1p light" panose="020B0402020203020204" pitchFamily="50" charset="-128"/>
+                  </a:rPr>
+                  <a:t>変換前と後で距離関数を作用させた時</a:t>
+                </a:r>
+                <a:r>
+                  <a:rPr lang="en-US" altLang="ja-JP" dirty="0">
+                    <a:latin typeface="M+ 1p light" panose="020B0402020203020204" pitchFamily="50" charset="-128"/>
+                    <a:ea typeface="M+ 1p light" panose="020B0402020203020204" pitchFamily="50" charset="-128"/>
+                    <a:cs typeface="M+ 1p light" panose="020B0402020203020204" pitchFamily="50" charset="-128"/>
+                  </a:rPr>
+                  <a:t>, </a:t>
+                </a:r>
+                <a:r>
+                  <a:rPr lang="ja-JP" altLang="en-US" dirty="0">
+                    <a:latin typeface="M+ 1p light" panose="020B0402020203020204" pitchFamily="50" charset="-128"/>
+                    <a:ea typeface="M+ 1p light" panose="020B0402020203020204" pitchFamily="50" charset="-128"/>
+                    <a:cs typeface="M+ 1p light" panose="020B0402020203020204" pitchFamily="50" charset="-128"/>
+                  </a:rPr>
+                  <a:t>同じ距離を示す変換の事を</a:t>
+                </a:r>
+                <a:r>
+                  <a:rPr lang="en-US" altLang="ja-JP" dirty="0">
+                    <a:latin typeface="M+ 1p light" panose="020B0402020203020204" pitchFamily="50" charset="-128"/>
+                    <a:ea typeface="M+ 1p light" panose="020B0402020203020204" pitchFamily="50" charset="-128"/>
+                    <a:cs typeface="M+ 1p light" panose="020B0402020203020204" pitchFamily="50" charset="-128"/>
+                  </a:rPr>
+                  <a:t>, </a:t>
+                </a:r>
+                <a:r>
+                  <a:rPr lang="ja-JP" altLang="en-US" dirty="0">
+                    <a:latin typeface="M+ 1p light" panose="020B0402020203020204" pitchFamily="50" charset="-128"/>
+                    <a:ea typeface="M+ 1p light" panose="020B0402020203020204" pitchFamily="50" charset="-128"/>
+                    <a:cs typeface="M+ 1p light" panose="020B0402020203020204" pitchFamily="50" charset="-128"/>
+                  </a:rPr>
+                  <a:t>等長変換といい</a:t>
+                </a:r>
+                <a:r>
+                  <a:rPr lang="en-US" altLang="ja-JP" dirty="0">
+                    <a:latin typeface="M+ 1p light" panose="020B0402020203020204" pitchFamily="50" charset="-128"/>
+                    <a:ea typeface="M+ 1p light" panose="020B0402020203020204" pitchFamily="50" charset="-128"/>
+                    <a:cs typeface="M+ 1p light" panose="020B0402020203020204" pitchFamily="50" charset="-128"/>
+                  </a:rPr>
+                  <a:t>, </a:t>
+                </a:r>
+                <a:r>
+                  <a:rPr lang="ja-JP" altLang="en-US" dirty="0">
+                    <a:latin typeface="M+ 1p light" panose="020B0402020203020204" pitchFamily="50" charset="-128"/>
+                    <a:ea typeface="M+ 1p light" panose="020B0402020203020204" pitchFamily="50" charset="-128"/>
+                    <a:cs typeface="M+ 1p light" panose="020B0402020203020204" pitchFamily="50" charset="-128"/>
+                  </a:rPr>
+                  <a:t>これは群をなす</a:t>
+                </a:r>
+                <a:endParaRPr lang="en-US" altLang="ja-JP" dirty="0">
+                  <a:latin typeface="M+ 1p light" panose="020B0402020203020204" pitchFamily="50" charset="-128"/>
+                  <a:ea typeface="M+ 1p light" panose="020B0402020203020204" pitchFamily="50" charset="-128"/>
+                  <a:cs typeface="M+ 1p light" panose="020B0402020203020204" pitchFamily="50" charset="-128"/>
+                </a:endParaRPr>
+              </a:p>
+              <a:p>
+                <a:pPr marL="0" lvl="0" indent="0">
+                  <a:buNone/>
+                </a:pPr>
+                <a:endParaRPr lang="en-US" altLang="ja-JP" dirty="0">
+                  <a:latin typeface="M+ 1p light" panose="020B0402020203020204" pitchFamily="50" charset="-128"/>
+                  <a:ea typeface="M+ 1p light" panose="020B0402020203020204" pitchFamily="50" charset="-128"/>
+                  <a:cs typeface="M+ 1p light" panose="020B0402020203020204" pitchFamily="50" charset="-128"/>
+                </a:endParaRPr>
+              </a:p>
+              <a:p>
+                <a:pPr marL="0" lvl="0" indent="0">
+                  <a:buNone/>
+                </a:pPr>
+                <a:r>
+                  <a:rPr lang="en-US" altLang="ja-JP" dirty="0">
+                    <a:latin typeface="M+ 1p light" panose="020B0402020203020204" pitchFamily="50" charset="-128"/>
+                    <a:ea typeface="M+ 1p light" panose="020B0402020203020204" pitchFamily="50" charset="-128"/>
+                    <a:cs typeface="M+ 1p light" panose="020B0402020203020204" pitchFamily="50" charset="-128"/>
+                  </a:rPr>
+                  <a:t>Q. Def. </a:t>
+                </a:r>
+                <a:r>
+                  <a:rPr lang="ja-JP" altLang="en-US" dirty="0">
+                    <a:latin typeface="M+ 1p light" panose="020B0402020203020204" pitchFamily="50" charset="-128"/>
+                    <a:ea typeface="M+ 1p light" panose="020B0402020203020204" pitchFamily="50" charset="-128"/>
+                    <a:cs typeface="M+ 1p light" panose="020B0402020203020204" pitchFamily="50" charset="-128"/>
+                  </a:rPr>
+                  <a:t>等長変換</a:t>
+                </a:r>
+                <a:endParaRPr lang="en-US" altLang="ja-JP" dirty="0">
+                  <a:latin typeface="M+ 1p light" panose="020B0402020203020204" pitchFamily="50" charset="-128"/>
+                  <a:ea typeface="M+ 1p light" panose="020B0402020203020204" pitchFamily="50" charset="-128"/>
+                  <a:cs typeface="M+ 1p light" panose="020B0402020203020204" pitchFamily="50" charset="-128"/>
+                </a:endParaRPr>
+              </a:p>
+              <a:p>
+                <a:pPr marL="0" lvl="0" indent="0">
+                  <a:buNone/>
+                </a:pPr>
+                <a:r>
+                  <a:rPr lang="ja-JP" altLang="en-US" sz="1600" dirty="0">
+                    <a:solidFill>
+                      <a:schemeClr val="accent5"/>
+                    </a:solidFill>
+                    <a:latin typeface="M+ 1p light" panose="020B0402020203020204" pitchFamily="50" charset="-128"/>
+                    <a:ea typeface="M+ 1p light" panose="020B0402020203020204" pitchFamily="50" charset="-128"/>
+                    <a:cs typeface="M+ 1p light" panose="020B0402020203020204" pitchFamily="50" charset="-128"/>
+                  </a:rPr>
+                  <a:t>距離空間</a:t>
+                </a:r>
+                <a14:m>
+                  <m:oMath xmlns:m="http://schemas.openxmlformats.org/officeDocument/2006/math">
+                    <m:r>
+                      <a:rPr lang="en-US" altLang="ja-JP" sz="1600" i="1">
+                        <a:latin typeface="Cambria Math" panose="02040503050406030204" pitchFamily="18" charset="0"/>
+                        <a:ea typeface="M+ 1p light" panose="020B0402020203020204" pitchFamily="50" charset="-128"/>
+                        <a:cs typeface="M+ 1p light" panose="020B0402020203020204" pitchFamily="50" charset="-128"/>
+                      </a:rPr>
+                      <m:t>(</m:t>
+                    </m:r>
+                    <m:r>
+                      <a:rPr lang="en-US" altLang="ja-JP" sz="1600" i="1">
+                        <a:latin typeface="Cambria Math" panose="02040503050406030204" pitchFamily="18" charset="0"/>
+                        <a:ea typeface="M+ 1p light" panose="020B0402020203020204" pitchFamily="50" charset="-128"/>
+                        <a:cs typeface="M+ 1p light" panose="020B0402020203020204" pitchFamily="50" charset="-128"/>
+                      </a:rPr>
+                      <m:t>𝐴</m:t>
+                    </m:r>
+                    <m:r>
+                      <a:rPr lang="en-US" altLang="ja-JP" sz="1600" i="1">
+                        <a:latin typeface="Cambria Math" panose="02040503050406030204" pitchFamily="18" charset="0"/>
+                        <a:ea typeface="M+ 1p light" panose="020B0402020203020204" pitchFamily="50" charset="-128"/>
+                        <a:cs typeface="M+ 1p light" panose="020B0402020203020204" pitchFamily="50" charset="-128"/>
+                      </a:rPr>
+                      <m:t>,</m:t>
+                    </m:r>
+                    <m:r>
+                      <a:rPr lang="en-US" altLang="ja-JP" sz="1600" i="1">
+                        <a:latin typeface="Cambria Math" panose="02040503050406030204" pitchFamily="18" charset="0"/>
+                        <a:ea typeface="M+ 1p light" panose="020B0402020203020204" pitchFamily="50" charset="-128"/>
+                        <a:cs typeface="M+ 1p light" panose="020B0402020203020204" pitchFamily="50" charset="-128"/>
+                      </a:rPr>
+                      <m:t>𝑑</m:t>
+                    </m:r>
+                    <m:r>
+                      <a:rPr lang="en-US" altLang="ja-JP" sz="1600" i="1">
+                        <a:latin typeface="Cambria Math" panose="02040503050406030204" pitchFamily="18" charset="0"/>
+                        <a:ea typeface="M+ 1p light" panose="020B0402020203020204" pitchFamily="50" charset="-128"/>
+                        <a:cs typeface="M+ 1p light" panose="020B0402020203020204" pitchFamily="50" charset="-128"/>
+                      </a:rPr>
+                      <m:t>)</m:t>
+                    </m:r>
+                    <m:r>
+                      <a:rPr lang="ja-JP" altLang="en-US" sz="1600" i="1">
+                        <a:latin typeface="Cambria Math" panose="02040503050406030204" pitchFamily="18" charset="0"/>
+                        <a:ea typeface="M+ 1p light" panose="020B0402020203020204" pitchFamily="50" charset="-128"/>
+                        <a:cs typeface="M+ 1p light" panose="020B0402020203020204" pitchFamily="50" charset="-128"/>
+                      </a:rPr>
+                      <m:t>と</m:t>
+                    </m:r>
+                  </m:oMath>
+                </a14:m>
+                <a:r>
+                  <a:rPr lang="ja-JP" altLang="en-US" sz="1600" dirty="0">
+                    <a:latin typeface="M+ 1p light" panose="020B0402020203020204" pitchFamily="50" charset="-128"/>
+                    <a:ea typeface="M+ 1p light" panose="020B0402020203020204" pitchFamily="50" charset="-128"/>
+                    <a:cs typeface="M+ 1p light" panose="020B0402020203020204" pitchFamily="50" charset="-128"/>
+                  </a:rPr>
+                  <a:t>その上の全単射</a:t>
+                </a:r>
+                <a14:m>
+                  <m:oMath xmlns:m="http://schemas.openxmlformats.org/officeDocument/2006/math">
+                    <m:r>
+                      <a:rPr lang="en-US" altLang="ja-JP" sz="1600" i="1">
+                        <a:latin typeface="Cambria Math" panose="02040503050406030204" pitchFamily="18" charset="0"/>
+                        <a:ea typeface="M+ 1p light" panose="020B0402020203020204" pitchFamily="50" charset="-128"/>
+                        <a:cs typeface="M+ 1p light" panose="020B0402020203020204" pitchFamily="50" charset="-128"/>
+                      </a:rPr>
+                      <m:t>𝑓</m:t>
+                    </m:r>
+                    <m:r>
+                      <a:rPr lang="en-US" altLang="ja-JP" sz="1600" i="1">
+                        <a:latin typeface="Cambria Math" panose="02040503050406030204" pitchFamily="18" charset="0"/>
+                        <a:ea typeface="M+ 1p light" panose="020B0402020203020204" pitchFamily="50" charset="-128"/>
+                        <a:cs typeface="M+ 1p light" panose="020B0402020203020204" pitchFamily="50" charset="-128"/>
+                      </a:rPr>
+                      <m:t>:</m:t>
+                    </m:r>
+                    <m:r>
+                      <a:rPr lang="en-US" altLang="ja-JP" sz="1600" i="1">
+                        <a:latin typeface="Cambria Math" panose="02040503050406030204" pitchFamily="18" charset="0"/>
+                        <a:ea typeface="M+ 1p light" panose="020B0402020203020204" pitchFamily="50" charset="-128"/>
+                        <a:cs typeface="M+ 1p light" panose="020B0402020203020204" pitchFamily="50" charset="-128"/>
+                      </a:rPr>
+                      <m:t>𝐴</m:t>
+                    </m:r>
+                    <m:r>
+                      <a:rPr lang="en-US" altLang="ja-JP" sz="1600" i="1">
+                        <a:latin typeface="Cambria Math" panose="02040503050406030204" pitchFamily="18" charset="0"/>
+                        <a:ea typeface="M+ 1p light" panose="020B0402020203020204" pitchFamily="50" charset="-128"/>
+                        <a:cs typeface="M+ 1p light" panose="020B0402020203020204" pitchFamily="50" charset="-128"/>
+                      </a:rPr>
+                      <m:t>→</m:t>
+                    </m:r>
+                    <m:r>
+                      <a:rPr lang="en-US" altLang="ja-JP" sz="1600" i="1">
+                        <a:latin typeface="Cambria Math" panose="02040503050406030204" pitchFamily="18" charset="0"/>
+                        <a:ea typeface="M+ 1p light" panose="020B0402020203020204" pitchFamily="50" charset="-128"/>
+                        <a:cs typeface="M+ 1p light" panose="020B0402020203020204" pitchFamily="50" charset="-128"/>
+                      </a:rPr>
+                      <m:t>𝐴</m:t>
+                    </m:r>
+                  </m:oMath>
+                </a14:m>
+                <a:r>
+                  <a:rPr lang="ja-JP" altLang="en-US" sz="1600" dirty="0">
+                    <a:latin typeface="M+ 1p light" panose="020B0402020203020204" pitchFamily="50" charset="-128"/>
+                    <a:ea typeface="M+ 1p light" panose="020B0402020203020204" pitchFamily="50" charset="-128"/>
+                    <a:cs typeface="M+ 1p light" panose="020B0402020203020204" pitchFamily="50" charset="-128"/>
+                  </a:rPr>
+                  <a:t>が任意の</a:t>
+                </a:r>
+                <a14:m>
+                  <m:oMath xmlns:m="http://schemas.openxmlformats.org/officeDocument/2006/math">
+                    <m:r>
+                      <a:rPr lang="en-US" altLang="ja-JP" sz="1600" i="1">
+                        <a:latin typeface="Cambria Math" panose="02040503050406030204" pitchFamily="18" charset="0"/>
+                        <a:ea typeface="M+ 1p light" panose="020B0402020203020204" pitchFamily="50" charset="-128"/>
+                        <a:cs typeface="M+ 1p light" panose="020B0402020203020204" pitchFamily="50" charset="-128"/>
+                      </a:rPr>
+                      <m:t>𝕩</m:t>
+                    </m:r>
+                    <m:r>
+                      <a:rPr lang="en-US" altLang="ja-JP" sz="1600" i="1">
+                        <a:latin typeface="Cambria Math" panose="02040503050406030204" pitchFamily="18" charset="0"/>
+                        <a:ea typeface="M+ 1p light" panose="020B0402020203020204" pitchFamily="50" charset="-128"/>
+                        <a:cs typeface="M+ 1p light" panose="020B0402020203020204" pitchFamily="50" charset="-128"/>
+                      </a:rPr>
+                      <m:t>,</m:t>
+                    </m:r>
+                    <m:r>
+                      <a:rPr lang="en-US" altLang="ja-JP" sz="1600" i="1">
+                        <a:latin typeface="Cambria Math" panose="02040503050406030204" pitchFamily="18" charset="0"/>
+                        <a:ea typeface="M+ 1p light" panose="020B0402020203020204" pitchFamily="50" charset="-128"/>
+                        <a:cs typeface="M+ 1p light" panose="020B0402020203020204" pitchFamily="50" charset="-128"/>
+                      </a:rPr>
+                      <m:t>𝕪</m:t>
+                    </m:r>
+                    <m:r>
+                      <a:rPr lang="en-US" altLang="ja-JP" sz="1600" i="1">
+                        <a:latin typeface="Cambria Math" panose="02040503050406030204" pitchFamily="18" charset="0"/>
+                        <a:ea typeface="M+ 1p light" panose="020B0402020203020204" pitchFamily="50" charset="-128"/>
+                        <a:cs typeface="M+ 1p light" panose="020B0402020203020204" pitchFamily="50" charset="-128"/>
+                      </a:rPr>
+                      <m:t>∈</m:t>
+                    </m:r>
+                    <m:r>
+                      <a:rPr lang="en-US" altLang="ja-JP" sz="1600" i="1">
+                        <a:latin typeface="Cambria Math" panose="02040503050406030204" pitchFamily="18" charset="0"/>
+                        <a:ea typeface="M+ 1p light" panose="020B0402020203020204" pitchFamily="50" charset="-128"/>
+                        <a:cs typeface="M+ 1p light" panose="020B0402020203020204" pitchFamily="50" charset="-128"/>
+                      </a:rPr>
+                      <m:t>𝐴</m:t>
+                    </m:r>
+                  </m:oMath>
+                </a14:m>
+                <a:r>
+                  <a:rPr lang="ja-JP" altLang="en-US" sz="1600" dirty="0">
+                    <a:latin typeface="M+ 1p light" panose="020B0402020203020204" pitchFamily="50" charset="-128"/>
+                    <a:ea typeface="M+ 1p light" panose="020B0402020203020204" pitchFamily="50" charset="-128"/>
+                    <a:cs typeface="M+ 1p light" panose="020B0402020203020204" pitchFamily="50" charset="-128"/>
+                  </a:rPr>
+                  <a:t>に対して</a:t>
+                </a:r>
+                <a:endParaRPr lang="en-US" altLang="ja-JP" sz="1600" dirty="0">
+                  <a:latin typeface="M+ 1p light" panose="020B0402020203020204" pitchFamily="50" charset="-128"/>
+                  <a:ea typeface="M+ 1p light" panose="020B0402020203020204" pitchFamily="50" charset="-128"/>
+                  <a:cs typeface="M+ 1p light" panose="020B0402020203020204" pitchFamily="50" charset="-128"/>
+                </a:endParaRPr>
+              </a:p>
+              <a:p>
+                <a:pPr marL="0" lvl="0" indent="0">
+                  <a:buNone/>
+                </a:pPr>
+                <a14:m>
+                  <m:oMathPara xmlns:m="http://schemas.openxmlformats.org/officeDocument/2006/math">
+                    <m:oMathParaPr>
+                      <m:jc m:val="centerGroup"/>
+                    </m:oMathParaPr>
+                    <m:oMath xmlns:m="http://schemas.openxmlformats.org/officeDocument/2006/math">
+                      <m:r>
+                        <a:rPr lang="en-US" altLang="ja-JP" sz="1600" i="1">
+                          <a:latin typeface="Cambria Math" panose="02040503050406030204" pitchFamily="18" charset="0"/>
+                          <a:ea typeface="M+ 1p light" panose="020B0402020203020204" pitchFamily="50" charset="-128"/>
+                          <a:cs typeface="M+ 1p light" panose="020B0402020203020204" pitchFamily="50" charset="-128"/>
+                        </a:rPr>
+                        <m:t>𝑑</m:t>
+                      </m:r>
+                      <m:d>
+                        <m:dPr>
+                          <m:ctrlPr>
+                            <a:rPr lang="en-US" altLang="ja-JP" sz="1600" i="1">
+                              <a:latin typeface="Cambria Math" panose="02040503050406030204" pitchFamily="18" charset="0"/>
+                              <a:ea typeface="M+ 1p light" panose="020B0402020203020204" pitchFamily="50" charset="-128"/>
+                              <a:cs typeface="M+ 1p light" panose="020B0402020203020204" pitchFamily="50" charset="-128"/>
+                            </a:rPr>
+                          </m:ctrlPr>
+                        </m:dPr>
+                        <m:e>
+                          <m:r>
+                            <a:rPr lang="en-US" altLang="ja-JP" sz="1600" i="1">
+                              <a:latin typeface="Cambria Math" panose="02040503050406030204" pitchFamily="18" charset="0"/>
+                              <a:ea typeface="M+ 1p light" panose="020B0402020203020204" pitchFamily="50" charset="-128"/>
+                              <a:cs typeface="M+ 1p light" panose="020B0402020203020204" pitchFamily="50" charset="-128"/>
+                            </a:rPr>
+                            <m:t>𝕩</m:t>
+                          </m:r>
+                          <m:r>
+                            <a:rPr lang="en-US" altLang="ja-JP" sz="1600" i="1">
+                              <a:latin typeface="Cambria Math" panose="02040503050406030204" pitchFamily="18" charset="0"/>
+                              <a:ea typeface="M+ 1p light" panose="020B0402020203020204" pitchFamily="50" charset="-128"/>
+                              <a:cs typeface="M+ 1p light" panose="020B0402020203020204" pitchFamily="50" charset="-128"/>
+                            </a:rPr>
+                            <m:t>, </m:t>
+                          </m:r>
+                          <m:r>
+                            <a:rPr lang="en-US" altLang="ja-JP" sz="1600" i="1">
+                              <a:latin typeface="Cambria Math" panose="02040503050406030204" pitchFamily="18" charset="0"/>
+                              <a:ea typeface="M+ 1p light" panose="020B0402020203020204" pitchFamily="50" charset="-128"/>
+                              <a:cs typeface="M+ 1p light" panose="020B0402020203020204" pitchFamily="50" charset="-128"/>
+                            </a:rPr>
+                            <m:t>𝕪</m:t>
+                          </m:r>
+                        </m:e>
+                      </m:d>
+                      <m:r>
+                        <a:rPr lang="en-US" altLang="ja-JP" sz="1600" i="1">
+                          <a:latin typeface="Cambria Math" panose="02040503050406030204" pitchFamily="18" charset="0"/>
+                          <a:ea typeface="M+ 1p light" panose="020B0402020203020204" pitchFamily="50" charset="-128"/>
+                          <a:cs typeface="M+ 1p light" panose="020B0402020203020204" pitchFamily="50" charset="-128"/>
+                        </a:rPr>
+                        <m:t>=</m:t>
+                      </m:r>
+                      <m:r>
+                        <a:rPr lang="en-US" altLang="ja-JP" sz="1600" i="1">
+                          <a:latin typeface="Cambria Math" panose="02040503050406030204" pitchFamily="18" charset="0"/>
+                          <a:ea typeface="M+ 1p light" panose="020B0402020203020204" pitchFamily="50" charset="-128"/>
+                          <a:cs typeface="M+ 1p light" panose="020B0402020203020204" pitchFamily="50" charset="-128"/>
+                        </a:rPr>
+                        <m:t>𝑑</m:t>
+                      </m:r>
+                      <m:r>
+                        <a:rPr lang="en-US" altLang="ja-JP" sz="1600" i="1">
+                          <a:latin typeface="Cambria Math" panose="02040503050406030204" pitchFamily="18" charset="0"/>
+                          <a:ea typeface="M+ 1p light" panose="020B0402020203020204" pitchFamily="50" charset="-128"/>
+                          <a:cs typeface="M+ 1p light" panose="020B0402020203020204" pitchFamily="50" charset="-128"/>
+                        </a:rPr>
+                        <m:t>(</m:t>
+                      </m:r>
+                      <m:r>
+                        <a:rPr lang="en-US" altLang="ja-JP" sz="1600" i="1">
+                          <a:latin typeface="Cambria Math" panose="02040503050406030204" pitchFamily="18" charset="0"/>
+                          <a:ea typeface="M+ 1p light" panose="020B0402020203020204" pitchFamily="50" charset="-128"/>
+                          <a:cs typeface="M+ 1p light" panose="020B0402020203020204" pitchFamily="50" charset="-128"/>
+                        </a:rPr>
+                        <m:t>𝑓</m:t>
+                      </m:r>
+                      <m:d>
+                        <m:dPr>
+                          <m:ctrlPr>
+                            <a:rPr lang="en-US" altLang="ja-JP" sz="1600" i="1">
+                              <a:latin typeface="Cambria Math" panose="02040503050406030204" pitchFamily="18" charset="0"/>
+                              <a:ea typeface="M+ 1p light" panose="020B0402020203020204" pitchFamily="50" charset="-128"/>
+                              <a:cs typeface="M+ 1p light" panose="020B0402020203020204" pitchFamily="50" charset="-128"/>
+                            </a:rPr>
+                          </m:ctrlPr>
+                        </m:dPr>
+                        <m:e>
+                          <m:r>
+                            <a:rPr lang="en-US" altLang="ja-JP" sz="1600" i="1">
+                              <a:latin typeface="Cambria Math" panose="02040503050406030204" pitchFamily="18" charset="0"/>
+                              <a:ea typeface="M+ 1p light" panose="020B0402020203020204" pitchFamily="50" charset="-128"/>
+                              <a:cs typeface="M+ 1p light" panose="020B0402020203020204" pitchFamily="50" charset="-128"/>
+                            </a:rPr>
+                            <m:t>𝕩</m:t>
+                          </m:r>
+                        </m:e>
+                      </m:d>
+                      <m:r>
+                        <a:rPr lang="en-US" altLang="ja-JP" sz="1600" i="1">
+                          <a:latin typeface="Cambria Math" panose="02040503050406030204" pitchFamily="18" charset="0"/>
+                          <a:ea typeface="M+ 1p light" panose="020B0402020203020204" pitchFamily="50" charset="-128"/>
+                          <a:cs typeface="M+ 1p light" panose="020B0402020203020204" pitchFamily="50" charset="-128"/>
+                        </a:rPr>
+                        <m:t>,</m:t>
+                      </m:r>
+                      <m:r>
+                        <a:rPr lang="en-US" altLang="ja-JP" sz="1600" i="1">
+                          <a:latin typeface="Cambria Math" panose="02040503050406030204" pitchFamily="18" charset="0"/>
+                          <a:ea typeface="M+ 1p light" panose="020B0402020203020204" pitchFamily="50" charset="-128"/>
+                          <a:cs typeface="M+ 1p light" panose="020B0402020203020204" pitchFamily="50" charset="-128"/>
+                        </a:rPr>
+                        <m:t>𝑓</m:t>
+                      </m:r>
+                      <m:d>
+                        <m:dPr>
+                          <m:ctrlPr>
+                            <a:rPr lang="en-US" altLang="ja-JP" sz="1600" i="1">
+                              <a:latin typeface="Cambria Math" panose="02040503050406030204" pitchFamily="18" charset="0"/>
+                              <a:ea typeface="M+ 1p light" panose="020B0402020203020204" pitchFamily="50" charset="-128"/>
+                              <a:cs typeface="M+ 1p light" panose="020B0402020203020204" pitchFamily="50" charset="-128"/>
+                            </a:rPr>
+                          </m:ctrlPr>
+                        </m:dPr>
+                        <m:e>
+                          <m:r>
+                            <a:rPr lang="en-US" altLang="ja-JP" sz="1600" i="1">
+                              <a:latin typeface="Cambria Math" panose="02040503050406030204" pitchFamily="18" charset="0"/>
+                              <a:ea typeface="M+ 1p light" panose="020B0402020203020204" pitchFamily="50" charset="-128"/>
+                              <a:cs typeface="M+ 1p light" panose="020B0402020203020204" pitchFamily="50" charset="-128"/>
+                            </a:rPr>
+                            <m:t>𝕪</m:t>
+                          </m:r>
+                        </m:e>
+                      </m:d>
+                      <m:r>
+                        <a:rPr lang="en-US" altLang="ja-JP" sz="1600" i="1">
+                          <a:latin typeface="Cambria Math" panose="02040503050406030204" pitchFamily="18" charset="0"/>
+                          <a:ea typeface="M+ 1p light" panose="020B0402020203020204" pitchFamily="50" charset="-128"/>
+                          <a:cs typeface="M+ 1p light" panose="020B0402020203020204" pitchFamily="50" charset="-128"/>
+                        </a:rPr>
+                        <m:t>)</m:t>
+                      </m:r>
+                    </m:oMath>
+                  </m:oMathPara>
+                </a14:m>
+                <a:endParaRPr lang="en-US" altLang="ja-JP" sz="1600" dirty="0">
+                  <a:latin typeface="M+ 1p light" panose="020B0402020203020204" pitchFamily="50" charset="-128"/>
+                  <a:ea typeface="M+ 1p light" panose="020B0402020203020204" pitchFamily="50" charset="-128"/>
+                  <a:cs typeface="M+ 1p light" panose="020B0402020203020204" pitchFamily="50" charset="-128"/>
+                </a:endParaRPr>
+              </a:p>
+              <a:p>
+                <a:pPr marL="0" lvl="0" indent="0">
+                  <a:buNone/>
+                </a:pPr>
+                <a:r>
+                  <a:rPr lang="ja-JP" altLang="en-US" sz="1600" dirty="0">
+                    <a:latin typeface="M+ 1p light" panose="020B0402020203020204" pitchFamily="50" charset="-128"/>
+                    <a:ea typeface="M+ 1p light" panose="020B0402020203020204" pitchFamily="50" charset="-128"/>
+                    <a:cs typeface="M+ 1p light" panose="020B0402020203020204" pitchFamily="50" charset="-128"/>
+                  </a:rPr>
+                  <a:t>を満たすとき</a:t>
+                </a:r>
+                <a:r>
+                  <a:rPr lang="en-US" altLang="ja-JP" sz="1600" dirty="0">
+                    <a:latin typeface="M+ 1p light" panose="020B0402020203020204" pitchFamily="50" charset="-128"/>
+                    <a:ea typeface="M+ 1p light" panose="020B0402020203020204" pitchFamily="50" charset="-128"/>
+                    <a:cs typeface="M+ 1p light" panose="020B0402020203020204" pitchFamily="50" charset="-128"/>
+                  </a:rPr>
+                  <a:t>, </a:t>
+                </a:r>
+                <a:r>
+                  <a:rPr lang="ja-JP" altLang="en-US" sz="1600" dirty="0">
+                    <a:latin typeface="M+ 1p light" panose="020B0402020203020204" pitchFamily="50" charset="-128"/>
+                    <a:ea typeface="M+ 1p light" panose="020B0402020203020204" pitchFamily="50" charset="-128"/>
+                    <a:cs typeface="M+ 1p light" panose="020B0402020203020204" pitchFamily="50" charset="-128"/>
+                  </a:rPr>
+                  <a:t>これを</a:t>
+                </a:r>
+                <a:r>
+                  <a:rPr lang="ja-JP" altLang="en-US" sz="1600" dirty="0">
+                    <a:solidFill>
+                      <a:schemeClr val="accent5"/>
+                    </a:solidFill>
+                    <a:latin typeface="M+ 1p light" panose="020B0402020203020204" pitchFamily="50" charset="-128"/>
+                    <a:ea typeface="M+ 1p light" panose="020B0402020203020204" pitchFamily="50" charset="-128"/>
+                    <a:cs typeface="M+ 1p light" panose="020B0402020203020204" pitchFamily="50" charset="-128"/>
+                  </a:rPr>
+                  <a:t>等長変換</a:t>
+                </a:r>
+                <a:r>
+                  <a:rPr lang="ja-JP" altLang="en-US" sz="1600" dirty="0">
+                    <a:latin typeface="M+ 1p light" panose="020B0402020203020204" pitchFamily="50" charset="-128"/>
+                    <a:ea typeface="M+ 1p light" panose="020B0402020203020204" pitchFamily="50" charset="-128"/>
+                    <a:cs typeface="M+ 1p light" panose="020B0402020203020204" pitchFamily="50" charset="-128"/>
+                  </a:rPr>
+                  <a:t>という</a:t>
+                </a:r>
+                <a:r>
+                  <a:rPr lang="en-US" altLang="ja-JP" sz="1600" dirty="0">
+                    <a:latin typeface="M+ 1p light" panose="020B0402020203020204" pitchFamily="50" charset="-128"/>
+                    <a:ea typeface="M+ 1p light" panose="020B0402020203020204" pitchFamily="50" charset="-128"/>
+                    <a:cs typeface="M+ 1p light" panose="020B0402020203020204" pitchFamily="50" charset="-128"/>
+                  </a:rPr>
+                  <a:t>.</a:t>
+                </a:r>
+              </a:p>
+              <a:p>
+                <a:pPr marL="0" lvl="0" indent="0">
+                  <a:buNone/>
+                </a:pPr>
+                <a:endParaRPr lang="en-US" altLang="ja-JP" dirty="0">
+                  <a:latin typeface="M+ 1p light" panose="020B0402020203020204" pitchFamily="50" charset="-128"/>
+                  <a:ea typeface="M+ 1p light" panose="020B0402020203020204" pitchFamily="50" charset="-128"/>
+                  <a:cs typeface="M+ 1p light" panose="020B0402020203020204" pitchFamily="50" charset="-128"/>
+                </a:endParaRPr>
+              </a:p>
+              <a:p>
+                <a:pPr marL="0" lvl="0" indent="0">
+                  <a:buNone/>
+                </a:pPr>
+                <a:r>
+                  <a:rPr lang="en-US" altLang="ja-JP" dirty="0">
+                    <a:latin typeface="M+ 1p light" panose="020B0402020203020204" pitchFamily="50" charset="-128"/>
+                    <a:ea typeface="M+ 1p light" panose="020B0402020203020204" pitchFamily="50" charset="-128"/>
+                    <a:cs typeface="M+ 1p light" panose="020B0402020203020204" pitchFamily="50" charset="-128"/>
+                  </a:rPr>
+                  <a:t>Q. </a:t>
+                </a:r>
+                <a:r>
+                  <a:rPr lang="ja-JP" altLang="en-US" dirty="0">
+                    <a:latin typeface="M+ 1p light" panose="020B0402020203020204" pitchFamily="50" charset="-128"/>
+                    <a:ea typeface="M+ 1p light" panose="020B0402020203020204" pitchFamily="50" charset="-128"/>
+                    <a:cs typeface="M+ 1p light" panose="020B0402020203020204" pitchFamily="50" charset="-128"/>
+                  </a:rPr>
+                  <a:t>特にユークリッド空間においては</a:t>
+                </a:r>
+                <a:r>
+                  <a:rPr lang="en-US" altLang="ja-JP" dirty="0">
+                    <a:latin typeface="M+ 1p light" panose="020B0402020203020204" pitchFamily="50" charset="-128"/>
+                    <a:ea typeface="M+ 1p light" panose="020B0402020203020204" pitchFamily="50" charset="-128"/>
+                    <a:cs typeface="M+ 1p light" panose="020B0402020203020204" pitchFamily="50" charset="-128"/>
+                  </a:rPr>
+                  <a:t>, </a:t>
+                </a:r>
+                <a14:m>
+                  <m:oMath xmlns:m="http://schemas.openxmlformats.org/officeDocument/2006/math">
+                    <m:r>
+                      <a:rPr lang="en-US" altLang="ja-JP" sz="1600" i="1">
+                        <a:latin typeface="Cambria Math" panose="02040503050406030204" pitchFamily="18" charset="0"/>
+                        <a:ea typeface="M+ 1p light" panose="020B0402020203020204" pitchFamily="50" charset="-128"/>
+                        <a:cs typeface="M+ 1p light" panose="020B0402020203020204" pitchFamily="50" charset="-128"/>
+                      </a:rPr>
+                      <m:t>∀</m:t>
+                    </m:r>
+                    <m:r>
+                      <a:rPr lang="en-US" altLang="ja-JP" sz="1600" i="1">
+                        <a:latin typeface="Cambria Math" panose="02040503050406030204" pitchFamily="18" charset="0"/>
+                        <a:ea typeface="M+ 1p light" panose="020B0402020203020204" pitchFamily="50" charset="-128"/>
+                        <a:cs typeface="M+ 1p light" panose="020B0402020203020204" pitchFamily="50" charset="-128"/>
+                      </a:rPr>
+                      <m:t>𝑥</m:t>
+                    </m:r>
+                    <m:r>
+                      <a:rPr lang="en-US" altLang="ja-JP" sz="1600" i="1">
+                        <a:latin typeface="Cambria Math" panose="02040503050406030204" pitchFamily="18" charset="0"/>
+                        <a:ea typeface="M+ 1p light" panose="020B0402020203020204" pitchFamily="50" charset="-128"/>
+                        <a:cs typeface="M+ 1p light" panose="020B0402020203020204" pitchFamily="50" charset="-128"/>
+                      </a:rPr>
+                      <m:t>,</m:t>
+                    </m:r>
+                    <m:r>
+                      <a:rPr lang="en-US" altLang="ja-JP" sz="1600" i="1">
+                        <a:latin typeface="Cambria Math" panose="02040503050406030204" pitchFamily="18" charset="0"/>
+                        <a:ea typeface="M+ 1p light" panose="020B0402020203020204" pitchFamily="50" charset="-128"/>
+                        <a:cs typeface="M+ 1p light" panose="020B0402020203020204" pitchFamily="50" charset="-128"/>
+                      </a:rPr>
+                      <m:t>𝑦</m:t>
+                    </m:r>
+                    <m:r>
+                      <a:rPr lang="en-US" altLang="ja-JP" sz="1600" i="1">
+                        <a:latin typeface="Cambria Math" panose="02040503050406030204" pitchFamily="18" charset="0"/>
+                        <a:ea typeface="M+ 1p light" panose="020B0402020203020204" pitchFamily="50" charset="-128"/>
+                        <a:cs typeface="M+ 1p light" panose="020B0402020203020204" pitchFamily="50" charset="-128"/>
+                      </a:rPr>
+                      <m:t>∈</m:t>
+                    </m:r>
+                    <m:sSup>
+                      <m:sSupPr>
+                        <m:ctrlPr>
+                          <a:rPr lang="en-US" altLang="ja-JP" sz="1600" i="1">
+                            <a:latin typeface="Cambria Math" panose="02040503050406030204" pitchFamily="18" charset="0"/>
+                            <a:ea typeface="M+ 1p light" panose="020B0402020203020204" pitchFamily="50" charset="-128"/>
+                            <a:cs typeface="M+ 1p light" panose="020B0402020203020204" pitchFamily="50" charset="-128"/>
+                          </a:rPr>
+                        </m:ctrlPr>
+                      </m:sSupPr>
+                      <m:e>
+                        <m:r>
+                          <a:rPr lang="en-US" altLang="ja-JP" sz="1600" i="1">
+                            <a:latin typeface="Cambria Math" panose="02040503050406030204" pitchFamily="18" charset="0"/>
+                            <a:ea typeface="M+ 1p light" panose="020B0402020203020204" pitchFamily="50" charset="-128"/>
+                            <a:cs typeface="M+ 1p light" panose="020B0402020203020204" pitchFamily="50" charset="-128"/>
+                          </a:rPr>
+                          <m:t>ℝ</m:t>
+                        </m:r>
+                      </m:e>
+                      <m:sup>
+                        <m:r>
+                          <a:rPr lang="en-US" altLang="ja-JP" sz="1600" i="1">
+                            <a:latin typeface="Cambria Math" panose="02040503050406030204" pitchFamily="18" charset="0"/>
+                            <a:ea typeface="M+ 1p light" panose="020B0402020203020204" pitchFamily="50" charset="-128"/>
+                            <a:cs typeface="M+ 1p light" panose="020B0402020203020204" pitchFamily="50" charset="-128"/>
+                          </a:rPr>
+                          <m:t>2</m:t>
+                        </m:r>
+                      </m:sup>
+                    </m:sSup>
+                  </m:oMath>
+                </a14:m>
+                <a:r>
+                  <a:rPr lang="ja-JP" altLang="en-US" sz="1600" dirty="0">
+                    <a:latin typeface="M+ 1p light" panose="020B0402020203020204" pitchFamily="50" charset="-128"/>
+                    <a:ea typeface="M+ 1p light" panose="020B0402020203020204" pitchFamily="50" charset="-128"/>
+                    <a:cs typeface="M+ 1p light" panose="020B0402020203020204" pitchFamily="50" charset="-128"/>
+                  </a:rPr>
+                  <a:t>に対して</a:t>
+                </a:r>
+                <a:r>
+                  <a:rPr lang="en-US" altLang="ja-JP" sz="1600" dirty="0">
+                    <a:latin typeface="M+ 1p light" panose="020B0402020203020204" pitchFamily="50" charset="-128"/>
+                    <a:ea typeface="M+ 1p light" panose="020B0402020203020204" pitchFamily="50" charset="-128"/>
+                    <a:cs typeface="M+ 1p light" panose="020B0402020203020204" pitchFamily="50" charset="-128"/>
+                  </a:rPr>
+                  <a:t> </a:t>
+                </a:r>
+                <a:endParaRPr lang="en-US" altLang="ja-JP" sz="1600" i="1" dirty="0">
+                  <a:latin typeface="Cambria Math" panose="02040503050406030204" pitchFamily="18" charset="0"/>
+                  <a:ea typeface="M+ 1p light" panose="020B0402020203020204" pitchFamily="50" charset="-128"/>
+                  <a:cs typeface="M+ 1p light" panose="020B0402020203020204" pitchFamily="50" charset="-128"/>
+                </a:endParaRPr>
+              </a:p>
+              <a:p>
+                <a:pPr marL="0" lvl="0" indent="0">
+                  <a:buNone/>
+                </a:pPr>
+                <a14:m>
+                  <m:oMath xmlns:m="http://schemas.openxmlformats.org/officeDocument/2006/math">
+                    <m:d>
+                      <m:dPr>
+                        <m:begChr m:val="|"/>
+                        <m:endChr m:val="|"/>
+                        <m:ctrlPr>
+                          <a:rPr lang="en-US" altLang="ja-JP" sz="1600" i="1">
+                            <a:latin typeface="Cambria Math" panose="02040503050406030204" pitchFamily="18" charset="0"/>
+                            <a:ea typeface="M+ 1p light" panose="020B0402020203020204" pitchFamily="50" charset="-128"/>
+                            <a:cs typeface="M+ 1p light" panose="020B0402020203020204" pitchFamily="50" charset="-128"/>
+                          </a:rPr>
+                        </m:ctrlPr>
+                      </m:dPr>
+                      <m:e>
+                        <m:r>
+                          <a:rPr lang="en-US" altLang="ja-JP" sz="1600" i="1">
+                            <a:latin typeface="Cambria Math" panose="02040503050406030204" pitchFamily="18" charset="0"/>
+                            <a:ea typeface="M+ 1p light" panose="020B0402020203020204" pitchFamily="50" charset="-128"/>
+                            <a:cs typeface="M+ 1p light" panose="020B0402020203020204" pitchFamily="50" charset="-128"/>
+                          </a:rPr>
+                          <m:t>𝑥</m:t>
+                        </m:r>
+                        <m:r>
+                          <a:rPr lang="en-US" altLang="ja-JP" sz="1600" i="1">
+                            <a:latin typeface="Cambria Math" panose="02040503050406030204" pitchFamily="18" charset="0"/>
+                            <a:ea typeface="M+ 1p light" panose="020B0402020203020204" pitchFamily="50" charset="-128"/>
+                            <a:cs typeface="M+ 1p light" panose="020B0402020203020204" pitchFamily="50" charset="-128"/>
+                          </a:rPr>
+                          <m:t>−</m:t>
+                        </m:r>
+                        <m:r>
+                          <a:rPr lang="en-US" altLang="ja-JP" sz="1600" i="1">
+                            <a:latin typeface="Cambria Math" panose="02040503050406030204" pitchFamily="18" charset="0"/>
+                            <a:ea typeface="M+ 1p light" panose="020B0402020203020204" pitchFamily="50" charset="-128"/>
+                            <a:cs typeface="M+ 1p light" panose="020B0402020203020204" pitchFamily="50" charset="-128"/>
+                          </a:rPr>
+                          <m:t>𝑦</m:t>
+                        </m:r>
+                      </m:e>
+                    </m:d>
+                    <m:r>
+                      <a:rPr lang="en-US" altLang="ja-JP" sz="1600" i="1">
+                        <a:latin typeface="Cambria Math" panose="02040503050406030204" pitchFamily="18" charset="0"/>
+                        <a:ea typeface="M+ 1p light" panose="020B0402020203020204" pitchFamily="50" charset="-128"/>
+                        <a:cs typeface="M+ 1p light" panose="020B0402020203020204" pitchFamily="50" charset="-128"/>
+                      </a:rPr>
+                      <m:t>=</m:t>
+                    </m:r>
+                    <m:d>
+                      <m:dPr>
+                        <m:begChr m:val="|"/>
+                        <m:endChr m:val="|"/>
+                        <m:ctrlPr>
+                          <a:rPr lang="en-US" altLang="ja-JP" sz="1600" i="1">
+                            <a:latin typeface="Cambria Math" panose="02040503050406030204" pitchFamily="18" charset="0"/>
+                            <a:ea typeface="M+ 1p light" panose="020B0402020203020204" pitchFamily="50" charset="-128"/>
+                            <a:cs typeface="M+ 1p light" panose="020B0402020203020204" pitchFamily="50" charset="-128"/>
+                          </a:rPr>
+                        </m:ctrlPr>
+                      </m:dPr>
+                      <m:e>
+                        <m:r>
+                          <a:rPr lang="en-US" altLang="ja-JP" sz="1600" i="1">
+                            <a:latin typeface="Cambria Math" panose="02040503050406030204" pitchFamily="18" charset="0"/>
+                            <a:ea typeface="M+ 1p light" panose="020B0402020203020204" pitchFamily="50" charset="-128"/>
+                            <a:cs typeface="M+ 1p light" panose="020B0402020203020204" pitchFamily="50" charset="-128"/>
+                          </a:rPr>
+                          <m:t>𝑓</m:t>
+                        </m:r>
+                        <m:d>
+                          <m:dPr>
+                            <m:ctrlPr>
+                              <a:rPr lang="en-US" altLang="ja-JP" sz="1600" i="1">
+                                <a:latin typeface="Cambria Math" panose="02040503050406030204" pitchFamily="18" charset="0"/>
+                                <a:ea typeface="M+ 1p light" panose="020B0402020203020204" pitchFamily="50" charset="-128"/>
+                                <a:cs typeface="M+ 1p light" panose="020B0402020203020204" pitchFamily="50" charset="-128"/>
+                              </a:rPr>
+                            </m:ctrlPr>
+                          </m:dPr>
+                          <m:e>
+                            <m:r>
+                              <a:rPr lang="en-US" altLang="ja-JP" sz="1600" i="1">
+                                <a:latin typeface="Cambria Math" panose="02040503050406030204" pitchFamily="18" charset="0"/>
+                                <a:ea typeface="M+ 1p light" panose="020B0402020203020204" pitchFamily="50" charset="-128"/>
+                                <a:cs typeface="M+ 1p light" panose="020B0402020203020204" pitchFamily="50" charset="-128"/>
+                              </a:rPr>
+                              <m:t>𝑥</m:t>
+                            </m:r>
+                          </m:e>
+                        </m:d>
+                        <m:r>
+                          <a:rPr lang="en-US" altLang="ja-JP" sz="1600" i="1">
+                            <a:latin typeface="Cambria Math" panose="02040503050406030204" pitchFamily="18" charset="0"/>
+                            <a:ea typeface="M+ 1p light" panose="020B0402020203020204" pitchFamily="50" charset="-128"/>
+                            <a:cs typeface="M+ 1p light" panose="020B0402020203020204" pitchFamily="50" charset="-128"/>
+                          </a:rPr>
+                          <m:t>−</m:t>
+                        </m:r>
+                        <m:r>
+                          <a:rPr lang="en-US" altLang="ja-JP" sz="1600" i="1">
+                            <a:latin typeface="Cambria Math" panose="02040503050406030204" pitchFamily="18" charset="0"/>
+                            <a:ea typeface="M+ 1p light" panose="020B0402020203020204" pitchFamily="50" charset="-128"/>
+                            <a:cs typeface="M+ 1p light" panose="020B0402020203020204" pitchFamily="50" charset="-128"/>
+                          </a:rPr>
+                          <m:t>𝑓</m:t>
+                        </m:r>
+                        <m:d>
+                          <m:dPr>
+                            <m:ctrlPr>
+                              <a:rPr lang="en-US" altLang="ja-JP" sz="1600" i="1">
+                                <a:latin typeface="Cambria Math" panose="02040503050406030204" pitchFamily="18" charset="0"/>
+                                <a:ea typeface="M+ 1p light" panose="020B0402020203020204" pitchFamily="50" charset="-128"/>
+                                <a:cs typeface="M+ 1p light" panose="020B0402020203020204" pitchFamily="50" charset="-128"/>
+                              </a:rPr>
+                            </m:ctrlPr>
+                          </m:dPr>
+                          <m:e>
+                            <m:r>
+                              <a:rPr lang="en-US" altLang="ja-JP" sz="1600" i="1">
+                                <a:latin typeface="Cambria Math" panose="02040503050406030204" pitchFamily="18" charset="0"/>
+                                <a:ea typeface="M+ 1p light" panose="020B0402020203020204" pitchFamily="50" charset="-128"/>
+                                <a:cs typeface="M+ 1p light" panose="020B0402020203020204" pitchFamily="50" charset="-128"/>
+                              </a:rPr>
+                              <m:t>𝑦</m:t>
+                            </m:r>
+                          </m:e>
+                        </m:d>
+                      </m:e>
+                    </m:d>
+                    <m:r>
+                      <a:rPr lang="ja-JP" altLang="en-US" sz="1600" i="1" smtClean="0">
+                        <a:latin typeface="Cambria Math" panose="02040503050406030204" pitchFamily="18" charset="0"/>
+                        <a:ea typeface="M+ 1p light" panose="020B0402020203020204" pitchFamily="50" charset="-128"/>
+                        <a:cs typeface="M+ 1p light" panose="020B0402020203020204" pitchFamily="50" charset="-128"/>
+                      </a:rPr>
+                      <m:t>を</m:t>
+                    </m:r>
+                  </m:oMath>
+                </a14:m>
+                <a:r>
+                  <a:rPr lang="ja-JP" altLang="en-US" sz="1600" dirty="0">
+                    <a:latin typeface="M+ 1p light" panose="020B0402020203020204" pitchFamily="50" charset="-128"/>
+                    <a:ea typeface="M+ 1p light" panose="020B0402020203020204" pitchFamily="50" charset="-128"/>
+                    <a:cs typeface="M+ 1p light" panose="020B0402020203020204" pitchFamily="50" charset="-128"/>
+                  </a:rPr>
+                  <a:t>示す</a:t>
+                </a:r>
+                <a:r>
+                  <a:rPr lang="en-US" altLang="ja-JP" sz="1600" dirty="0">
+                    <a:latin typeface="M+ 1p light" panose="020B0402020203020204" pitchFamily="50" charset="-128"/>
+                    <a:ea typeface="M+ 1p light" panose="020B0402020203020204" pitchFamily="50" charset="-128"/>
+                    <a:cs typeface="M+ 1p light" panose="020B0402020203020204" pitchFamily="50" charset="-128"/>
+                  </a:rPr>
+                  <a:t>. (</a:t>
+                </a:r>
+                <a:r>
+                  <a:rPr lang="ja-JP" altLang="en-US" sz="1600" dirty="0">
+                    <a:latin typeface="M+ 1p light" panose="020B0402020203020204" pitchFamily="50" charset="-128"/>
+                    <a:ea typeface="M+ 1p light" panose="020B0402020203020204" pitchFamily="50" charset="-128"/>
+                    <a:cs typeface="M+ 1p light" panose="020B0402020203020204" pitchFamily="50" charset="-128"/>
+                  </a:rPr>
+                  <a:t>ユークリッド変換群</a:t>
+                </a:r>
+                <a:r>
+                  <a:rPr lang="en-US" altLang="ja-JP" sz="1600" dirty="0">
+                    <a:latin typeface="M+ 1p light" panose="020B0402020203020204" pitchFamily="50" charset="-128"/>
+                    <a:ea typeface="M+ 1p light" panose="020B0402020203020204" pitchFamily="50" charset="-128"/>
+                    <a:cs typeface="M+ 1p light" panose="020B0402020203020204" pitchFamily="50" charset="-128"/>
+                  </a:rPr>
+                  <a:t>)</a:t>
+                </a:r>
+              </a:p>
+            </p:txBody>
+          </p:sp>
+        </mc:Choice>
+        <mc:Fallback>
+          <p:sp>
+            <p:nvSpPr>
+              <p:cNvPr id="61" name="Google Shape;61;p14"/>
+              <p:cNvSpPr txBox="1">
+                <a:spLocks noGrp="1" noRot="1" noChangeAspect="1" noMove="1" noResize="1" noEditPoints="1" noAdjustHandles="1" noChangeArrowheads="1" noChangeShapeType="1" noTextEdit="1"/>
+              </p:cNvSpPr>
+              <p:nvPr>
+                <p:ph type="body" idx="1"/>
+              </p:nvPr>
+            </p:nvSpPr>
+            <p:spPr>
+              <a:xfrm>
+                <a:off x="311700" y="1152475"/>
+                <a:ext cx="8520600" cy="3416400"/>
+              </a:xfrm>
+              <a:prstGeom prst="rect">
+                <a:avLst/>
+              </a:prstGeom>
+              <a:blipFill>
+                <a:blip r:embed="rId4"/>
+                <a:stretch>
+                  <a:fillRect l="-572"/>
+                </a:stretch>
+              </a:blipFill>
+            </p:spPr>
+            <p:txBody>
+              <a:bodyPr/>
+              <a:lstStyle/>
+              <a:p>
+                <a:r>
+                  <a:rPr lang="ja-JP" altLang="en-US">
+                    <a:noFill/>
+                  </a:rPr>
+                  <a:t> </a:t>
+                </a:r>
+              </a:p>
+            </p:txBody>
+          </p:sp>
+        </mc:Fallback>
+      </mc:AlternateContent>
+      <p:sp>
+        <p:nvSpPr>
+          <p:cNvPr id="62" name="Google Shape;62;p14"/>
+          <p:cNvSpPr txBox="1">
+            <a:spLocks noGrp="1"/>
+          </p:cNvSpPr>
+          <p:nvPr>
+            <p:ph type="title"/>
+          </p:nvPr>
+        </p:nvSpPr>
+        <p:spPr>
+          <a:xfrm>
+            <a:off x="6916625" y="45750"/>
+            <a:ext cx="2144400" cy="347700"/>
+          </a:xfrm>
+          <a:prstGeom prst="rect">
+            <a:avLst/>
+          </a:prstGeom>
+        </p:spPr>
+        <p:txBody>
+          <a:bodyPr spcFirstLastPara="1" wrap="square" lIns="91425" tIns="91425" rIns="91425" bIns="91425" anchor="t" anchorCtr="0">
+            <a:noAutofit/>
+          </a:bodyPr>
+          <a:lstStyle/>
+          <a:p>
+            <a:pPr marL="0" lvl="0" indent="0" algn="ctr" rtl="0">
+              <a:spcBef>
+                <a:spcPts val="0"/>
+              </a:spcBef>
+              <a:spcAft>
+                <a:spcPts val="0"/>
+              </a:spcAft>
+              <a:buNone/>
+            </a:pPr>
+            <a:r>
+              <a:rPr lang="ja-JP" altLang="en-US" sz="1400" dirty="0">
+                <a:solidFill>
+                  <a:schemeClr val="bg1">
+                    <a:lumMod val="50000"/>
+                  </a:schemeClr>
+                </a:solidFill>
+                <a:latin typeface="M+ 1p light" panose="020B0402020203020204" pitchFamily="50" charset="-128"/>
+                <a:ea typeface="M+ 1p light" panose="020B0402020203020204" pitchFamily="50" charset="-128"/>
+                <a:cs typeface="M+ 1p light" panose="020B0402020203020204" pitchFamily="50" charset="-128"/>
+              </a:rPr>
+              <a:t>復習</a:t>
+            </a:r>
+            <a:r>
+              <a:rPr lang="en-US" altLang="ja-JP" sz="1400" dirty="0">
+                <a:solidFill>
+                  <a:schemeClr val="bg1">
+                    <a:lumMod val="50000"/>
+                  </a:schemeClr>
+                </a:solidFill>
+                <a:latin typeface="M+ 1p light" panose="020B0402020203020204" pitchFamily="50" charset="-128"/>
+                <a:ea typeface="M+ 1p light" panose="020B0402020203020204" pitchFamily="50" charset="-128"/>
+                <a:cs typeface="M+ 1p light" panose="020B0402020203020204" pitchFamily="50" charset="-128"/>
+              </a:rPr>
+              <a:t>: </a:t>
+            </a:r>
+            <a:r>
+              <a:rPr lang="ja-JP" altLang="en-US" sz="1400" dirty="0">
+                <a:solidFill>
+                  <a:schemeClr val="bg1">
+                    <a:lumMod val="50000"/>
+                  </a:schemeClr>
+                </a:solidFill>
+                <a:latin typeface="M+ 1p light" panose="020B0402020203020204" pitchFamily="50" charset="-128"/>
+                <a:ea typeface="M+ 1p light" panose="020B0402020203020204" pitchFamily="50" charset="-128"/>
+                <a:cs typeface="M+ 1p light" panose="020B0402020203020204" pitchFamily="50" charset="-128"/>
+              </a:rPr>
+              <a:t>ユークリッド幾何</a:t>
+            </a:r>
+            <a:endParaRPr sz="1400" dirty="0">
+              <a:solidFill>
+                <a:schemeClr val="bg1">
+                  <a:lumMod val="50000"/>
+                </a:schemeClr>
+              </a:solidFill>
+              <a:latin typeface="M+ 1p light" panose="020B0402020203020204" pitchFamily="50" charset="-128"/>
+              <a:ea typeface="M+ 1p light" panose="020B0402020203020204" pitchFamily="50" charset="-128"/>
+              <a:cs typeface="M+ 1p light" panose="020B0402020203020204" pitchFamily="50" charset="-128"/>
+            </a:endParaRPr>
+          </a:p>
+        </p:txBody>
+      </p:sp>
+    </p:spTree>
+    <p:extLst>
+      <p:ext uri="{BB962C8B-B14F-4D97-AF65-F5344CB8AC3E}">
+        <p14:creationId xmlns:p14="http://schemas.microsoft.com/office/powerpoint/2010/main" val="1742142012"/>
+      </p:ext>
+    </p:extLst>
+  </p:cSld>
+  <p:clrMapOvr>
+    <a:masterClrMapping/>
+  </p:clrMapOvr>
+  <p:timing>
+    <p:tnLst>
+      <p:par>
+        <p:cTn id="1" dur="indefinite" restart="never" nodeType="tmRoot">
+          <p:childTnLst>
+            <p:seq concurrent="1" nextAc="seek">
+              <p:cTn id="2" dur="indefinite" nodeType="mainSeq">
+                <p:childTnLst>
+                  <p:par>
+                    <p:cTn id="3" fill="hold">
+                      <p:stCondLst>
+                        <p:cond delay="indefinite"/>
+                      </p:stCondLst>
+                      <p:childTnLst>
+                        <p:par>
+                          <p:cTn id="4" fill="hold">
+                            <p:stCondLst>
+                              <p:cond delay="0"/>
+                            </p:stCondLst>
+                            <p:childTnLst>
+                              <p:par>
+                                <p:cTn id="5" presetID="22" presetClass="entr" presetSubtype="4" fill="hold" nodeType="clickEffect">
+                                  <p:stCondLst>
+                                    <p:cond delay="0"/>
+                                  </p:stCondLst>
+                                  <p:childTnLst>
+                                    <p:set>
+                                      <p:cBhvr>
+                                        <p:cTn id="6" dur="1" fill="hold">
+                                          <p:stCondLst>
+                                            <p:cond delay="0"/>
+                                          </p:stCondLst>
+                                        </p:cTn>
+                                        <p:tgtEl>
+                                          <p:spTgt spid="61">
+                                            <p:txEl>
+                                              <p:pRg st="4" end="4"/>
+                                            </p:txEl>
+                                          </p:spTgt>
+                                        </p:tgtEl>
+                                        <p:attrNameLst>
+                                          <p:attrName>style.visibility</p:attrName>
+                                        </p:attrNameLst>
+                                      </p:cBhvr>
+                                      <p:to>
+                                        <p:strVal val="visible"/>
+                                      </p:to>
+                                    </p:set>
+                                    <p:animEffect transition="in" filter="wipe(down)">
+                                      <p:cBhvr>
+                                        <p:cTn id="7" dur="500"/>
+                                        <p:tgtEl>
+                                          <p:spTgt spid="61">
+                                            <p:txEl>
+                                              <p:pRg st="4" end="4"/>
+                                            </p:txEl>
+                                          </p:spTgt>
+                                        </p:tgtEl>
+                                      </p:cBhvr>
+                                    </p:animEffect>
+                                  </p:childTnLst>
+                                </p:cTn>
+                              </p:par>
+                            </p:childTnLst>
+                          </p:cTn>
+                        </p:par>
+                      </p:childTnLst>
+                    </p:cTn>
+                  </p:par>
+                  <p:par>
+                    <p:cTn id="8" fill="hold">
+                      <p:stCondLst>
+                        <p:cond delay="indefinite"/>
+                      </p:stCondLst>
+                      <p:childTnLst>
+                        <p:par>
+                          <p:cTn id="9" fill="hold">
+                            <p:stCondLst>
+                              <p:cond delay="0"/>
+                            </p:stCondLst>
+                            <p:childTnLst>
+                              <p:par>
+                                <p:cTn id="10" presetID="22" presetClass="entr" presetSubtype="4" fill="hold" nodeType="clickEffect">
+                                  <p:stCondLst>
+                                    <p:cond delay="0"/>
+                                  </p:stCondLst>
+                                  <p:childTnLst>
+                                    <p:set>
+                                      <p:cBhvr>
+                                        <p:cTn id="11" dur="1" fill="hold">
+                                          <p:stCondLst>
+                                            <p:cond delay="0"/>
+                                          </p:stCondLst>
+                                        </p:cTn>
+                                        <p:tgtEl>
+                                          <p:spTgt spid="61">
+                                            <p:txEl>
+                                              <p:pRg st="8" end="8"/>
+                                            </p:txEl>
+                                          </p:spTgt>
+                                        </p:tgtEl>
+                                        <p:attrNameLst>
+                                          <p:attrName>style.visibility</p:attrName>
+                                        </p:attrNameLst>
+                                      </p:cBhvr>
+                                      <p:to>
+                                        <p:strVal val="visible"/>
+                                      </p:to>
+                                    </p:set>
+                                    <p:animEffect transition="in" filter="wipe(down)">
+                                      <p:cBhvr>
+                                        <p:cTn id="12" dur="500"/>
+                                        <p:tgtEl>
+                                          <p:spTgt spid="61">
+                                            <p:txEl>
+                                              <p:pRg st="8" end="8"/>
+                                            </p:txEl>
+                                          </p:spTgt>
+                                        </p:tgtEl>
+                                      </p:cBhvr>
+                                    </p:animEffect>
+                                  </p:childTnLst>
+                                </p:cTn>
+                              </p:par>
+                            </p:childTnLst>
+                          </p:cTn>
+                        </p:par>
+                      </p:childTnLst>
+                    </p:cTn>
+                  </p:par>
+                </p:childTnLst>
+              </p:cTn>
+              <p:prevCondLst>
+                <p:cond evt="onPrev" delay="0">
+                  <p:tgtEl>
+                    <p:sldTgt/>
+                  </p:tgtEl>
+                </p:cond>
+              </p:prevCondLst>
+              <p:nextCondLst>
+                <p:cond evt="onNext" delay="0">
+                  <p:tgtEl>
+                    <p:sldTgt/>
+                  </p:tgtEl>
+                </p:cond>
+              </p:nextCondLst>
+            </p:seq>
+          </p:childTnLst>
+        </p:cTn>
+      </p:par>
+    </p:tnLst>
+  </p:timing>
+</p:sld>
+</file>
+
+<file path=ppt/slides/slide11.xml><?xml version="1.0" encoding="utf-8"?>
+<p:sld xmlns:a="http://schemas.openxmlformats.org/drawingml/2006/main" xmlns:r="http://schemas.openxmlformats.org/officeDocument/2006/relationships" xmlns:p="http://schemas.openxmlformats.org/presentationml/2006/main">
+  <p:cSld>
+    <p:spTree>
+      <p:nvGrpSpPr>
+        <p:cNvPr id="1" name="Shape 59"/>
+        <p:cNvGrpSpPr/>
+        <p:nvPr/>
+      </p:nvGrpSpPr>
+      <p:grpSpPr>
+        <a:xfrm>
+          <a:off x="0" y="0"/>
+          <a:ext cx="0" cy="0"/>
+          <a:chOff x="0" y="0"/>
+          <a:chExt cx="0" cy="0"/>
+        </a:xfrm>
+      </p:grpSpPr>
+      <p:sp>
+        <p:nvSpPr>
+          <p:cNvPr id="10" name="二等辺三角形 9">
+            <a:extLst>
+              <a:ext uri="{FF2B5EF4-FFF2-40B4-BE49-F238E27FC236}">
+                <a16:creationId xmlns:a16="http://schemas.microsoft.com/office/drawing/2014/main" id="{5DBF3215-13AD-4FE7-AE3B-208FB74012AE}"/>
+              </a:ext>
+            </a:extLst>
+          </p:cNvPr>
+          <p:cNvSpPr/>
+          <p:nvPr/>
+        </p:nvSpPr>
+        <p:spPr>
+          <a:xfrm rot="16200000">
+            <a:off x="4285650" y="-4285650"/>
+            <a:ext cx="572701" cy="9144002"/>
+          </a:xfrm>
+          <a:prstGeom prst="triangle">
+            <a:avLst>
+              <a:gd name="adj" fmla="val 100000"/>
+            </a:avLst>
+          </a:prstGeom>
+          <a:solidFill>
+            <a:srgbClr val="FFF4E7">
+              <a:alpha val="80000"/>
+            </a:srgbClr>
+          </a:solidFill>
+          <a:ln>
+            <a:noFill/>
+          </a:ln>
+        </p:spPr>
+        <p:style>
+          <a:lnRef idx="2">
+            <a:schemeClr val="accent1">
+              <a:shade val="50000"/>
+            </a:schemeClr>
+          </a:lnRef>
+          <a:fillRef idx="1">
+            <a:schemeClr val="accent1"/>
+          </a:fillRef>
+          <a:effectRef idx="0">
+            <a:schemeClr val="accent1"/>
+          </a:effectRef>
+          <a:fontRef idx="minor">
+            <a:schemeClr val="lt1"/>
+          </a:fontRef>
+        </p:style>
+        <p:txBody>
+          <a:bodyPr rtlCol="0" anchor="ctr"/>
+          <a:lstStyle/>
+          <a:p>
+            <a:pPr algn="ctr"/>
+            <a:endParaRPr kumimoji="1" lang="ja-JP" altLang="en-US" dirty="0"/>
+          </a:p>
+        </p:txBody>
+      </p:sp>
+      <p:sp>
+        <p:nvSpPr>
+          <p:cNvPr id="11" name="正方形/長方形 10">
+            <a:extLst>
+              <a:ext uri="{FF2B5EF4-FFF2-40B4-BE49-F238E27FC236}">
+                <a16:creationId xmlns:a16="http://schemas.microsoft.com/office/drawing/2014/main" id="{FBC25266-4EBA-4EB8-A354-624A1F8420E4}"/>
+              </a:ext>
+            </a:extLst>
+          </p:cNvPr>
+          <p:cNvSpPr/>
+          <p:nvPr/>
+        </p:nvSpPr>
+        <p:spPr>
+          <a:xfrm>
+            <a:off x="1" y="4568873"/>
+            <a:ext cx="9143999" cy="572702"/>
+          </a:xfrm>
+          <a:prstGeom prst="rect">
+            <a:avLst/>
+          </a:prstGeom>
+          <a:solidFill>
+            <a:srgbClr val="FFF5EB"/>
+          </a:solidFill>
+          <a:ln>
+            <a:noFill/>
+          </a:ln>
+        </p:spPr>
+        <p:style>
+          <a:lnRef idx="2">
+            <a:schemeClr val="accent1">
+              <a:shade val="50000"/>
+            </a:schemeClr>
+          </a:lnRef>
+          <a:fillRef idx="1">
+            <a:schemeClr val="accent1"/>
+          </a:fillRef>
+          <a:effectRef idx="0">
+            <a:schemeClr val="accent1"/>
+          </a:effectRef>
+          <a:fontRef idx="minor">
+            <a:schemeClr val="lt1"/>
+          </a:fontRef>
+        </p:style>
+        <p:txBody>
+          <a:bodyPr rtlCol="0" anchor="ctr"/>
+          <a:lstStyle/>
+          <a:p>
+            <a:pPr algn="ctr"/>
+            <a:endParaRPr kumimoji="1" lang="ja-JP" altLang="en-US" dirty="0"/>
+          </a:p>
+        </p:txBody>
+      </p:sp>
+      <p:pic>
+        <p:nvPicPr>
+          <p:cNvPr id="1026" name="Picture 2" descr="ããã¯ãã±å ä¸»äººå+¬ãã®ç»åæ¤ç´¢çµæ">
+            <a:extLst>
+              <a:ext uri="{FF2B5EF4-FFF2-40B4-BE49-F238E27FC236}">
+                <a16:creationId xmlns:a16="http://schemas.microsoft.com/office/drawing/2014/main" id="{B3348C27-15A3-454B-B667-BA5AAADA1B42}"/>
+              </a:ext>
+            </a:extLst>
+          </p:cNvPr>
+          <p:cNvPicPr>
+            <a:picLocks noChangeAspect="1" noChangeArrowheads="1"/>
+          </p:cNvPicPr>
+          <p:nvPr/>
+        </p:nvPicPr>
+        <p:blipFill>
+          <a:blip r:embed="rId3">
+            <a:alphaModFix amt="50000"/>
+            <a:extLst>
+              <a:ext uri="{28A0092B-C50C-407E-A947-70E740481C1C}">
+                <a14:useLocalDpi xmlns:a14="http://schemas.microsoft.com/office/drawing/2010/main" val="0"/>
+              </a:ext>
+            </a:extLst>
+          </a:blip>
+          <a:srcRect/>
+          <a:stretch>
+            <a:fillRect/>
+          </a:stretch>
+        </p:blipFill>
+        <p:spPr bwMode="auto">
+          <a:xfrm>
+            <a:off x="133738" y="4577558"/>
+            <a:ext cx="555332" cy="555332"/>
+          </a:xfrm>
+          <a:prstGeom prst="rect">
+            <a:avLst/>
+          </a:prstGeom>
+          <a:noFill/>
+          <a:extLst>
+            <a:ext uri="{909E8E84-426E-40DD-AFC4-6F175D3DCCD1}">
+              <a14:hiddenFill xmlns:a14="http://schemas.microsoft.com/office/drawing/2010/main">
+                <a:solidFill>
+                  <a:srgbClr val="FFFFFF"/>
+                </a:solidFill>
+              </a14:hiddenFill>
+            </a:ext>
+          </a:extLst>
+        </p:spPr>
+      </p:pic>
+      <p:sp>
+        <p:nvSpPr>
+          <p:cNvPr id="4" name="吹き出し: 四角形 3">
+            <a:extLst>
+              <a:ext uri="{FF2B5EF4-FFF2-40B4-BE49-F238E27FC236}">
+                <a16:creationId xmlns:a16="http://schemas.microsoft.com/office/drawing/2014/main" id="{9E66183E-78B4-4767-A511-09039646B1AC}"/>
+              </a:ext>
+            </a:extLst>
+          </p:cNvPr>
+          <p:cNvSpPr/>
+          <p:nvPr/>
+        </p:nvSpPr>
+        <p:spPr>
+          <a:xfrm>
+            <a:off x="822807" y="4612297"/>
+            <a:ext cx="7596515" cy="491547"/>
+          </a:xfrm>
+          <a:prstGeom prst="wedgeRectCallout">
+            <a:avLst>
+              <a:gd name="adj1" fmla="val -51006"/>
+              <a:gd name="adj2" fmla="val 20927"/>
+            </a:avLst>
+          </a:prstGeom>
+          <a:solidFill>
+            <a:srgbClr val="EEEEEE">
+              <a:alpha val="50196"/>
+            </a:srgbClr>
+          </a:solidFill>
+          <a:ln w="6350">
+            <a:solidFill>
+              <a:schemeClr val="bg1">
+                <a:lumMod val="75000"/>
+              </a:schemeClr>
+            </a:solidFill>
+          </a:ln>
+        </p:spPr>
+        <p:style>
+          <a:lnRef idx="2">
+            <a:schemeClr val="accent1">
+              <a:shade val="50000"/>
+            </a:schemeClr>
+          </a:lnRef>
+          <a:fillRef idx="1">
+            <a:schemeClr val="accent1"/>
+          </a:fillRef>
+          <a:effectRef idx="0">
+            <a:schemeClr val="accent1"/>
+          </a:effectRef>
+          <a:fontRef idx="minor">
+            <a:schemeClr val="lt1"/>
+          </a:fontRef>
+        </p:style>
+        <p:txBody>
+          <a:bodyPr rtlCol="0" anchor="ctr"/>
+          <a:lstStyle/>
+          <a:p>
+            <a:pPr algn="ctr"/>
+            <a:r>
+              <a:rPr kumimoji="1" lang="ja-JP" altLang="en-US" dirty="0">
+                <a:solidFill>
+                  <a:schemeClr val="bg1">
+                    <a:lumMod val="50000"/>
+                  </a:schemeClr>
+                </a:solidFill>
+                <a:latin typeface="M+ 1p light" panose="020B0402020203020204" pitchFamily="50" charset="-128"/>
+                <a:ea typeface="M+ 1p light" panose="020B0402020203020204" pitchFamily="50" charset="-128"/>
+                <a:cs typeface="M+ 1p light" panose="020B0402020203020204" pitchFamily="50" charset="-128"/>
+              </a:rPr>
+              <a:t>距離は</a:t>
+            </a:r>
+            <a:r>
+              <a:rPr kumimoji="1" lang="en-US" altLang="ja-JP" dirty="0">
+                <a:solidFill>
+                  <a:schemeClr val="bg1">
+                    <a:lumMod val="50000"/>
+                  </a:schemeClr>
+                </a:solidFill>
+                <a:latin typeface="M+ 1p light" panose="020B0402020203020204" pitchFamily="50" charset="-128"/>
+                <a:ea typeface="M+ 1p light" panose="020B0402020203020204" pitchFamily="50" charset="-128"/>
+                <a:cs typeface="M+ 1p light" panose="020B0402020203020204" pitchFamily="50" charset="-128"/>
+              </a:rPr>
+              <a:t>4</a:t>
+            </a:r>
+            <a:r>
+              <a:rPr kumimoji="1" lang="ja-JP" altLang="en-US" dirty="0">
+                <a:solidFill>
+                  <a:schemeClr val="bg1">
+                    <a:lumMod val="50000"/>
+                  </a:schemeClr>
+                </a:solidFill>
+                <a:latin typeface="M+ 1p light" panose="020B0402020203020204" pitchFamily="50" charset="-128"/>
+                <a:ea typeface="M+ 1p light" panose="020B0402020203020204" pitchFamily="50" charset="-128"/>
+                <a:cs typeface="M+ 1p light" panose="020B0402020203020204" pitchFamily="50" charset="-128"/>
+              </a:rPr>
+              <a:t>つの公理さえ満たせば全部距離になる</a:t>
+            </a:r>
+            <a:r>
+              <a:rPr kumimoji="1" lang="en-US" altLang="ja-JP" dirty="0">
+                <a:solidFill>
+                  <a:schemeClr val="bg1">
+                    <a:lumMod val="50000"/>
+                  </a:schemeClr>
+                </a:solidFill>
+                <a:latin typeface="M+ 1p light" panose="020B0402020203020204" pitchFamily="50" charset="-128"/>
+                <a:ea typeface="M+ 1p light" panose="020B0402020203020204" pitchFamily="50" charset="-128"/>
+                <a:cs typeface="M+ 1p light" panose="020B0402020203020204" pitchFamily="50" charset="-128"/>
+              </a:rPr>
+              <a:t>.</a:t>
+            </a:r>
+          </a:p>
+          <a:p>
+            <a:pPr algn="ctr"/>
+            <a:r>
+              <a:rPr kumimoji="1" lang="ja-JP" altLang="en-US" dirty="0">
+                <a:solidFill>
+                  <a:schemeClr val="bg1">
+                    <a:lumMod val="50000"/>
+                  </a:schemeClr>
+                </a:solidFill>
+                <a:latin typeface="M+ 1p light" panose="020B0402020203020204" pitchFamily="50" charset="-128"/>
+                <a:ea typeface="M+ 1p light" panose="020B0402020203020204" pitchFamily="50" charset="-128"/>
+                <a:cs typeface="M+ 1p light" panose="020B0402020203020204" pitchFamily="50" charset="-128"/>
+              </a:rPr>
+              <a:t>ユークリッド以外には</a:t>
+            </a:r>
+            <a:r>
+              <a:rPr kumimoji="1" lang="en-US" altLang="ja-JP" dirty="0">
+                <a:solidFill>
+                  <a:schemeClr val="bg1">
+                    <a:lumMod val="50000"/>
+                  </a:schemeClr>
+                </a:solidFill>
+                <a:latin typeface="M+ 1p light" panose="020B0402020203020204" pitchFamily="50" charset="-128"/>
+                <a:ea typeface="M+ 1p light" panose="020B0402020203020204" pitchFamily="50" charset="-128"/>
+                <a:cs typeface="M+ 1p light" panose="020B0402020203020204" pitchFamily="50" charset="-128"/>
+              </a:rPr>
+              <a:t>, </a:t>
+            </a:r>
+            <a:r>
+              <a:rPr kumimoji="1" lang="ja-JP" altLang="en-US" dirty="0">
+                <a:solidFill>
+                  <a:schemeClr val="bg1">
+                    <a:lumMod val="50000"/>
+                  </a:schemeClr>
+                </a:solidFill>
+                <a:latin typeface="M+ 1p light" panose="020B0402020203020204" pitchFamily="50" charset="-128"/>
+                <a:ea typeface="M+ 1p light" panose="020B0402020203020204" pitchFamily="50" charset="-128"/>
+                <a:cs typeface="M+ 1p light" panose="020B0402020203020204" pitchFamily="50" charset="-128"/>
+              </a:rPr>
+              <a:t>マンハッタン距離</a:t>
+            </a:r>
+            <a:r>
+              <a:rPr kumimoji="1" lang="en-US" altLang="ja-JP" dirty="0">
+                <a:solidFill>
+                  <a:schemeClr val="bg1">
+                    <a:lumMod val="50000"/>
+                  </a:schemeClr>
+                </a:solidFill>
+                <a:latin typeface="M+ 1p light" panose="020B0402020203020204" pitchFamily="50" charset="-128"/>
+                <a:ea typeface="M+ 1p light" panose="020B0402020203020204" pitchFamily="50" charset="-128"/>
+                <a:cs typeface="M+ 1p light" panose="020B0402020203020204" pitchFamily="50" charset="-128"/>
+              </a:rPr>
+              <a:t>, </a:t>
+            </a:r>
+            <a:r>
+              <a:rPr kumimoji="1" lang="ja-JP" altLang="en-US" dirty="0">
+                <a:solidFill>
+                  <a:schemeClr val="bg1">
+                    <a:lumMod val="50000"/>
+                  </a:schemeClr>
+                </a:solidFill>
+                <a:latin typeface="M+ 1p light" panose="020B0402020203020204" pitchFamily="50" charset="-128"/>
+                <a:ea typeface="M+ 1p light" panose="020B0402020203020204" pitchFamily="50" charset="-128"/>
+                <a:cs typeface="M+ 1p light" panose="020B0402020203020204" pitchFamily="50" charset="-128"/>
+              </a:rPr>
+              <a:t>マハラノビス距離とか</a:t>
+            </a:r>
+            <a:endParaRPr kumimoji="1" lang="en-US" altLang="ja-JP" dirty="0">
+              <a:solidFill>
+                <a:schemeClr val="bg1">
+                  <a:lumMod val="50000"/>
+                </a:schemeClr>
+              </a:solidFill>
+              <a:latin typeface="M+ 1p light" panose="020B0402020203020204" pitchFamily="50" charset="-128"/>
+              <a:ea typeface="M+ 1p light" panose="020B0402020203020204" pitchFamily="50" charset="-128"/>
+              <a:cs typeface="M+ 1p light" panose="020B0402020203020204" pitchFamily="50" charset="-128"/>
+            </a:endParaRPr>
+          </a:p>
+        </p:txBody>
+      </p:sp>
+      <p:sp>
+        <p:nvSpPr>
+          <p:cNvPr id="60" name="Google Shape;60;p14"/>
+          <p:cNvSpPr txBox="1">
+            <a:spLocks noGrp="1"/>
+          </p:cNvSpPr>
+          <p:nvPr>
+            <p:ph type="title"/>
+          </p:nvPr>
+        </p:nvSpPr>
+        <p:spPr>
+          <a:xfrm>
+            <a:off x="311700" y="445025"/>
+            <a:ext cx="8520600" cy="572700"/>
+          </a:xfrm>
+          <a:prstGeom prst="rect">
+            <a:avLst/>
+          </a:prstGeom>
+        </p:spPr>
+        <p:txBody>
+          <a:bodyPr spcFirstLastPara="1" wrap="square" lIns="91425" tIns="91425" rIns="91425" bIns="91425" anchor="t" anchorCtr="0">
+            <a:noAutofit/>
+          </a:bodyPr>
+          <a:lstStyle/>
+          <a:p>
+            <a:pPr lvl="0"/>
+            <a:r>
+              <a:rPr lang="ja-JP" altLang="en-US" dirty="0">
+                <a:solidFill>
+                  <a:schemeClr val="tx1">
+                    <a:lumMod val="75000"/>
+                    <a:lumOff val="25000"/>
+                  </a:schemeClr>
+                </a:solidFill>
+                <a:latin typeface="M+ 1p" panose="020B0503020203020204" pitchFamily="50" charset="-128"/>
+                <a:ea typeface="M+ 1p" panose="020B0503020203020204" pitchFamily="50" charset="-128"/>
+                <a:cs typeface="M+ 1p" panose="020B0503020203020204" pitchFamily="50" charset="-128"/>
+              </a:rPr>
+              <a:t>ユークリッド変換は推移的である</a:t>
+            </a:r>
+            <a:endParaRPr dirty="0">
+              <a:solidFill>
+                <a:schemeClr val="tx1">
+                  <a:lumMod val="75000"/>
+                  <a:lumOff val="25000"/>
+                </a:schemeClr>
+              </a:solidFill>
+              <a:latin typeface="M+ 1p" panose="020B0503020203020204" pitchFamily="50" charset="-128"/>
+              <a:ea typeface="M+ 1p" panose="020B0503020203020204" pitchFamily="50" charset="-128"/>
+              <a:cs typeface="M+ 1p" panose="020B0503020203020204" pitchFamily="50" charset="-128"/>
+            </a:endParaRPr>
+          </a:p>
+        </p:txBody>
+      </p:sp>
+      <mc:AlternateContent xmlns:mc="http://schemas.openxmlformats.org/markup-compatibility/2006">
+        <mc:Choice xmlns:a14="http://schemas.microsoft.com/office/drawing/2010/main" Requires="a14">
+          <p:sp>
+            <p:nvSpPr>
+              <p:cNvPr id="61" name="Google Shape;61;p14"/>
+              <p:cNvSpPr txBox="1">
+                <a:spLocks noGrp="1"/>
+              </p:cNvSpPr>
+              <p:nvPr>
+                <p:ph type="body" idx="1"/>
+              </p:nvPr>
+            </p:nvSpPr>
+            <p:spPr>
+              <a:xfrm>
+                <a:off x="311700" y="1152475"/>
+                <a:ext cx="8520600" cy="3416400"/>
+              </a:xfrm>
+              <a:prstGeom prst="rect">
+                <a:avLst/>
+              </a:prstGeom>
+            </p:spPr>
+            <p:txBody>
+              <a:bodyPr spcFirstLastPara="1" wrap="square" lIns="91425" tIns="91425" rIns="91425" bIns="91425" anchor="t" anchorCtr="0">
+                <a:noAutofit/>
+              </a:bodyPr>
+              <a:lstStyle/>
+              <a:p>
+                <a:pPr marL="0" lvl="0" indent="0">
+                  <a:buNone/>
+                </a:pPr>
+                <a:r>
+                  <a:rPr lang="en-US" altLang="ja-JP" dirty="0">
+                    <a:latin typeface="M+ 1p light" panose="020B0402020203020204" pitchFamily="50" charset="-128"/>
+                    <a:ea typeface="M+ 1p light" panose="020B0402020203020204" pitchFamily="50" charset="-128"/>
+                    <a:cs typeface="M+ 1p light" panose="020B0402020203020204" pitchFamily="50" charset="-128"/>
+                  </a:rPr>
+                  <a:t>Q. </a:t>
+                </a:r>
+                <a:r>
+                  <a:rPr lang="ja-JP" altLang="en-US" dirty="0">
+                    <a:latin typeface="M+ 1p light" panose="020B0402020203020204" pitchFamily="50" charset="-128"/>
+                    <a:ea typeface="M+ 1p light" panose="020B0402020203020204" pitchFamily="50" charset="-128"/>
+                    <a:cs typeface="M+ 1p light" panose="020B0402020203020204" pitchFamily="50" charset="-128"/>
+                  </a:rPr>
+                  <a:t>推移的とは</a:t>
+                </a:r>
+                <a:r>
+                  <a:rPr lang="en-US" altLang="ja-JP" dirty="0">
+                    <a:latin typeface="M+ 1p light" panose="020B0402020203020204" pitchFamily="50" charset="-128"/>
+                    <a:ea typeface="M+ 1p light" panose="020B0402020203020204" pitchFamily="50" charset="-128"/>
+                    <a:cs typeface="M+ 1p light" panose="020B0402020203020204" pitchFamily="50" charset="-128"/>
+                  </a:rPr>
+                  <a:t>, </a:t>
+                </a:r>
+                <a:r>
+                  <a:rPr lang="ja-JP" altLang="en-US" dirty="0">
+                    <a:latin typeface="M+ 1p light" panose="020B0402020203020204" pitchFamily="50" charset="-128"/>
+                    <a:ea typeface="M+ 1p light" panose="020B0402020203020204" pitchFamily="50" charset="-128"/>
+                    <a:cs typeface="M+ 1p light" panose="020B0402020203020204" pitchFamily="50" charset="-128"/>
+                  </a:rPr>
+                  <a:t>集合</a:t>
+                </a:r>
+                <a14:m>
+                  <m:oMath xmlns:m="http://schemas.openxmlformats.org/officeDocument/2006/math">
+                    <m:r>
+                      <a:rPr lang="en-US" altLang="ja-JP" b="0" i="1" smtClean="0">
+                        <a:latin typeface="Cambria Math" panose="02040503050406030204" pitchFamily="18" charset="0"/>
+                        <a:ea typeface="M+ 1p light" panose="020B0402020203020204" pitchFamily="50" charset="-128"/>
+                        <a:cs typeface="M+ 1p light" panose="020B0402020203020204" pitchFamily="50" charset="-128"/>
+                      </a:rPr>
+                      <m:t>𝑋</m:t>
+                    </m:r>
+                    <m:r>
+                      <a:rPr lang="ja-JP" altLang="en-US" i="1">
+                        <a:latin typeface="Cambria Math" panose="02040503050406030204" pitchFamily="18" charset="0"/>
+                        <a:ea typeface="M+ 1p light" panose="020B0402020203020204" pitchFamily="50" charset="-128"/>
+                        <a:cs typeface="M+ 1p light" panose="020B0402020203020204" pitchFamily="50" charset="-128"/>
+                      </a:rPr>
+                      <m:t>に</m:t>
+                    </m:r>
+                    <m:r>
+                      <a:rPr lang="ja-JP" altLang="en-US" i="1" smtClean="0">
+                        <a:latin typeface="Cambria Math" panose="02040503050406030204" pitchFamily="18" charset="0"/>
+                        <a:ea typeface="M+ 1p light" panose="020B0402020203020204" pitchFamily="50" charset="-128"/>
+                        <a:cs typeface="M+ 1p light" panose="020B0402020203020204" pitchFamily="50" charset="-128"/>
+                      </a:rPr>
+                      <m:t>対し</m:t>
+                    </m:r>
+                    <m:r>
+                      <a:rPr lang="en-US" altLang="ja-JP" b="0" i="1" smtClean="0">
+                        <a:latin typeface="Cambria Math" panose="02040503050406030204" pitchFamily="18" charset="0"/>
+                        <a:ea typeface="M+ 1p light" panose="020B0402020203020204" pitchFamily="50" charset="-128"/>
+                        <a:cs typeface="M+ 1p light" panose="020B0402020203020204" pitchFamily="50" charset="-128"/>
+                      </a:rPr>
+                      <m:t>, </m:t>
+                    </m:r>
+                    <m:r>
+                      <a:rPr lang="ja-JP" altLang="en-US" i="1">
+                        <a:latin typeface="Cambria Math" panose="02040503050406030204" pitchFamily="18" charset="0"/>
+                        <a:ea typeface="M+ 1p light" panose="020B0402020203020204" pitchFamily="50" charset="-128"/>
+                        <a:cs typeface="M+ 1p light" panose="020B0402020203020204" pitchFamily="50" charset="-128"/>
+                      </a:rPr>
+                      <m:t>群</m:t>
+                    </m:r>
+                    <m:r>
+                      <a:rPr lang="en-US" altLang="ja-JP" b="0" i="1" smtClean="0">
+                        <a:latin typeface="Cambria Math" panose="02040503050406030204" pitchFamily="18" charset="0"/>
+                        <a:ea typeface="M+ 1p light" panose="020B0402020203020204" pitchFamily="50" charset="-128"/>
+                        <a:cs typeface="M+ 1p light" panose="020B0402020203020204" pitchFamily="50" charset="-128"/>
+                      </a:rPr>
+                      <m:t>𝐺</m:t>
+                    </m:r>
+                    <m:r>
+                      <a:rPr lang="ja-JP" altLang="en-US" i="1">
+                        <a:latin typeface="Cambria Math" panose="02040503050406030204" pitchFamily="18" charset="0"/>
+                        <a:ea typeface="M+ 1p light" panose="020B0402020203020204" pitchFamily="50" charset="-128"/>
+                        <a:cs typeface="M+ 1p light" panose="020B0402020203020204" pitchFamily="50" charset="-128"/>
+                      </a:rPr>
+                      <m:t>が</m:t>
+                    </m:r>
+                    <m:r>
+                      <a:rPr lang="ja-JP" altLang="en-US" i="1" smtClean="0">
+                        <a:latin typeface="Cambria Math" panose="02040503050406030204" pitchFamily="18" charset="0"/>
+                        <a:ea typeface="M+ 1p light" panose="020B0402020203020204" pitchFamily="50" charset="-128"/>
+                        <a:cs typeface="M+ 1p light" panose="020B0402020203020204" pitchFamily="50" charset="-128"/>
+                      </a:rPr>
+                      <m:t>作用するとき</m:t>
+                    </m:r>
+                    <m:r>
+                      <a:rPr lang="en-US" altLang="ja-JP" b="0" i="1" smtClean="0">
+                        <a:latin typeface="Cambria Math" panose="02040503050406030204" pitchFamily="18" charset="0"/>
+                        <a:ea typeface="M+ 1p light" panose="020B0402020203020204" pitchFamily="50" charset="-128"/>
+                        <a:cs typeface="M+ 1p light" panose="020B0402020203020204" pitchFamily="50" charset="-128"/>
+                      </a:rPr>
+                      <m:t>, </m:t>
+                    </m:r>
+                    <m:r>
+                      <a:rPr lang="ja-JP" altLang="en-US" i="1">
+                        <a:latin typeface="Cambria Math" panose="02040503050406030204" pitchFamily="18" charset="0"/>
+                        <a:ea typeface="M+ 1p light" panose="020B0402020203020204" pitchFamily="50" charset="-128"/>
+                        <a:cs typeface="M+ 1p light" panose="020B0402020203020204" pitchFamily="50" charset="-128"/>
+                      </a:rPr>
+                      <m:t>その作用</m:t>
+                    </m:r>
+                    <m:r>
+                      <a:rPr lang="en-US" altLang="ja-JP" b="0" i="1" smtClean="0">
+                        <a:latin typeface="Cambria Math" panose="02040503050406030204" pitchFamily="18" charset="0"/>
+                        <a:ea typeface="M+ 1p light" panose="020B0402020203020204" pitchFamily="50" charset="-128"/>
+                        <a:cs typeface="M+ 1p light" panose="020B0402020203020204" pitchFamily="50" charset="-128"/>
+                      </a:rPr>
+                      <m:t>∙:</m:t>
+                    </m:r>
+                    <m:r>
+                      <a:rPr lang="en-US" altLang="ja-JP" b="0" i="1" smtClean="0">
+                        <a:latin typeface="Cambria Math" panose="02040503050406030204" pitchFamily="18" charset="0"/>
+                        <a:ea typeface="M+ 1p light" panose="020B0402020203020204" pitchFamily="50" charset="-128"/>
+                        <a:cs typeface="M+ 1p light" panose="020B0402020203020204" pitchFamily="50" charset="-128"/>
+                      </a:rPr>
+                      <m:t>𝐺</m:t>
+                    </m:r>
+                    <m:r>
+                      <a:rPr lang="en-US" altLang="ja-JP" b="0" i="1" smtClean="0">
+                        <a:latin typeface="Cambria Math" panose="02040503050406030204" pitchFamily="18" charset="0"/>
+                        <a:ea typeface="M+ 1p light" panose="020B0402020203020204" pitchFamily="50" charset="-128"/>
+                        <a:cs typeface="M+ 1p light" panose="020B0402020203020204" pitchFamily="50" charset="-128"/>
+                      </a:rPr>
+                      <m:t>×</m:t>
+                    </m:r>
+                    <m:r>
+                      <a:rPr lang="en-US" altLang="ja-JP" b="0" i="1" smtClean="0">
+                        <a:latin typeface="Cambria Math" panose="02040503050406030204" pitchFamily="18" charset="0"/>
+                        <a:ea typeface="M+ 1p light" panose="020B0402020203020204" pitchFamily="50" charset="-128"/>
+                        <a:cs typeface="M+ 1p light" panose="020B0402020203020204" pitchFamily="50" charset="-128"/>
+                      </a:rPr>
+                      <m:t>𝑋</m:t>
+                    </m:r>
+                    <m:r>
+                      <a:rPr lang="en-US" altLang="ja-JP" b="0" i="1" smtClean="0">
+                        <a:latin typeface="Cambria Math" panose="02040503050406030204" pitchFamily="18" charset="0"/>
+                        <a:ea typeface="M+ 1p light" panose="020B0402020203020204" pitchFamily="50" charset="-128"/>
+                        <a:cs typeface="M+ 1p light" panose="020B0402020203020204" pitchFamily="50" charset="-128"/>
+                      </a:rPr>
+                      <m:t>→</m:t>
+                    </m:r>
+                    <m:r>
+                      <a:rPr lang="en-US" altLang="ja-JP" b="0" i="1" smtClean="0">
+                        <a:latin typeface="Cambria Math" panose="02040503050406030204" pitchFamily="18" charset="0"/>
+                        <a:ea typeface="M+ 1p light" panose="020B0402020203020204" pitchFamily="50" charset="-128"/>
+                        <a:cs typeface="M+ 1p light" panose="020B0402020203020204" pitchFamily="50" charset="-128"/>
+                      </a:rPr>
+                      <m:t>𝑋</m:t>
+                    </m:r>
+                    <m:r>
+                      <a:rPr lang="ja-JP" altLang="en-US" i="1">
+                        <a:latin typeface="Cambria Math" panose="02040503050406030204" pitchFamily="18" charset="0"/>
+                        <a:ea typeface="M+ 1p light" panose="020B0402020203020204" pitchFamily="50" charset="-128"/>
+                        <a:cs typeface="M+ 1p light" panose="020B0402020203020204" pitchFamily="50" charset="-128"/>
+                      </a:rPr>
+                      <m:t>に</m:t>
+                    </m:r>
+                    <m:r>
+                      <a:rPr lang="ja-JP" altLang="en-US" i="1" smtClean="0">
+                        <a:latin typeface="Cambria Math" panose="02040503050406030204" pitchFamily="18" charset="0"/>
+                        <a:ea typeface="M+ 1p light" panose="020B0402020203020204" pitchFamily="50" charset="-128"/>
+                        <a:cs typeface="M+ 1p light" panose="020B0402020203020204" pitchFamily="50" charset="-128"/>
+                      </a:rPr>
+                      <m:t>対して</m:t>
+                    </m:r>
+                  </m:oMath>
+                </a14:m>
+                <a:endParaRPr lang="en-US" altLang="ja-JP" dirty="0">
+                  <a:latin typeface="M+ 1p light" panose="020B0402020203020204" pitchFamily="50" charset="-128"/>
+                  <a:ea typeface="M+ 1p light" panose="020B0402020203020204" pitchFamily="50" charset="-128"/>
+                  <a:cs typeface="M+ 1p light" panose="020B0402020203020204" pitchFamily="50" charset="-128"/>
+                </a:endParaRPr>
+              </a:p>
+              <a:p>
+                <a:pPr marL="0" lvl="0" indent="0">
+                  <a:buNone/>
+                </a:pPr>
+                <a14:m>
+                  <m:oMathPara xmlns:m="http://schemas.openxmlformats.org/officeDocument/2006/math">
+                    <m:oMathParaPr>
+                      <m:jc m:val="centerGroup"/>
+                    </m:oMathParaPr>
+                    <m:oMath xmlns:m="http://schemas.openxmlformats.org/officeDocument/2006/math">
+                      <m:r>
+                        <a:rPr lang="en-US" altLang="ja-JP" sz="1600" b="0" i="1" smtClean="0">
+                          <a:latin typeface="Cambria Math" panose="02040503050406030204" pitchFamily="18" charset="0"/>
+                          <a:ea typeface="M+ 1p light" panose="020B0402020203020204" pitchFamily="50" charset="-128"/>
+                          <a:cs typeface="M+ 1p light" panose="020B0402020203020204" pitchFamily="50" charset="-128"/>
+                        </a:rPr>
+                        <m:t>∀</m:t>
+                      </m:r>
+                      <m:r>
+                        <a:rPr lang="en-US" altLang="ja-JP" sz="1600" b="0" i="1" smtClean="0">
+                          <a:latin typeface="Cambria Math" panose="02040503050406030204" pitchFamily="18" charset="0"/>
+                          <a:ea typeface="M+ 1p light" panose="020B0402020203020204" pitchFamily="50" charset="-128"/>
+                          <a:cs typeface="M+ 1p light" panose="020B0402020203020204" pitchFamily="50" charset="-128"/>
+                        </a:rPr>
+                        <m:t>𝑥</m:t>
+                      </m:r>
+                      <m:r>
+                        <a:rPr lang="en-US" altLang="ja-JP" sz="1600" b="0" i="1" smtClean="0">
+                          <a:latin typeface="Cambria Math" panose="02040503050406030204" pitchFamily="18" charset="0"/>
+                          <a:ea typeface="M+ 1p light" panose="020B0402020203020204" pitchFamily="50" charset="-128"/>
+                          <a:cs typeface="M+ 1p light" panose="020B0402020203020204" pitchFamily="50" charset="-128"/>
+                        </a:rPr>
+                        <m:t>,</m:t>
+                      </m:r>
+                      <m:r>
+                        <a:rPr lang="en-US" altLang="ja-JP" sz="1600" b="0" i="1" smtClean="0">
+                          <a:latin typeface="Cambria Math" panose="02040503050406030204" pitchFamily="18" charset="0"/>
+                          <a:ea typeface="M+ 1p light" panose="020B0402020203020204" pitchFamily="50" charset="-128"/>
+                          <a:cs typeface="M+ 1p light" panose="020B0402020203020204" pitchFamily="50" charset="-128"/>
+                        </a:rPr>
+                        <m:t>𝑦</m:t>
+                      </m:r>
+                      <m:r>
+                        <a:rPr lang="en-US" altLang="ja-JP" sz="1600" b="0" i="1" smtClean="0">
+                          <a:latin typeface="Cambria Math" panose="02040503050406030204" pitchFamily="18" charset="0"/>
+                          <a:ea typeface="M+ 1p light" panose="020B0402020203020204" pitchFamily="50" charset="-128"/>
+                          <a:cs typeface="M+ 1p light" panose="020B0402020203020204" pitchFamily="50" charset="-128"/>
+                        </a:rPr>
+                        <m:t>∈</m:t>
+                      </m:r>
+                      <m:r>
+                        <a:rPr lang="en-US" altLang="ja-JP" sz="1600" b="0" i="1" smtClean="0">
+                          <a:latin typeface="Cambria Math" panose="02040503050406030204" pitchFamily="18" charset="0"/>
+                          <a:ea typeface="M+ 1p light" panose="020B0402020203020204" pitchFamily="50" charset="-128"/>
+                          <a:cs typeface="M+ 1p light" panose="020B0402020203020204" pitchFamily="50" charset="-128"/>
+                        </a:rPr>
+                        <m:t>𝑋</m:t>
+                      </m:r>
+                      <m:r>
+                        <a:rPr lang="en-US" altLang="ja-JP" sz="1600" b="0" i="1" smtClean="0">
+                          <a:latin typeface="Cambria Math" panose="02040503050406030204" pitchFamily="18" charset="0"/>
+                          <a:ea typeface="M+ 1p light" panose="020B0402020203020204" pitchFamily="50" charset="-128"/>
+                          <a:cs typeface="M+ 1p light" panose="020B0402020203020204" pitchFamily="50" charset="-128"/>
+                        </a:rPr>
+                        <m:t>, ∃</m:t>
+                      </m:r>
+                      <m:r>
+                        <a:rPr lang="en-US" altLang="ja-JP" sz="1600" b="0" i="1" smtClean="0">
+                          <a:latin typeface="Cambria Math" panose="02040503050406030204" pitchFamily="18" charset="0"/>
+                          <a:ea typeface="M+ 1p light" panose="020B0402020203020204" pitchFamily="50" charset="-128"/>
+                          <a:cs typeface="M+ 1p light" panose="020B0402020203020204" pitchFamily="50" charset="-128"/>
+                        </a:rPr>
+                        <m:t>𝑔</m:t>
+                      </m:r>
+                      <m:r>
+                        <a:rPr lang="en-US" altLang="ja-JP" sz="1600" b="0" i="1" smtClean="0">
+                          <a:latin typeface="Cambria Math" panose="02040503050406030204" pitchFamily="18" charset="0"/>
+                          <a:ea typeface="M+ 1p light" panose="020B0402020203020204" pitchFamily="50" charset="-128"/>
+                          <a:cs typeface="M+ 1p light" panose="020B0402020203020204" pitchFamily="50" charset="-128"/>
+                        </a:rPr>
+                        <m:t>∈</m:t>
+                      </m:r>
+                      <m:r>
+                        <a:rPr lang="en-US" altLang="ja-JP" sz="1600" b="0" i="1" smtClean="0">
+                          <a:latin typeface="Cambria Math" panose="02040503050406030204" pitchFamily="18" charset="0"/>
+                          <a:ea typeface="M+ 1p light" panose="020B0402020203020204" pitchFamily="50" charset="-128"/>
+                          <a:cs typeface="M+ 1p light" panose="020B0402020203020204" pitchFamily="50" charset="-128"/>
+                        </a:rPr>
+                        <m:t>𝐺</m:t>
+                      </m:r>
+                      <m:r>
+                        <a:rPr lang="en-US" altLang="ja-JP" sz="1600" b="0" i="1" smtClean="0">
+                          <a:latin typeface="Cambria Math" panose="02040503050406030204" pitchFamily="18" charset="0"/>
+                          <a:ea typeface="M+ 1p light" panose="020B0402020203020204" pitchFamily="50" charset="-128"/>
+                          <a:cs typeface="M+ 1p light" panose="020B0402020203020204" pitchFamily="50" charset="-128"/>
+                        </a:rPr>
+                        <m:t> </m:t>
+                      </m:r>
+                      <m:r>
+                        <a:rPr lang="en-US" altLang="ja-JP" sz="1600" b="0" i="1" smtClean="0">
+                          <a:latin typeface="Cambria Math" panose="02040503050406030204" pitchFamily="18" charset="0"/>
+                          <a:ea typeface="M+ 1p light" panose="020B0402020203020204" pitchFamily="50" charset="-128"/>
+                          <a:cs typeface="M+ 1p light" panose="020B0402020203020204" pitchFamily="50" charset="-128"/>
+                        </a:rPr>
+                        <m:t>𝑠</m:t>
+                      </m:r>
+                      <m:r>
+                        <a:rPr lang="en-US" altLang="ja-JP" sz="1600" b="0" i="1" smtClean="0">
+                          <a:latin typeface="Cambria Math" panose="02040503050406030204" pitchFamily="18" charset="0"/>
+                          <a:ea typeface="M+ 1p light" panose="020B0402020203020204" pitchFamily="50" charset="-128"/>
+                          <a:cs typeface="M+ 1p light" panose="020B0402020203020204" pitchFamily="50" charset="-128"/>
+                        </a:rPr>
+                        <m:t>.</m:t>
+                      </m:r>
+                      <m:r>
+                        <a:rPr lang="en-US" altLang="ja-JP" sz="1600" b="0" i="1" smtClean="0">
+                          <a:latin typeface="Cambria Math" panose="02040503050406030204" pitchFamily="18" charset="0"/>
+                          <a:ea typeface="M+ 1p light" panose="020B0402020203020204" pitchFamily="50" charset="-128"/>
+                          <a:cs typeface="M+ 1p light" panose="020B0402020203020204" pitchFamily="50" charset="-128"/>
+                        </a:rPr>
+                        <m:t>𝑡</m:t>
+                      </m:r>
+                      <m:r>
+                        <a:rPr lang="en-US" altLang="ja-JP" sz="1600" b="0" i="1" smtClean="0">
+                          <a:latin typeface="Cambria Math" panose="02040503050406030204" pitchFamily="18" charset="0"/>
+                          <a:ea typeface="M+ 1p light" panose="020B0402020203020204" pitchFamily="50" charset="-128"/>
+                          <a:cs typeface="M+ 1p light" panose="020B0402020203020204" pitchFamily="50" charset="-128"/>
+                        </a:rPr>
+                        <m:t>.  </m:t>
+                      </m:r>
+                      <m:r>
+                        <a:rPr lang="en-US" altLang="ja-JP" sz="1600" b="0" i="1" smtClean="0">
+                          <a:latin typeface="Cambria Math" panose="02040503050406030204" pitchFamily="18" charset="0"/>
+                          <a:ea typeface="M+ 1p light" panose="020B0402020203020204" pitchFamily="50" charset="-128"/>
+                          <a:cs typeface="M+ 1p light" panose="020B0402020203020204" pitchFamily="50" charset="-128"/>
+                        </a:rPr>
+                        <m:t>𝑔</m:t>
+                      </m:r>
+                      <m:r>
+                        <a:rPr lang="en-US" altLang="ja-JP" sz="1600" b="0" i="1" smtClean="0">
+                          <a:latin typeface="Cambria Math" panose="02040503050406030204" pitchFamily="18" charset="0"/>
+                          <a:ea typeface="M+ 1p light" panose="020B0402020203020204" pitchFamily="50" charset="-128"/>
+                          <a:cs typeface="M+ 1p light" panose="020B0402020203020204" pitchFamily="50" charset="-128"/>
+                        </a:rPr>
+                        <m:t>∙</m:t>
+                      </m:r>
+                      <m:r>
+                        <a:rPr lang="en-US" altLang="ja-JP" sz="1600" b="0" i="1" smtClean="0">
+                          <a:latin typeface="Cambria Math" panose="02040503050406030204" pitchFamily="18" charset="0"/>
+                          <a:ea typeface="M+ 1p light" panose="020B0402020203020204" pitchFamily="50" charset="-128"/>
+                          <a:cs typeface="M+ 1p light" panose="020B0402020203020204" pitchFamily="50" charset="-128"/>
+                        </a:rPr>
+                        <m:t>𝑥</m:t>
+                      </m:r>
+                      <m:r>
+                        <a:rPr lang="en-US" altLang="ja-JP" sz="1600" b="0" i="1" smtClean="0">
+                          <a:latin typeface="Cambria Math" panose="02040503050406030204" pitchFamily="18" charset="0"/>
+                          <a:ea typeface="M+ 1p light" panose="020B0402020203020204" pitchFamily="50" charset="-128"/>
+                          <a:cs typeface="M+ 1p light" panose="020B0402020203020204" pitchFamily="50" charset="-128"/>
+                        </a:rPr>
+                        <m:t>=</m:t>
+                      </m:r>
+                      <m:r>
+                        <a:rPr lang="en-US" altLang="ja-JP" sz="1600" b="0" i="1" smtClean="0">
+                          <a:latin typeface="Cambria Math" panose="02040503050406030204" pitchFamily="18" charset="0"/>
+                          <a:ea typeface="M+ 1p light" panose="020B0402020203020204" pitchFamily="50" charset="-128"/>
+                          <a:cs typeface="M+ 1p light" panose="020B0402020203020204" pitchFamily="50" charset="-128"/>
+                        </a:rPr>
+                        <m:t>𝑦</m:t>
+                      </m:r>
+                      <m:r>
+                        <a:rPr lang="en-US" altLang="ja-JP" sz="1600" b="0" i="1" smtClean="0">
+                          <a:latin typeface="Cambria Math" panose="02040503050406030204" pitchFamily="18" charset="0"/>
+                          <a:ea typeface="M+ 1p light" panose="020B0402020203020204" pitchFamily="50" charset="-128"/>
+                          <a:cs typeface="M+ 1p light" panose="020B0402020203020204" pitchFamily="50" charset="-128"/>
+                        </a:rPr>
+                        <m:t> </m:t>
+                      </m:r>
+                      <m:r>
+                        <a:rPr lang="ja-JP" altLang="en-US" sz="1600" i="1">
+                          <a:latin typeface="Cambria Math" panose="02040503050406030204" pitchFamily="18" charset="0"/>
+                          <a:ea typeface="M+ 1p light" panose="020B0402020203020204" pitchFamily="50" charset="-128"/>
+                          <a:cs typeface="M+ 1p light" panose="020B0402020203020204" pitchFamily="50" charset="-128"/>
+                        </a:rPr>
+                        <m:t>が</m:t>
+                      </m:r>
+                      <m:r>
+                        <a:rPr lang="ja-JP" altLang="en-US" sz="1600" i="1" smtClean="0">
+                          <a:latin typeface="Cambria Math" panose="02040503050406030204" pitchFamily="18" charset="0"/>
+                          <a:ea typeface="M+ 1p light" panose="020B0402020203020204" pitchFamily="50" charset="-128"/>
+                          <a:cs typeface="M+ 1p light" panose="020B0402020203020204" pitchFamily="50" charset="-128"/>
+                        </a:rPr>
+                        <m:t>成立することである</m:t>
+                      </m:r>
+                    </m:oMath>
+                  </m:oMathPara>
+                </a14:m>
+                <a:endParaRPr lang="en-US" altLang="ja-JP" sz="1600" dirty="0">
+                  <a:latin typeface="M+ 1p light" panose="020B0402020203020204" pitchFamily="50" charset="-128"/>
+                  <a:ea typeface="M+ 1p light" panose="020B0402020203020204" pitchFamily="50" charset="-128"/>
+                  <a:cs typeface="M+ 1p light" panose="020B0402020203020204" pitchFamily="50" charset="-128"/>
+                </a:endParaRPr>
+              </a:p>
+              <a:p>
+                <a:pPr marL="0" lvl="0" indent="0">
+                  <a:buNone/>
+                </a:pPr>
+                <a:endParaRPr lang="en-US" altLang="ja-JP" sz="1600" dirty="0">
+                  <a:latin typeface="M+ 1p light" panose="020B0402020203020204" pitchFamily="50" charset="-128"/>
+                  <a:ea typeface="M+ 1p light" panose="020B0402020203020204" pitchFamily="50" charset="-128"/>
+                  <a:cs typeface="M+ 1p light" panose="020B0402020203020204" pitchFamily="50" charset="-128"/>
+                </a:endParaRPr>
+              </a:p>
+              <a:p>
+                <a:pPr marL="0" lvl="0" indent="0">
+                  <a:buNone/>
+                </a:pPr>
+                <a:r>
+                  <a:rPr lang="ja-JP" altLang="en-US" sz="1600" dirty="0">
+                    <a:latin typeface="M+ 1p light" panose="020B0402020203020204" pitchFamily="50" charset="-128"/>
+                    <a:ea typeface="M+ 1p light" panose="020B0402020203020204" pitchFamily="50" charset="-128"/>
+                    <a:cs typeface="M+ 1p light" panose="020B0402020203020204" pitchFamily="50" charset="-128"/>
+                  </a:rPr>
+                  <a:t>推移律が成り立つ場合</a:t>
+                </a:r>
+                <a:r>
+                  <a:rPr lang="en-US" altLang="ja-JP" sz="1600" dirty="0">
+                    <a:latin typeface="M+ 1p light" panose="020B0402020203020204" pitchFamily="50" charset="-128"/>
+                    <a:ea typeface="M+ 1p light" panose="020B0402020203020204" pitchFamily="50" charset="-128"/>
+                    <a:cs typeface="M+ 1p light" panose="020B0402020203020204" pitchFamily="50" charset="-128"/>
+                  </a:rPr>
+                  <a:t>, </a:t>
+                </a:r>
+                <a:r>
+                  <a:rPr lang="ja-JP" altLang="en-US" sz="1600" dirty="0">
+                    <a:latin typeface="M+ 1p light" panose="020B0402020203020204" pitchFamily="50" charset="-128"/>
+                    <a:ea typeface="M+ 1p light" panose="020B0402020203020204" pitchFamily="50" charset="-128"/>
+                    <a:cs typeface="M+ 1p light" panose="020B0402020203020204" pitchFamily="50" charset="-128"/>
+                  </a:rPr>
+                  <a:t>あ</a:t>
+                </a:r>
+                <a14:m>
+                  <m:oMath xmlns:m="http://schemas.openxmlformats.org/officeDocument/2006/math">
+                    <m:r>
+                      <a:rPr lang="ja-JP" altLang="en-US" sz="1600" b="0" i="1" dirty="0">
+                        <a:latin typeface="Cambria Math" panose="02040503050406030204" pitchFamily="18" charset="0"/>
+                        <a:ea typeface="M+ 1p light" panose="020B0402020203020204" pitchFamily="50" charset="-128"/>
+                        <a:cs typeface="M+ 1p light" panose="020B0402020203020204" pitchFamily="50" charset="-128"/>
+                      </a:rPr>
+                      <m:t>る</m:t>
+                    </m:r>
+                    <m:r>
+                      <a:rPr lang="ja-JP" altLang="en-US" sz="1600" i="1" dirty="0" smtClean="0">
+                        <a:latin typeface="Cambria Math" panose="02040503050406030204" pitchFamily="18" charset="0"/>
+                        <a:ea typeface="M+ 1p light" panose="020B0402020203020204" pitchFamily="50" charset="-128"/>
+                        <a:cs typeface="M+ 1p light" panose="020B0402020203020204" pitchFamily="50" charset="-128"/>
+                      </a:rPr>
+                      <m:t>作用の</m:t>
+                    </m:r>
+                    <m:r>
+                      <a:rPr lang="ja-JP" altLang="en-US" sz="1600" i="1" dirty="0">
+                        <a:latin typeface="Cambria Math" panose="02040503050406030204" pitchFamily="18" charset="0"/>
+                        <a:ea typeface="M+ 1p light" panose="020B0402020203020204" pitchFamily="50" charset="-128"/>
+                        <a:cs typeface="M+ 1p light" panose="020B0402020203020204" pitchFamily="50" charset="-128"/>
+                      </a:rPr>
+                      <m:t>性質に</m:t>
+                    </m:r>
+                    <m:r>
+                      <a:rPr lang="ja-JP" altLang="en-US" sz="1600" i="1" dirty="0" smtClean="0">
+                        <a:latin typeface="Cambria Math" panose="02040503050406030204" pitchFamily="18" charset="0"/>
+                        <a:ea typeface="M+ 1p light" panose="020B0402020203020204" pitchFamily="50" charset="-128"/>
+                        <a:cs typeface="M+ 1p light" panose="020B0402020203020204" pitchFamily="50" charset="-128"/>
+                      </a:rPr>
+                      <m:t>ついて</m:t>
+                    </m:r>
+                    <m:r>
+                      <a:rPr lang="ja-JP" altLang="en-US" sz="1600" i="1" dirty="0">
+                        <a:latin typeface="Cambria Math" panose="02040503050406030204" pitchFamily="18" charset="0"/>
+                        <a:ea typeface="M+ 1p light" panose="020B0402020203020204" pitchFamily="50" charset="-128"/>
+                        <a:cs typeface="M+ 1p light" panose="020B0402020203020204" pitchFamily="50" charset="-128"/>
+                      </a:rPr>
+                      <m:t>述べたいなら</m:t>
+                    </m:r>
+                    <m:r>
+                      <a:rPr lang="en-US" altLang="ja-JP" sz="1600" b="0" i="1" dirty="0" smtClean="0">
+                        <a:latin typeface="Cambria Math" panose="02040503050406030204" pitchFamily="18" charset="0"/>
+                        <a:ea typeface="M+ 1p light" panose="020B0402020203020204" pitchFamily="50" charset="-128"/>
+                        <a:cs typeface="M+ 1p light" panose="020B0402020203020204" pitchFamily="50" charset="-128"/>
+                      </a:rPr>
+                      <m:t>, </m:t>
+                    </m:r>
+                    <m:r>
+                      <a:rPr lang="en-US" altLang="ja-JP" sz="1600" b="0" i="1" smtClean="0">
+                        <a:latin typeface="Cambria Math" panose="02040503050406030204" pitchFamily="18" charset="0"/>
+                        <a:ea typeface="M+ 1p light" panose="020B0402020203020204" pitchFamily="50" charset="-128"/>
+                        <a:cs typeface="M+ 1p light" panose="020B0402020203020204" pitchFamily="50" charset="-128"/>
+                      </a:rPr>
+                      <m:t>𝑥</m:t>
+                    </m:r>
+                    <m:r>
+                      <a:rPr lang="en-US" altLang="ja-JP" sz="1600" b="0" i="1" smtClean="0">
+                        <a:latin typeface="Cambria Math" panose="02040503050406030204" pitchFamily="18" charset="0"/>
+                        <a:ea typeface="M+ 1p light" panose="020B0402020203020204" pitchFamily="50" charset="-128"/>
+                        <a:cs typeface="M+ 1p light" panose="020B0402020203020204" pitchFamily="50" charset="-128"/>
+                      </a:rPr>
+                      <m:t>,</m:t>
+                    </m:r>
+                    <m:r>
+                      <a:rPr lang="en-US" altLang="ja-JP" sz="1600" b="0" i="1" smtClean="0">
+                        <a:latin typeface="Cambria Math" panose="02040503050406030204" pitchFamily="18" charset="0"/>
+                        <a:ea typeface="M+ 1p light" panose="020B0402020203020204" pitchFamily="50" charset="-128"/>
+                        <a:cs typeface="M+ 1p light" panose="020B0402020203020204" pitchFamily="50" charset="-128"/>
+                      </a:rPr>
+                      <m:t>𝑦</m:t>
+                    </m:r>
+                    <m:r>
+                      <a:rPr lang="ja-JP" altLang="en-US" sz="1600" i="1">
+                        <a:latin typeface="Cambria Math" panose="02040503050406030204" pitchFamily="18" charset="0"/>
+                        <a:ea typeface="M+ 1p light" panose="020B0402020203020204" pitchFamily="50" charset="-128"/>
+                        <a:cs typeface="M+ 1p light" panose="020B0402020203020204" pitchFamily="50" charset="-128"/>
+                      </a:rPr>
+                      <m:t>の</m:t>
+                    </m:r>
+                  </m:oMath>
+                </a14:m>
+                <a:r>
+                  <a:rPr lang="ja-JP" altLang="en-US" sz="1600" dirty="0">
+                    <a:latin typeface="M+ 1p light" panose="020B0402020203020204" pitchFamily="50" charset="-128"/>
+                    <a:ea typeface="M+ 1p light" panose="020B0402020203020204" pitchFamily="50" charset="-128"/>
+                    <a:cs typeface="M+ 1p light" panose="020B0402020203020204" pitchFamily="50" charset="-128"/>
+                  </a:rPr>
+                  <a:t>一例さえ示せば良い</a:t>
+                </a:r>
+                <a:r>
+                  <a:rPr lang="en-US" altLang="ja-JP" sz="1600" dirty="0">
+                    <a:latin typeface="M+ 1p light" panose="020B0402020203020204" pitchFamily="50" charset="-128"/>
+                    <a:ea typeface="M+ 1p light" panose="020B0402020203020204" pitchFamily="50" charset="-128"/>
+                    <a:cs typeface="M+ 1p light" panose="020B0402020203020204" pitchFamily="50" charset="-128"/>
+                  </a:rPr>
+                  <a:t>(for all)</a:t>
+                </a:r>
+              </a:p>
+              <a:p>
+                <a:pPr marL="0" lvl="0" indent="0">
+                  <a:buNone/>
+                </a:pPr>
+                <a:endParaRPr lang="en-US" altLang="ja-JP" sz="1600" dirty="0">
+                  <a:latin typeface="M+ 1p light" panose="020B0402020203020204" pitchFamily="50" charset="-128"/>
+                  <a:ea typeface="M+ 1p light" panose="020B0402020203020204" pitchFamily="50" charset="-128"/>
+                  <a:cs typeface="M+ 1p light" panose="020B0402020203020204" pitchFamily="50" charset="-128"/>
+                </a:endParaRPr>
+              </a:p>
+              <a:p>
+                <a:pPr marL="0" lvl="0" indent="0">
+                  <a:buNone/>
+                </a:pPr>
+                <a:r>
+                  <a:rPr lang="en-US" altLang="ja-JP" sz="1600" dirty="0">
+                    <a:latin typeface="M+ 1p light" panose="020B0402020203020204" pitchFamily="50" charset="-128"/>
+                    <a:ea typeface="M+ 1p light" panose="020B0402020203020204" pitchFamily="50" charset="-128"/>
+                    <a:cs typeface="M+ 1p light" panose="020B0402020203020204" pitchFamily="50" charset="-128"/>
+                  </a:rPr>
+                  <a:t>Q. </a:t>
+                </a:r>
+                <a:r>
+                  <a:rPr lang="ja-JP" altLang="en-US" sz="1600" dirty="0">
+                    <a:latin typeface="M+ 1p light" panose="020B0402020203020204" pitchFamily="50" charset="-128"/>
+                    <a:ea typeface="M+ 1p light" panose="020B0402020203020204" pitchFamily="50" charset="-128"/>
+                    <a:cs typeface="M+ 1p light" panose="020B0402020203020204" pitchFamily="50" charset="-128"/>
+                  </a:rPr>
+                  <a:t>ユークリッド変換はユークリッド空間に対して推移的である</a:t>
+                </a:r>
+                <a:endParaRPr lang="en-US" altLang="ja-JP" sz="1600">
+                  <a:latin typeface="M+ 1p light" panose="020B0402020203020204" pitchFamily="50" charset="-128"/>
+                  <a:ea typeface="M+ 1p light" panose="020B0402020203020204" pitchFamily="50" charset="-128"/>
+                  <a:cs typeface="M+ 1p light" panose="020B0402020203020204" pitchFamily="50" charset="-128"/>
+                </a:endParaRPr>
+              </a:p>
+              <a:p>
+                <a:pPr marL="0" lvl="0" indent="0">
+                  <a:buNone/>
+                </a:pPr>
+                <a:endParaRPr lang="en-US" altLang="ja-JP" sz="1600" dirty="0">
+                  <a:latin typeface="M+ 1p light" panose="020B0402020203020204" pitchFamily="50" charset="-128"/>
+                  <a:ea typeface="M+ 1p light" panose="020B0402020203020204" pitchFamily="50" charset="-128"/>
+                  <a:cs typeface="M+ 1p light" panose="020B0402020203020204" pitchFamily="50" charset="-128"/>
+                </a:endParaRPr>
+              </a:p>
+            </p:txBody>
+          </p:sp>
+        </mc:Choice>
+        <mc:Fallback>
+          <p:sp>
+            <p:nvSpPr>
+              <p:cNvPr id="61" name="Google Shape;61;p14"/>
+              <p:cNvSpPr txBox="1">
+                <a:spLocks noGrp="1" noRot="1" noChangeAspect="1" noMove="1" noResize="1" noEditPoints="1" noAdjustHandles="1" noChangeArrowheads="1" noChangeShapeType="1" noTextEdit="1"/>
+              </p:cNvSpPr>
+              <p:nvPr>
+                <p:ph type="body" idx="1"/>
+              </p:nvPr>
+            </p:nvSpPr>
+            <p:spPr>
+              <a:xfrm>
+                <a:off x="311700" y="1152475"/>
+                <a:ext cx="8520600" cy="3416400"/>
+              </a:xfrm>
+              <a:prstGeom prst="rect">
+                <a:avLst/>
+              </a:prstGeom>
+              <a:blipFill>
+                <a:blip r:embed="rId4"/>
+                <a:stretch>
+                  <a:fillRect l="-572"/>
+                </a:stretch>
+              </a:blipFill>
+            </p:spPr>
+            <p:txBody>
+              <a:bodyPr/>
+              <a:lstStyle/>
+              <a:p>
+                <a:r>
+                  <a:rPr lang="ja-JP" altLang="en-US">
+                    <a:noFill/>
+                  </a:rPr>
+                  <a:t> </a:t>
+                </a:r>
+              </a:p>
+            </p:txBody>
+          </p:sp>
+        </mc:Fallback>
+      </mc:AlternateContent>
+      <p:sp>
+        <p:nvSpPr>
+          <p:cNvPr id="62" name="Google Shape;62;p14"/>
+          <p:cNvSpPr txBox="1">
+            <a:spLocks noGrp="1"/>
+          </p:cNvSpPr>
+          <p:nvPr>
+            <p:ph type="title"/>
+          </p:nvPr>
+        </p:nvSpPr>
+        <p:spPr>
+          <a:xfrm>
+            <a:off x="6916625" y="45750"/>
+            <a:ext cx="2144400" cy="347700"/>
+          </a:xfrm>
+          <a:prstGeom prst="rect">
+            <a:avLst/>
+          </a:prstGeom>
+        </p:spPr>
+        <p:txBody>
+          <a:bodyPr spcFirstLastPara="1" wrap="square" lIns="91425" tIns="91425" rIns="91425" bIns="91425" anchor="t" anchorCtr="0">
+            <a:noAutofit/>
+          </a:bodyPr>
+          <a:lstStyle/>
+          <a:p>
+            <a:pPr marL="0" lvl="0" indent="0" algn="ctr" rtl="0">
+              <a:spcBef>
+                <a:spcPts val="0"/>
+              </a:spcBef>
+              <a:spcAft>
+                <a:spcPts val="0"/>
+              </a:spcAft>
+              <a:buNone/>
+            </a:pPr>
+            <a:r>
+              <a:rPr lang="ja-JP" altLang="en-US" sz="1400" dirty="0">
+                <a:solidFill>
+                  <a:schemeClr val="bg1">
+                    <a:lumMod val="50000"/>
+                  </a:schemeClr>
+                </a:solidFill>
+                <a:latin typeface="M+ 1p light" panose="020B0402020203020204" pitchFamily="50" charset="-128"/>
+                <a:ea typeface="M+ 1p light" panose="020B0402020203020204" pitchFamily="50" charset="-128"/>
+                <a:cs typeface="M+ 1p light" panose="020B0402020203020204" pitchFamily="50" charset="-128"/>
+              </a:rPr>
+              <a:t>復習</a:t>
+            </a:r>
+            <a:r>
+              <a:rPr lang="en-US" altLang="ja-JP" sz="1400" dirty="0">
+                <a:solidFill>
+                  <a:schemeClr val="bg1">
+                    <a:lumMod val="50000"/>
+                  </a:schemeClr>
+                </a:solidFill>
+                <a:latin typeface="M+ 1p light" panose="020B0402020203020204" pitchFamily="50" charset="-128"/>
+                <a:ea typeface="M+ 1p light" panose="020B0402020203020204" pitchFamily="50" charset="-128"/>
+                <a:cs typeface="M+ 1p light" panose="020B0402020203020204" pitchFamily="50" charset="-128"/>
+              </a:rPr>
+              <a:t>: </a:t>
+            </a:r>
+            <a:r>
+              <a:rPr lang="ja-JP" altLang="en-US" sz="1400" dirty="0">
+                <a:solidFill>
+                  <a:schemeClr val="bg1">
+                    <a:lumMod val="50000"/>
+                  </a:schemeClr>
+                </a:solidFill>
+                <a:latin typeface="M+ 1p light" panose="020B0402020203020204" pitchFamily="50" charset="-128"/>
+                <a:ea typeface="M+ 1p light" panose="020B0402020203020204" pitchFamily="50" charset="-128"/>
+                <a:cs typeface="M+ 1p light" panose="020B0402020203020204" pitchFamily="50" charset="-128"/>
+              </a:rPr>
+              <a:t>ユークリッド幾何</a:t>
+            </a:r>
+            <a:endParaRPr sz="1400" dirty="0">
+              <a:solidFill>
+                <a:schemeClr val="bg1">
+                  <a:lumMod val="50000"/>
+                </a:schemeClr>
+              </a:solidFill>
+              <a:latin typeface="M+ 1p light" panose="020B0402020203020204" pitchFamily="50" charset="-128"/>
+              <a:ea typeface="M+ 1p light" panose="020B0402020203020204" pitchFamily="50" charset="-128"/>
+              <a:cs typeface="M+ 1p light" panose="020B0402020203020204" pitchFamily="50" charset="-128"/>
+            </a:endParaRPr>
+          </a:p>
+        </p:txBody>
+      </p:sp>
+    </p:spTree>
+    <p:extLst>
+      <p:ext uri="{BB962C8B-B14F-4D97-AF65-F5344CB8AC3E}">
+        <p14:creationId xmlns:p14="http://schemas.microsoft.com/office/powerpoint/2010/main" val="645963511"/>
+      </p:ext>
+    </p:extLst>
   </p:cSld>
   <p:clrMapOvr>
     <a:masterClrMapping/>
@@ -15430,8 +18387,8 @@
           </a:p>
         </p:txBody>
       </p:sp>
-      <mc:AlternateContent xmlns:mc="http://schemas.openxmlformats.org/markup-compatibility/2006">
-        <mc:Choice xmlns:a14="http://schemas.microsoft.com/office/drawing/2010/main" Requires="a14">
+      <mc:AlternateContent xmlns:mc="http://schemas.openxmlformats.org/markup-compatibility/2006" xmlns:a14="http://schemas.microsoft.com/office/drawing/2010/main">
+        <mc:Choice Requires="a14">
           <p:sp>
             <p:nvSpPr>
               <p:cNvPr id="61" name="Google Shape;61;p14"/>
@@ -16701,7 +19658,7 @@
             </p:txBody>
           </p:sp>
         </mc:Choice>
-        <mc:Fallback>
+        <mc:Fallback xmlns="">
           <p:sp>
             <p:nvSpPr>
               <p:cNvPr id="61" name="Google Shape;61;p14"/>

</xml_diff>